<commit_message>
Almost final slides for 300, updates for 345
</commit_message>
<xml_diff>
--- a/300/300.pptx
+++ b/300/300.pptx
@@ -6,10 +6,10 @@
     <p:sldMasterId id="2147483754" r:id="rId2"/>
   </p:sldMasterIdLst>
   <p:notesMasterIdLst>
-    <p:notesMasterId r:id="rId24"/>
+    <p:notesMasterId r:id="rId27"/>
   </p:notesMasterIdLst>
   <p:handoutMasterIdLst>
-    <p:handoutMasterId r:id="rId25"/>
+    <p:handoutMasterId r:id="rId28"/>
   </p:handoutMasterIdLst>
   <p:sldIdLst>
     <p:sldId id="256" r:id="rId3"/>
@@ -29,10 +29,13 @@
     <p:sldId id="334" r:id="rId17"/>
     <p:sldId id="329" r:id="rId18"/>
     <p:sldId id="330" r:id="rId19"/>
-    <p:sldId id="331" r:id="rId20"/>
-    <p:sldId id="327" r:id="rId21"/>
-    <p:sldId id="318" r:id="rId22"/>
-    <p:sldId id="317" r:id="rId23"/>
+    <p:sldId id="338" r:id="rId20"/>
+    <p:sldId id="331" r:id="rId21"/>
+    <p:sldId id="339" r:id="rId22"/>
+    <p:sldId id="340" r:id="rId23"/>
+    <p:sldId id="327" r:id="rId24"/>
+    <p:sldId id="318" r:id="rId25"/>
+    <p:sldId id="317" r:id="rId26"/>
   </p:sldIdLst>
   <p:sldSz cx="9144000" cy="6858000" type="screen4x3"/>
   <p:notesSz cx="6858000" cy="9144000"/>
@@ -255,7 +258,7 @@
               <a:pPr>
                 <a:defRPr/>
               </a:pPr>
-              <a:t>6/1/11</a:t>
+              <a:t>6/3/11</a:t>
             </a:fld>
             <a:endParaRPr lang="en-US"/>
           </a:p>
@@ -438,7 +441,7 @@
               <a:pPr>
                 <a:defRPr/>
               </a:pPr>
-              <a:t>6/1/11</a:t>
+              <a:t>6/3/11</a:t>
             </a:fld>
             <a:endParaRPr lang="en-US"/>
           </a:p>
@@ -1373,68 +1376,24 @@
           <a:p>
             <a:r>
               <a:rPr lang="en-US" dirty="0" smtClean="0"/>
-              <a:t>Access from Preferences menu</a:t>
-            </a:r>
-          </a:p>
-          <a:p>
-            <a:r>
-              <a:rPr lang="en-US" dirty="0" smtClean="0"/>
-              <a:t>Compatible with </a:t>
-            </a:r>
-            <a:r>
-              <a:rPr lang="en-US" dirty="0" err="1" smtClean="0"/>
-              <a:t>TextMate</a:t>
-            </a:r>
-            <a:r>
-              <a:rPr lang="en-US" dirty="0" smtClean="0"/>
-              <a:t> themes</a:t>
-            </a:r>
-          </a:p>
-          <a:p>
-            <a:pPr marL="0" marR="0" indent="0" algn="l" defTabSz="457200" rtl="0" eaLnBrk="0" fontAlgn="base" latinLnBrk="0" hangingPunct="0">
-              <a:lnSpc>
-                <a:spcPct val="100000"/>
-              </a:lnSpc>
-              <a:spcBef>
-                <a:spcPct val="30000"/>
-              </a:spcBef>
-              <a:spcAft>
-                <a:spcPct val="0"/>
-              </a:spcAft>
-              <a:buClrTx/>
-              <a:buSzTx/>
-              <a:buFontTx/>
-              <a:buNone/>
-              <a:tabLst/>
-              <a:defRPr/>
-            </a:pPr>
-            <a:r>
-              <a:rPr lang="en-US" dirty="0" smtClean="0"/>
-              <a:t>Download themes</a:t>
+              <a:t>Themes</a:t>
             </a:r>
             <a:r>
               <a:rPr lang="en-US" baseline="0" dirty="0" smtClean="0"/>
-              <a:t> from </a:t>
-            </a:r>
-            <a:r>
-              <a:rPr lang="en-US" dirty="0" smtClean="0"/>
-              <a:t>http://</a:t>
-            </a:r>
-            <a:r>
-              <a:rPr lang="en-US" dirty="0" err="1" smtClean="0"/>
-              <a:t>wiki.macromates.com</a:t>
-            </a:r>
-            <a:r>
-              <a:rPr lang="en-US" dirty="0" smtClean="0"/>
-              <a:t>/Themes/</a:t>
-            </a:r>
-            <a:r>
-              <a:rPr lang="en-US" dirty="0" err="1" smtClean="0"/>
-              <a:t>UserSubmittedThemes</a:t>
-            </a:r>
-            <a:endParaRPr lang="en-US" dirty="0" smtClean="0"/>
-          </a:p>
-          <a:p>
+              <a:t> control colors and fonts for perspectives</a:t>
+            </a:r>
+          </a:p>
+          <a:p>
+            <a:r>
+              <a:rPr lang="en-US" baseline="0" dirty="0" smtClean="0"/>
+              <a:t>Many built in</a:t>
+            </a:r>
+          </a:p>
+          <a:p>
+            <a:r>
+              <a:rPr lang="en-US" baseline="0" dirty="0" smtClean="0"/>
+              <a:t>You can download and install additional themes</a:t>
+            </a:r>
             <a:endParaRPr lang="en-US" dirty="0"/>
           </a:p>
         </p:txBody>
@@ -1527,29 +1486,17 @@
           <a:p>
             <a:r>
               <a:rPr lang="en-US" dirty="0" smtClean="0"/>
-              <a:t>Right-click in editor,</a:t>
+              <a:t>Review Eclipse terminology,</a:t>
+            </a:r>
+          </a:p>
+          <a:p>
+            <a:r>
+              <a:rPr lang="en-US" dirty="0" smtClean="0"/>
+              <a:t>Editor</a:t>
             </a:r>
             <a:r>
               <a:rPr lang="en-US" baseline="0" dirty="0" smtClean="0"/>
-              <a:t> choose Preferences</a:t>
-            </a:r>
-          </a:p>
-          <a:p>
-            <a:endParaRPr lang="en-US" baseline="0" dirty="0" smtClean="0"/>
-          </a:p>
-          <a:p>
-            <a:r>
-              <a:rPr lang="en-US" baseline="0" dirty="0" smtClean="0"/>
-              <a:t>Line numbering, highlight color, etc.</a:t>
-            </a:r>
-          </a:p>
-          <a:p>
-            <a:endParaRPr lang="en-US" baseline="0" dirty="0" smtClean="0"/>
-          </a:p>
-          <a:p>
-            <a:r>
-              <a:rPr lang="en-US" baseline="0" dirty="0" smtClean="0"/>
-              <a:t>Right-click in editor, choose Word Wrap</a:t>
+              <a:t> is window in which you change code or project parameters</a:t>
             </a:r>
             <a:endParaRPr lang="en-US" dirty="0"/>
           </a:p>
@@ -1643,7 +1590,25 @@
           <a:p>
             <a:r>
               <a:rPr lang="en-US" dirty="0" smtClean="0"/>
-              <a:t>Command-Shift-F</a:t>
+              <a:t>Examples</a:t>
+            </a:r>
+            <a:r>
+              <a:rPr lang="en-US" baseline="0" dirty="0" smtClean="0"/>
+              <a:t> include:</a:t>
+            </a:r>
+          </a:p>
+          <a:p>
+            <a:pPr marL="171450" indent="-171450">
+              <a:buFont typeface="Arial"/>
+              <a:buChar char="•"/>
+            </a:pPr>
+            <a:r>
+              <a:rPr lang="en-US" dirty="0" smtClean="0"/>
+              <a:t>Command</a:t>
+            </a:r>
+            <a:r>
+              <a:rPr lang="en-US" dirty="0" smtClean="0"/>
+              <a:t>-Shift-F</a:t>
             </a:r>
             <a:r>
               <a:rPr lang="en-US" baseline="0" dirty="0" smtClean="0"/>
@@ -1652,6 +1617,10 @@
             <a:endParaRPr lang="en-US" dirty="0" smtClean="0"/>
           </a:p>
           <a:p>
+            <a:pPr marL="171450" indent="-171450">
+              <a:buFont typeface="Arial"/>
+              <a:buChar char="•"/>
+            </a:pPr>
             <a:r>
               <a:rPr lang="en-US" dirty="0" smtClean="0"/>
               <a:t>Command</a:t>
@@ -1662,6 +1631,10 @@
             </a:r>
           </a:p>
           <a:p>
+            <a:pPr marL="171450" indent="-171450">
+              <a:buFont typeface="Arial"/>
+              <a:buChar char="•"/>
+            </a:pPr>
             <a:r>
               <a:rPr lang="en-US" baseline="0" dirty="0" smtClean="0"/>
               <a:t>Command-Option-/ to comment out the selected block</a:t>
@@ -1693,7 +1666,7 @@
               <a:pPr>
                 <a:defRPr/>
               </a:pPr>
-              <a:t>18</a:t>
+              <a:t>19</a:t>
             </a:fld>
             <a:endParaRPr lang="en-US"/>
           </a:p>
@@ -1756,32 +1729,6 @@
           <a:bodyPr/>
           <a:lstStyle/>
           <a:p>
-            <a:r>
-              <a:rPr lang="en-US" dirty="0" smtClean="0"/>
-              <a:t>Three main types of updates:</a:t>
-            </a:r>
-          </a:p>
-          <a:p>
-            <a:r>
-              <a:rPr lang="en-US" dirty="0" smtClean="0"/>
-              <a:t>API updates – to get new Titanium APIs</a:t>
-            </a:r>
-          </a:p>
-          <a:p>
-            <a:r>
-              <a:rPr lang="en-US" dirty="0" smtClean="0"/>
-              <a:t>Ti</a:t>
-            </a:r>
-            <a:r>
-              <a:rPr lang="en-US" baseline="0" dirty="0" smtClean="0"/>
-              <a:t> Studio updates</a:t>
-            </a:r>
-          </a:p>
-          <a:p>
-            <a:r>
-              <a:rPr lang="en-US" baseline="0" dirty="0" smtClean="0"/>
-              <a:t>Install add-ons, such as SVN support</a:t>
-            </a:r>
             <a:endParaRPr lang="en-US" dirty="0"/>
           </a:p>
         </p:txBody>
@@ -1809,7 +1756,7 @@
               <a:pPr>
                 <a:defRPr/>
               </a:pPr>
-              <a:t>19</a:t>
+              <a:t>20</a:t>
             </a:fld>
             <a:endParaRPr lang="en-US"/>
           </a:p>
@@ -1818,7 +1765,7 @@
     </p:spTree>
     <p:extLst>
       <p:ext uri="{BB962C8B-B14F-4D97-AF65-F5344CB8AC3E}">
-        <p14:creationId xmlns:p14="http://schemas.microsoft.com/office/powerpoint/2010/main" val="1750815042"/>
+        <p14:creationId xmlns:p14="http://schemas.microsoft.com/office/powerpoint/2010/main" val="3163856772"/>
       </p:ext>
     </p:extLst>
   </p:cSld>
@@ -1847,6 +1794,212 @@
       </p:grpSpPr>
       <p:sp>
         <p:nvSpPr>
+          <p:cNvPr id="2" name="Slide Image Placeholder 1"/>
+          <p:cNvSpPr>
+            <a:spLocks noGrp="1" noRot="1" noChangeAspect="1"/>
+          </p:cNvSpPr>
+          <p:nvPr>
+            <p:ph type="sldImg"/>
+          </p:nvPr>
+        </p:nvSpPr>
+        <p:spPr/>
+      </p:sp>
+      <p:sp>
+        <p:nvSpPr>
+          <p:cNvPr id="3" name="Notes Placeholder 2"/>
+          <p:cNvSpPr>
+            <a:spLocks noGrp="1"/>
+          </p:cNvSpPr>
+          <p:nvPr>
+            <p:ph type="body" idx="1"/>
+          </p:nvPr>
+        </p:nvSpPr>
+        <p:spPr/>
+        <p:txBody>
+          <a:bodyPr/>
+          <a:lstStyle/>
+          <a:p>
+            <a:endParaRPr lang="en-US" dirty="0"/>
+          </a:p>
+        </p:txBody>
+      </p:sp>
+      <p:sp>
+        <p:nvSpPr>
+          <p:cNvPr id="4" name="Slide Number Placeholder 3"/>
+          <p:cNvSpPr>
+            <a:spLocks noGrp="1"/>
+          </p:cNvSpPr>
+          <p:nvPr>
+            <p:ph type="sldNum" sz="quarter" idx="10"/>
+          </p:nvPr>
+        </p:nvSpPr>
+        <p:spPr/>
+        <p:txBody>
+          <a:bodyPr/>
+          <a:lstStyle/>
+          <a:p>
+            <a:pPr>
+              <a:defRPr/>
+            </a:pPr>
+            <a:fld id="{0B02E734-84D0-8641-B8E0-8B1913E3457A}" type="slidenum">
+              <a:rPr lang="en-US" smtClean="0"/>
+              <a:pPr>
+                <a:defRPr/>
+              </a:pPr>
+              <a:t>21</a:t>
+            </a:fld>
+            <a:endParaRPr lang="en-US"/>
+          </a:p>
+        </p:txBody>
+      </p:sp>
+    </p:spTree>
+    <p:extLst>
+      <p:ext uri="{BB962C8B-B14F-4D97-AF65-F5344CB8AC3E}">
+        <p14:creationId xmlns:p14="http://schemas.microsoft.com/office/powerpoint/2010/main" val="3163856772"/>
+      </p:ext>
+    </p:extLst>
+  </p:cSld>
+  <p:clrMapOvr>
+    <a:masterClrMapping/>
+  </p:clrMapOvr>
+</p:notes>
+</file>
+
+<file path=ppt/notesSlides/notesSlide17.xml><?xml version="1.0" encoding="utf-8"?>
+<p:notes xmlns:a="http://schemas.openxmlformats.org/drawingml/2006/main" xmlns:r="http://schemas.openxmlformats.org/officeDocument/2006/relationships" xmlns:p="http://schemas.openxmlformats.org/presentationml/2006/main">
+  <p:cSld>
+    <p:spTree>
+      <p:nvGrpSpPr>
+        <p:cNvPr id="1" name=""/>
+        <p:cNvGrpSpPr/>
+        <p:nvPr/>
+      </p:nvGrpSpPr>
+      <p:grpSpPr>
+        <a:xfrm>
+          <a:off x="0" y="0"/>
+          <a:ext cx="0" cy="0"/>
+          <a:chOff x="0" y="0"/>
+          <a:chExt cx="0" cy="0"/>
+        </a:xfrm>
+      </p:grpSpPr>
+      <p:sp>
+        <p:nvSpPr>
+          <p:cNvPr id="2" name="Slide Image Placeholder 1"/>
+          <p:cNvSpPr>
+            <a:spLocks noGrp="1" noRot="1" noChangeAspect="1"/>
+          </p:cNvSpPr>
+          <p:nvPr>
+            <p:ph type="sldImg"/>
+          </p:nvPr>
+        </p:nvSpPr>
+        <p:spPr/>
+      </p:sp>
+      <p:sp>
+        <p:nvSpPr>
+          <p:cNvPr id="3" name="Notes Placeholder 2"/>
+          <p:cNvSpPr>
+            <a:spLocks noGrp="1"/>
+          </p:cNvSpPr>
+          <p:nvPr>
+            <p:ph type="body" idx="1"/>
+          </p:nvPr>
+        </p:nvSpPr>
+        <p:spPr/>
+        <p:txBody>
+          <a:bodyPr/>
+          <a:lstStyle/>
+          <a:p>
+            <a:r>
+              <a:rPr lang="en-US" dirty="0" smtClean="0"/>
+              <a:t>Three main types of updates:</a:t>
+            </a:r>
+          </a:p>
+          <a:p>
+            <a:r>
+              <a:rPr lang="en-US" dirty="0" smtClean="0"/>
+              <a:t>API updates – to get new Titanium APIs</a:t>
+            </a:r>
+          </a:p>
+          <a:p>
+            <a:r>
+              <a:rPr lang="en-US" dirty="0" smtClean="0"/>
+              <a:t>Ti</a:t>
+            </a:r>
+            <a:r>
+              <a:rPr lang="en-US" baseline="0" dirty="0" smtClean="0"/>
+              <a:t> Studio updates</a:t>
+            </a:r>
+          </a:p>
+          <a:p>
+            <a:r>
+              <a:rPr lang="en-US" baseline="0" dirty="0" smtClean="0"/>
+              <a:t>Install add-ons, such as SVN support</a:t>
+            </a:r>
+            <a:endParaRPr lang="en-US" dirty="0"/>
+          </a:p>
+        </p:txBody>
+      </p:sp>
+      <p:sp>
+        <p:nvSpPr>
+          <p:cNvPr id="4" name="Slide Number Placeholder 3"/>
+          <p:cNvSpPr>
+            <a:spLocks noGrp="1"/>
+          </p:cNvSpPr>
+          <p:nvPr>
+            <p:ph type="sldNum" sz="quarter" idx="10"/>
+          </p:nvPr>
+        </p:nvSpPr>
+        <p:spPr/>
+        <p:txBody>
+          <a:bodyPr/>
+          <a:lstStyle/>
+          <a:p>
+            <a:pPr>
+              <a:defRPr/>
+            </a:pPr>
+            <a:fld id="{0B02E734-84D0-8641-B8E0-8B1913E3457A}" type="slidenum">
+              <a:rPr lang="en-US" smtClean="0"/>
+              <a:pPr>
+                <a:defRPr/>
+              </a:pPr>
+              <a:t>22</a:t>
+            </a:fld>
+            <a:endParaRPr lang="en-US"/>
+          </a:p>
+        </p:txBody>
+      </p:sp>
+    </p:spTree>
+    <p:extLst>
+      <p:ext uri="{BB962C8B-B14F-4D97-AF65-F5344CB8AC3E}">
+        <p14:creationId xmlns:p14="http://schemas.microsoft.com/office/powerpoint/2010/main" val="1750815042"/>
+      </p:ext>
+    </p:extLst>
+  </p:cSld>
+  <p:clrMapOvr>
+    <a:masterClrMapping/>
+  </p:clrMapOvr>
+</p:notes>
+</file>
+
+<file path=ppt/notesSlides/notesSlide18.xml><?xml version="1.0" encoding="utf-8"?>
+<p:notes xmlns:a="http://schemas.openxmlformats.org/drawingml/2006/main" xmlns:r="http://schemas.openxmlformats.org/officeDocument/2006/relationships" xmlns:p="http://schemas.openxmlformats.org/presentationml/2006/main">
+  <p:cSld>
+    <p:spTree>
+      <p:nvGrpSpPr>
+        <p:cNvPr id="1" name=""/>
+        <p:cNvGrpSpPr/>
+        <p:nvPr/>
+      </p:nvGrpSpPr>
+      <p:grpSpPr>
+        <a:xfrm>
+          <a:off x="0" y="0"/>
+          <a:ext cx="0" cy="0"/>
+          <a:chOff x="0" y="0"/>
+          <a:chExt cx="0" cy="0"/>
+        </a:xfrm>
+      </p:grpSpPr>
+      <p:sp>
+        <p:nvSpPr>
           <p:cNvPr id="56321" name="Slide Image Placeholder 1"/>
           <p:cNvSpPr>
             <a:spLocks noGrp="1" noRot="1" noChangeAspect="1"/>
@@ -2152,7 +2305,7 @@
             <a:fld id="{6382B355-693A-8047-A11A-9E0C32488441}" type="slidenum">
               <a:rPr lang="en-US" sz="1200"/>
               <a:pPr eaLnBrk="1" hangingPunct="1"/>
-              <a:t>21</a:t>
+              <a:t>24</a:t>
             </a:fld>
             <a:endParaRPr lang="en-US" sz="1200"/>
           </a:p>
@@ -3432,7 +3585,7 @@
               <a:pPr>
                 <a:defRPr/>
               </a:pPr>
-              <a:t>6/1/11</a:t>
+              <a:t>6/3/11</a:t>
             </a:fld>
             <a:endParaRPr lang="en-US"/>
           </a:p>
@@ -3722,7 +3875,7 @@
               <a:pPr>
                 <a:defRPr/>
               </a:pPr>
-              <a:t>6/1/11</a:t>
+              <a:t>6/3/11</a:t>
             </a:fld>
             <a:endParaRPr lang="en-US"/>
           </a:p>
@@ -3919,7 +4072,7 @@
               <a:pPr>
                 <a:defRPr/>
               </a:pPr>
-              <a:t>6/1/11</a:t>
+              <a:t>6/3/11</a:t>
             </a:fld>
             <a:endParaRPr lang="en-US"/>
           </a:p>
@@ -4126,7 +4279,7 @@
               <a:pPr>
                 <a:defRPr/>
               </a:pPr>
-              <a:t>6/1/11</a:t>
+              <a:t>6/3/11</a:t>
             </a:fld>
             <a:endParaRPr lang="en-US"/>
           </a:p>
@@ -4395,7 +4548,7 @@
               <a:pPr>
                 <a:defRPr/>
               </a:pPr>
-              <a:t>6/1/11</a:t>
+              <a:t>6/3/11</a:t>
             </a:fld>
             <a:endParaRPr lang="en-US"/>
           </a:p>
@@ -4592,7 +4745,7 @@
               <a:pPr>
                 <a:defRPr/>
               </a:pPr>
-              <a:t>6/1/11</a:t>
+              <a:t>6/3/11</a:t>
             </a:fld>
             <a:endParaRPr lang="en-US"/>
           </a:p>
@@ -4865,7 +5018,7 @@
               <a:pPr>
                 <a:defRPr/>
               </a:pPr>
-              <a:t>6/1/11</a:t>
+              <a:t>6/3/11</a:t>
             </a:fld>
             <a:endParaRPr lang="en-US"/>
           </a:p>
@@ -5180,7 +5333,7 @@
               <a:pPr>
                 <a:defRPr/>
               </a:pPr>
-              <a:t>6/1/11</a:t>
+              <a:t>6/3/11</a:t>
             </a:fld>
             <a:endParaRPr lang="en-US"/>
           </a:p>
@@ -5629,7 +5782,7 @@
               <a:pPr>
                 <a:defRPr/>
               </a:pPr>
-              <a:t>6/1/11</a:t>
+              <a:t>6/3/11</a:t>
             </a:fld>
             <a:endParaRPr lang="en-US"/>
           </a:p>
@@ -5774,7 +5927,7 @@
               <a:pPr>
                 <a:defRPr/>
               </a:pPr>
-              <a:t>6/1/11</a:t>
+              <a:t>6/3/11</a:t>
             </a:fld>
             <a:endParaRPr lang="en-US"/>
           </a:p>
@@ -5896,7 +6049,7 @@
               <a:pPr>
                 <a:defRPr/>
               </a:pPr>
-              <a:t>6/1/11</a:t>
+              <a:t>6/3/11</a:t>
             </a:fld>
             <a:endParaRPr lang="en-US"/>
           </a:p>
@@ -6114,7 +6267,7 @@
               <a:pPr>
                 <a:defRPr/>
               </a:pPr>
-              <a:t>6/1/11</a:t>
+              <a:t>6/3/11</a:t>
             </a:fld>
             <a:endParaRPr lang="en-US"/>
           </a:p>
@@ -6418,7 +6571,7 @@
               <a:pPr>
                 <a:defRPr/>
               </a:pPr>
-              <a:t>6/1/11</a:t>
+              <a:t>6/3/11</a:t>
             </a:fld>
             <a:endParaRPr lang="en-US"/>
           </a:p>
@@ -6701,7 +6854,7 @@
               <a:pPr>
                 <a:defRPr/>
               </a:pPr>
-              <a:t>6/1/11</a:t>
+              <a:t>6/3/11</a:t>
             </a:fld>
             <a:endParaRPr lang="en-US"/>
           </a:p>
@@ -6898,7 +7051,7 @@
               <a:pPr>
                 <a:defRPr/>
               </a:pPr>
-              <a:t>6/1/11</a:t>
+              <a:t>6/3/11</a:t>
             </a:fld>
             <a:endParaRPr lang="en-US"/>
           </a:p>
@@ -7105,7 +7258,7 @@
               <a:pPr>
                 <a:defRPr/>
               </a:pPr>
-              <a:t>6/1/11</a:t>
+              <a:t>6/3/11</a:t>
             </a:fld>
             <a:endParaRPr lang="en-US"/>
           </a:p>
@@ -7613,7 +7766,7 @@
               <a:pPr>
                 <a:defRPr/>
               </a:pPr>
-              <a:t>6/1/11</a:t>
+              <a:t>6/3/11</a:t>
             </a:fld>
             <a:endParaRPr lang="en-US"/>
           </a:p>
@@ -7919,7 +8072,7 @@
               <a:pPr>
                 <a:defRPr/>
               </a:pPr>
-              <a:t>6/1/11</a:t>
+              <a:t>6/3/11</a:t>
             </a:fld>
             <a:endParaRPr lang="en-US"/>
           </a:p>
@@ -8243,7 +8396,7 @@
               <a:pPr>
                 <a:defRPr/>
               </a:pPr>
-              <a:t>6/1/11</a:t>
+              <a:t>6/3/11</a:t>
             </a:fld>
             <a:endParaRPr lang="en-US"/>
           </a:p>
@@ -8692,7 +8845,7 @@
               <a:pPr>
                 <a:defRPr/>
               </a:pPr>
-              <a:t>6/1/11</a:t>
+              <a:t>6/3/11</a:t>
             </a:fld>
             <a:endParaRPr lang="en-US"/>
           </a:p>
@@ -8837,7 +8990,7 @@
               <a:pPr>
                 <a:defRPr/>
               </a:pPr>
-              <a:t>6/1/11</a:t>
+              <a:t>6/3/11</a:t>
             </a:fld>
             <a:endParaRPr lang="en-US"/>
           </a:p>
@@ -8959,7 +9112,7 @@
               <a:pPr>
                 <a:defRPr/>
               </a:pPr>
-              <a:t>6/1/11</a:t>
+              <a:t>6/3/11</a:t>
             </a:fld>
             <a:endParaRPr lang="en-US"/>
           </a:p>
@@ -9263,7 +9416,7 @@
               <a:pPr>
                 <a:defRPr/>
               </a:pPr>
-              <a:t>6/1/11</a:t>
+              <a:t>6/3/11</a:t>
             </a:fld>
             <a:endParaRPr lang="en-US"/>
           </a:p>
@@ -9549,7 +9702,7 @@
               <a:pPr>
                 <a:defRPr/>
               </a:pPr>
-              <a:t>6/1/11</a:t>
+              <a:t>6/3/11</a:t>
             </a:fld>
             <a:endParaRPr lang="en-US"/>
           </a:p>
@@ -10519,7 +10672,7 @@
               <a:pPr>
                 <a:defRPr/>
               </a:pPr>
-              <a:t>6/1/11</a:t>
+              <a:t>6/3/11</a:t>
             </a:fld>
             <a:endParaRPr lang="en-US"/>
           </a:p>
@@ -12706,14 +12859,80 @@
         </p:blipFill>
         <p:spPr>
           <a:xfrm>
-            <a:off x="2135317" y="1189784"/>
-            <a:ext cx="5033790" cy="5628106"/>
+            <a:off x="4652212" y="1286805"/>
+            <a:ext cx="4491788" cy="5022112"/>
           </a:xfrm>
           <a:prstGeom prst="rect">
             <a:avLst/>
           </a:prstGeom>
         </p:spPr>
       </p:pic>
+      <p:sp>
+        <p:nvSpPr>
+          <p:cNvPr id="4" name="Content Placeholder 2"/>
+          <p:cNvSpPr>
+            <a:spLocks noGrp="1"/>
+          </p:cNvSpPr>
+          <p:nvPr>
+            <p:ph idx="1"/>
+          </p:nvPr>
+        </p:nvSpPr>
+        <p:spPr>
+          <a:xfrm>
+            <a:off x="457199" y="1346200"/>
+            <a:ext cx="4342063" cy="4525963"/>
+          </a:xfrm>
+        </p:spPr>
+        <p:txBody>
+          <a:bodyPr/>
+          <a:lstStyle/>
+          <a:p>
+            <a:r>
+              <a:rPr lang="en-US" dirty="0" smtClean="0"/>
+              <a:t>Select and modify via Preferences menu</a:t>
+            </a:r>
+          </a:p>
+          <a:p>
+            <a:endParaRPr lang="en-US" dirty="0"/>
+          </a:p>
+          <a:p>
+            <a:r>
+              <a:rPr lang="en-US" dirty="0" smtClean="0"/>
+              <a:t>Compatible with </a:t>
+            </a:r>
+            <a:r>
+              <a:rPr lang="en-US" dirty="0" err="1" smtClean="0"/>
+              <a:t>TextMate</a:t>
+            </a:r>
+            <a:r>
+              <a:rPr lang="en-US" dirty="0" smtClean="0"/>
+              <a:t> themes</a:t>
+            </a:r>
+          </a:p>
+          <a:p>
+            <a:endParaRPr lang="en-US" dirty="0"/>
+          </a:p>
+          <a:p>
+            <a:r>
+              <a:rPr lang="en-US" dirty="0" smtClean="0"/>
+              <a:t>Download themes from </a:t>
+            </a:r>
+            <a:r>
+              <a:rPr lang="en-US" sz="2000" dirty="0" err="1"/>
+              <a:t>wiki.macromates.com</a:t>
+            </a:r>
+            <a:r>
+              <a:rPr lang="en-US" sz="2000" dirty="0"/>
+              <a:t>/Themes/</a:t>
+            </a:r>
+            <a:r>
+              <a:rPr lang="en-US" sz="2000" dirty="0" err="1"/>
+              <a:t>UserSubmittedThemes</a:t>
+            </a:r>
+            <a:endParaRPr lang="en-US" dirty="0"/>
+          </a:p>
+        </p:txBody>
+      </p:sp>
     </p:spTree>
     <p:extLst>
       <p:ext uri="{BB962C8B-B14F-4D97-AF65-F5344CB8AC3E}">
@@ -12789,14 +13008,70 @@
         </p:blipFill>
         <p:spPr>
           <a:xfrm>
-            <a:off x="2005264" y="1172414"/>
-            <a:ext cx="5133474" cy="5743028"/>
+            <a:off x="4891728" y="1114972"/>
+            <a:ext cx="4252272" cy="4757191"/>
           </a:xfrm>
           <a:prstGeom prst="rect">
             <a:avLst/>
           </a:prstGeom>
         </p:spPr>
       </p:pic>
+      <p:sp>
+        <p:nvSpPr>
+          <p:cNvPr id="5" name="Content Placeholder 2"/>
+          <p:cNvSpPr>
+            <a:spLocks noGrp="1"/>
+          </p:cNvSpPr>
+          <p:nvPr>
+            <p:ph idx="1"/>
+          </p:nvPr>
+        </p:nvSpPr>
+        <p:spPr>
+          <a:xfrm>
+            <a:off x="457199" y="1346200"/>
+            <a:ext cx="4342063" cy="4525963"/>
+          </a:xfrm>
+        </p:spPr>
+        <p:txBody>
+          <a:bodyPr/>
+          <a:lstStyle/>
+          <a:p>
+            <a:r>
+              <a:rPr lang="en-US" dirty="0" smtClean="0"/>
+              <a:t>Configure line numbering, highlight color and more for a given Editor</a:t>
+            </a:r>
+          </a:p>
+          <a:p>
+            <a:endParaRPr lang="en-US" dirty="0"/>
+          </a:p>
+          <a:p>
+            <a:r>
+              <a:rPr lang="en-US" dirty="0" smtClean="0"/>
+              <a:t>Right-click in editor, choose Preferences</a:t>
+            </a:r>
+          </a:p>
+          <a:p>
+            <a:endParaRPr lang="en-US" dirty="0"/>
+          </a:p>
+          <a:p>
+            <a:r>
+              <a:rPr lang="en-US" dirty="0" smtClean="0"/>
+              <a:t>Word wrap:</a:t>
+            </a:r>
+          </a:p>
+          <a:p>
+            <a:r>
+              <a:rPr lang="en-US" dirty="0"/>
+              <a:t>	</a:t>
+            </a:r>
+            <a:r>
+              <a:rPr lang="en-US" sz="2000" dirty="0" smtClean="0"/>
+              <a:t>Right-click, choose Word Wrap</a:t>
+            </a:r>
+            <a:endParaRPr lang="en-US" dirty="0" smtClean="0"/>
+          </a:p>
+        </p:txBody>
+      </p:sp>
     </p:spTree>
     <p:extLst>
       <p:ext uri="{BB962C8B-B14F-4D97-AF65-F5344CB8AC3E}">
@@ -12807,6 +13082,13 @@
   <p:clrMapOvr>
     <a:masterClrMapping/>
   </p:clrMapOvr>
+  <p:timing>
+    <p:tnLst>
+      <p:par>
+        <p:cTn xmlns:p14="http://schemas.microsoft.com/office/powerpoint/2010/main" id="1" dur="indefinite" restart="never" nodeType="tmRoot"/>
+      </p:par>
+    </p:tnLst>
+  </p:timing>
 </p:sld>
 </file>
 
@@ -12844,7 +13126,7 @@
           <a:p>
             <a:r>
               <a:rPr lang="en-US" dirty="0" smtClean="0"/>
-              <a:t>Keyboard shortcuts and commands</a:t>
+              <a:t>Customization concepts</a:t>
             </a:r>
             <a:endParaRPr lang="en-US" dirty="0"/>
           </a:p>
@@ -12866,6 +13148,1283 @@
           <a:lstStyle/>
           <a:p>
             <a:r>
+              <a:rPr lang="en-US" dirty="0"/>
+              <a:t>Commands</a:t>
+            </a:r>
+          </a:p>
+          <a:p>
+            <a:endParaRPr lang="en-US" dirty="0"/>
+          </a:p>
+          <a:p>
+            <a:r>
+              <a:rPr lang="en-US" dirty="0"/>
+              <a:t>Snippets</a:t>
+            </a:r>
+          </a:p>
+          <a:p>
+            <a:endParaRPr lang="en-US" dirty="0"/>
+          </a:p>
+          <a:p>
+            <a:r>
+              <a:rPr lang="en-US" dirty="0" smtClean="0"/>
+              <a:t>Bundles</a:t>
+            </a:r>
+          </a:p>
+          <a:p>
+            <a:endParaRPr lang="en-US" dirty="0"/>
+          </a:p>
+          <a:p>
+            <a:r>
+              <a:rPr lang="en-US" dirty="0" smtClean="0"/>
+              <a:t>Rubles</a:t>
+            </a:r>
+          </a:p>
+          <a:p>
+            <a:endParaRPr lang="en-US" dirty="0"/>
+          </a:p>
+          <a:p>
+            <a:r>
+              <a:rPr lang="en-US" dirty="0" smtClean="0"/>
+              <a:t>Shortcut keys</a:t>
+            </a:r>
+            <a:endParaRPr lang="en-US" dirty="0"/>
+          </a:p>
+        </p:txBody>
+      </p:sp>
+      <p:pic>
+        <p:nvPicPr>
+          <p:cNvPr id="5" name="Picture 36" descr="tv_advert.png"/>
+          <p:cNvPicPr>
+            <a:picLocks noChangeAspect="1"/>
+          </p:cNvPicPr>
+          <p:nvPr/>
+        </p:nvPicPr>
+        <p:blipFill>
+          <a:blip r:embed="rId2">
+            <a:extLst>
+              <a:ext uri="{28A0092B-C50C-407E-A947-70E740481C1C}">
+                <a14:useLocalDpi xmlns:a14="http://schemas.microsoft.com/office/drawing/2010/main" val="0"/>
+              </a:ext>
+            </a:extLst>
+          </a:blip>
+          <a:srcRect/>
+          <a:stretch>
+            <a:fillRect/>
+          </a:stretch>
+        </p:blipFill>
+        <p:spPr bwMode="auto">
+          <a:xfrm>
+            <a:off x="8641477" y="-9565"/>
+            <a:ext cx="489155" cy="490120"/>
+          </a:xfrm>
+          <a:prstGeom prst="rect">
+            <a:avLst/>
+          </a:prstGeom>
+          <a:noFill/>
+          <a:ln>
+            <a:noFill/>
+          </a:ln>
+          <a:extLst>
+            <a:ext uri="{909E8E84-426E-40dd-AFC4-6F175D3DCCD1}">
+              <a14:hiddenFill xmlns:a14="http://schemas.microsoft.com/office/drawing/2010/main">
+                <a:solidFill>
+                  <a:srgbClr val="FFFFFF"/>
+                </a:solidFill>
+              </a14:hiddenFill>
+            </a:ext>
+            <a:ext uri="{91240B29-F687-4f45-9708-019B960494DF}">
+              <a14:hiddenLine xmlns:a14="http://schemas.microsoft.com/office/drawing/2010/main" w="9525">
+                <a:solidFill>
+                  <a:srgbClr val="000000"/>
+                </a:solidFill>
+                <a:miter lim="800000"/>
+                <a:headEnd/>
+                <a:tailEnd/>
+              </a14:hiddenLine>
+            </a:ext>
+          </a:extLst>
+        </p:spPr>
+      </p:pic>
+      <p:sp>
+        <p:nvSpPr>
+          <p:cNvPr id="8" name="Rectangle 7"/>
+          <p:cNvSpPr/>
+          <p:nvPr/>
+        </p:nvSpPr>
+        <p:spPr>
+          <a:xfrm>
+            <a:off x="3920540" y="1346200"/>
+            <a:ext cx="4004389" cy="2116220"/>
+          </a:xfrm>
+          <a:prstGeom prst="rect">
+            <a:avLst/>
+          </a:prstGeom>
+          <a:solidFill>
+            <a:schemeClr val="bg2"/>
+          </a:solidFill>
+          <a:ln>
+            <a:noFill/>
+          </a:ln>
+        </p:spPr>
+        <p:style>
+          <a:lnRef idx="1">
+            <a:schemeClr val="accent1"/>
+          </a:lnRef>
+          <a:fillRef idx="3">
+            <a:schemeClr val="accent1"/>
+          </a:fillRef>
+          <a:effectRef idx="2">
+            <a:schemeClr val="accent1"/>
+          </a:effectRef>
+          <a:fontRef idx="minor">
+            <a:schemeClr val="lt1"/>
+          </a:fontRef>
+        </p:style>
+        <p:txBody>
+          <a:bodyPr anchor="ctr"/>
+          <a:lstStyle/>
+          <a:p>
+            <a:pPr>
+              <a:defRPr/>
+            </a:pPr>
+            <a:r>
+              <a:rPr lang="en-US" sz="1800" u="sng" dirty="0" smtClean="0">
+                <a:solidFill>
+                  <a:schemeClr val="tx1"/>
+                </a:solidFill>
+              </a:rPr>
+              <a:t>Commands</a:t>
+            </a:r>
+          </a:p>
+          <a:p>
+            <a:pPr>
+              <a:defRPr/>
+            </a:pPr>
+            <a:r>
+              <a:rPr lang="en-US" sz="1800" dirty="0">
+                <a:solidFill>
+                  <a:schemeClr val="tx1"/>
+                </a:solidFill>
+              </a:rPr>
+              <a:t>U</a:t>
+            </a:r>
+            <a:r>
+              <a:rPr lang="en-US" sz="1800" dirty="0" smtClean="0">
+                <a:solidFill>
+                  <a:schemeClr val="tx1"/>
+                </a:solidFill>
+              </a:rPr>
+              <a:t>ser-defined scripts interpreted by the system’s shell</a:t>
+            </a:r>
+            <a:r>
+              <a:rPr lang="en-US" sz="1800" dirty="0">
+                <a:solidFill>
+                  <a:schemeClr val="tx1"/>
+                </a:solidFill>
+              </a:rPr>
+              <a:t> </a:t>
+            </a:r>
+            <a:r>
+              <a:rPr lang="en-US" sz="1800" dirty="0" smtClean="0">
+                <a:solidFill>
+                  <a:schemeClr val="tx1"/>
+                </a:solidFill>
+              </a:rPr>
+              <a:t>or interpreter</a:t>
+            </a:r>
+            <a:br>
+              <a:rPr lang="en-US" sz="1800" dirty="0" smtClean="0">
+                <a:solidFill>
+                  <a:schemeClr val="tx1"/>
+                </a:solidFill>
+              </a:rPr>
+            </a:br>
+            <a:endParaRPr lang="en-US" sz="1800" dirty="0" smtClean="0">
+              <a:solidFill>
+                <a:schemeClr val="tx1"/>
+              </a:solidFill>
+            </a:endParaRPr>
+          </a:p>
+          <a:p>
+            <a:pPr>
+              <a:defRPr/>
+            </a:pPr>
+            <a:r>
+              <a:rPr lang="en-US" sz="1800" dirty="0" smtClean="0">
+                <a:solidFill>
+                  <a:schemeClr val="tx1"/>
+                </a:solidFill>
+              </a:rPr>
+              <a:t>- access environment variables</a:t>
+            </a:r>
+            <a:br>
+              <a:rPr lang="en-US" sz="1800" dirty="0" smtClean="0">
+                <a:solidFill>
+                  <a:schemeClr val="tx1"/>
+                </a:solidFill>
+              </a:rPr>
+            </a:br>
+            <a:r>
+              <a:rPr lang="en-US" sz="1800" dirty="0" smtClean="0">
+                <a:solidFill>
+                  <a:schemeClr val="tx1"/>
+                </a:solidFill>
+              </a:rPr>
+              <a:t>- modify and re-insert text</a:t>
+            </a:r>
+          </a:p>
+          <a:p>
+            <a:pPr>
+              <a:defRPr/>
+            </a:pPr>
+            <a:r>
+              <a:rPr lang="en-US" sz="1800" dirty="0" smtClean="0">
+                <a:solidFill>
+                  <a:schemeClr val="tx1"/>
+                </a:solidFill>
+              </a:rPr>
+              <a:t>- create or display a file</a:t>
+            </a:r>
+            <a:endParaRPr lang="en-US" sz="1800" dirty="0">
+              <a:solidFill>
+                <a:schemeClr val="tx1"/>
+              </a:solidFill>
+            </a:endParaRPr>
+          </a:p>
+        </p:txBody>
+      </p:sp>
+      <p:sp>
+        <p:nvSpPr>
+          <p:cNvPr id="9" name="Rectangle 8"/>
+          <p:cNvSpPr/>
+          <p:nvPr/>
+        </p:nvSpPr>
+        <p:spPr>
+          <a:xfrm>
+            <a:off x="3920540" y="2153648"/>
+            <a:ext cx="4004389" cy="1415720"/>
+          </a:xfrm>
+          <a:prstGeom prst="rect">
+            <a:avLst/>
+          </a:prstGeom>
+          <a:solidFill>
+            <a:schemeClr val="bg2"/>
+          </a:solidFill>
+          <a:ln>
+            <a:noFill/>
+          </a:ln>
+        </p:spPr>
+        <p:style>
+          <a:lnRef idx="1">
+            <a:schemeClr val="accent1"/>
+          </a:lnRef>
+          <a:fillRef idx="3">
+            <a:schemeClr val="accent1"/>
+          </a:fillRef>
+          <a:effectRef idx="2">
+            <a:schemeClr val="accent1"/>
+          </a:effectRef>
+          <a:fontRef idx="minor">
+            <a:schemeClr val="lt1"/>
+          </a:fontRef>
+        </p:style>
+        <p:txBody>
+          <a:bodyPr anchor="ctr"/>
+          <a:lstStyle/>
+          <a:p>
+            <a:pPr>
+              <a:defRPr/>
+            </a:pPr>
+            <a:r>
+              <a:rPr lang="en-US" sz="1800" u="sng" dirty="0" smtClean="0">
+                <a:solidFill>
+                  <a:schemeClr val="tx1"/>
+                </a:solidFill>
+              </a:rPr>
+              <a:t>Snippet</a:t>
+            </a:r>
+          </a:p>
+          <a:p>
+            <a:pPr>
+              <a:defRPr/>
+            </a:pPr>
+            <a:r>
+              <a:rPr lang="en-US" sz="1800" dirty="0" smtClean="0">
+                <a:solidFill>
+                  <a:schemeClr val="tx1"/>
+                </a:solidFill>
+              </a:rPr>
+              <a:t>Text inserted into the document</a:t>
+            </a:r>
+          </a:p>
+          <a:p>
+            <a:pPr>
+              <a:defRPr/>
+            </a:pPr>
+            <a:r>
+              <a:rPr lang="en-US" sz="1800" dirty="0" smtClean="0">
+                <a:solidFill>
+                  <a:schemeClr val="tx1"/>
+                </a:solidFill>
+              </a:rPr>
+              <a:t>- common code blocks</a:t>
+            </a:r>
+            <a:br>
+              <a:rPr lang="en-US" sz="1800" dirty="0" smtClean="0">
+                <a:solidFill>
+                  <a:schemeClr val="tx1"/>
+                </a:solidFill>
+              </a:rPr>
+            </a:br>
+            <a:r>
+              <a:rPr lang="en-US" sz="1800" dirty="0" smtClean="0">
+                <a:solidFill>
+                  <a:schemeClr val="tx1"/>
+                </a:solidFill>
+              </a:rPr>
+              <a:t>- comment placeholder blocks</a:t>
+            </a:r>
+          </a:p>
+        </p:txBody>
+      </p:sp>
+      <p:sp>
+        <p:nvSpPr>
+          <p:cNvPr id="10" name="Rectangle 9"/>
+          <p:cNvSpPr/>
+          <p:nvPr/>
+        </p:nvSpPr>
+        <p:spPr>
+          <a:xfrm>
+            <a:off x="3920540" y="3041289"/>
+            <a:ext cx="4004389" cy="1570810"/>
+          </a:xfrm>
+          <a:prstGeom prst="rect">
+            <a:avLst/>
+          </a:prstGeom>
+          <a:solidFill>
+            <a:schemeClr val="bg2"/>
+          </a:solidFill>
+          <a:ln>
+            <a:noFill/>
+          </a:ln>
+        </p:spPr>
+        <p:style>
+          <a:lnRef idx="1">
+            <a:schemeClr val="accent1"/>
+          </a:lnRef>
+          <a:fillRef idx="3">
+            <a:schemeClr val="accent1"/>
+          </a:fillRef>
+          <a:effectRef idx="2">
+            <a:schemeClr val="accent1"/>
+          </a:effectRef>
+          <a:fontRef idx="minor">
+            <a:schemeClr val="lt1"/>
+          </a:fontRef>
+        </p:style>
+        <p:txBody>
+          <a:bodyPr anchor="ctr"/>
+          <a:lstStyle/>
+          <a:p>
+            <a:pPr>
+              <a:defRPr/>
+            </a:pPr>
+            <a:r>
+              <a:rPr lang="en-US" sz="1800" u="sng" dirty="0" smtClean="0">
+                <a:solidFill>
+                  <a:schemeClr val="tx1"/>
+                </a:solidFill>
+              </a:rPr>
+              <a:t>Bundle</a:t>
+            </a:r>
+          </a:p>
+          <a:p>
+            <a:pPr>
+              <a:defRPr/>
+            </a:pPr>
+            <a:r>
+              <a:rPr lang="en-US" sz="1800" dirty="0" smtClean="0">
+                <a:solidFill>
+                  <a:schemeClr val="tx1"/>
+                </a:solidFill>
+              </a:rPr>
+              <a:t>A grouping of commands, snippets, templates, etc. that can be associated with a scope (HTML or JavaScript documents, for example)</a:t>
+            </a:r>
+          </a:p>
+        </p:txBody>
+      </p:sp>
+      <p:sp>
+        <p:nvSpPr>
+          <p:cNvPr id="11" name="Rectangle 10"/>
+          <p:cNvSpPr/>
+          <p:nvPr/>
+        </p:nvSpPr>
+        <p:spPr>
+          <a:xfrm>
+            <a:off x="3920540" y="3979094"/>
+            <a:ext cx="4004389" cy="1301432"/>
+          </a:xfrm>
+          <a:prstGeom prst="rect">
+            <a:avLst/>
+          </a:prstGeom>
+          <a:solidFill>
+            <a:schemeClr val="bg2"/>
+          </a:solidFill>
+          <a:ln>
+            <a:noFill/>
+          </a:ln>
+        </p:spPr>
+        <p:style>
+          <a:lnRef idx="1">
+            <a:schemeClr val="accent1"/>
+          </a:lnRef>
+          <a:fillRef idx="3">
+            <a:schemeClr val="accent1"/>
+          </a:fillRef>
+          <a:effectRef idx="2">
+            <a:schemeClr val="accent1"/>
+          </a:effectRef>
+          <a:fontRef idx="minor">
+            <a:schemeClr val="lt1"/>
+          </a:fontRef>
+        </p:style>
+        <p:txBody>
+          <a:bodyPr anchor="ctr"/>
+          <a:lstStyle/>
+          <a:p>
+            <a:pPr>
+              <a:defRPr/>
+            </a:pPr>
+            <a:r>
+              <a:rPr lang="en-US" sz="1800" u="sng" dirty="0" smtClean="0">
+                <a:solidFill>
+                  <a:schemeClr val="tx1"/>
+                </a:solidFill>
+              </a:rPr>
+              <a:t>Ruble = Ruby Bundle</a:t>
+            </a:r>
+          </a:p>
+          <a:p>
+            <a:pPr>
+              <a:defRPr/>
+            </a:pPr>
+            <a:r>
+              <a:rPr lang="en-US" sz="1800" dirty="0" smtClean="0">
+                <a:solidFill>
+                  <a:schemeClr val="tx1"/>
+                </a:solidFill>
+              </a:rPr>
+              <a:t>Functionality created via Ruby scripts; cross-platform compatible solution for bundles</a:t>
+            </a:r>
+          </a:p>
+        </p:txBody>
+      </p:sp>
+      <p:sp>
+        <p:nvSpPr>
+          <p:cNvPr id="12" name="Rectangle 11"/>
+          <p:cNvSpPr/>
+          <p:nvPr/>
+        </p:nvSpPr>
+        <p:spPr>
+          <a:xfrm>
+            <a:off x="3920540" y="4452336"/>
+            <a:ext cx="4004389" cy="1301432"/>
+          </a:xfrm>
+          <a:prstGeom prst="rect">
+            <a:avLst/>
+          </a:prstGeom>
+          <a:solidFill>
+            <a:schemeClr val="bg2"/>
+          </a:solidFill>
+          <a:ln>
+            <a:noFill/>
+          </a:ln>
+        </p:spPr>
+        <p:style>
+          <a:lnRef idx="1">
+            <a:schemeClr val="accent1"/>
+          </a:lnRef>
+          <a:fillRef idx="3">
+            <a:schemeClr val="accent1"/>
+          </a:fillRef>
+          <a:effectRef idx="2">
+            <a:schemeClr val="accent1"/>
+          </a:effectRef>
+          <a:fontRef idx="minor">
+            <a:schemeClr val="lt1"/>
+          </a:fontRef>
+        </p:style>
+        <p:txBody>
+          <a:bodyPr anchor="ctr"/>
+          <a:lstStyle/>
+          <a:p>
+            <a:pPr>
+              <a:defRPr/>
+            </a:pPr>
+            <a:r>
+              <a:rPr lang="en-US" sz="1800" u="sng" dirty="0" smtClean="0">
+                <a:solidFill>
+                  <a:schemeClr val="tx1"/>
+                </a:solidFill>
+              </a:rPr>
+              <a:t>Initiate a command or snippet</a:t>
+            </a:r>
+          </a:p>
+          <a:p>
+            <a:pPr>
+              <a:defRPr/>
+            </a:pPr>
+            <a:r>
+              <a:rPr lang="en-US" sz="1800" dirty="0" smtClean="0">
+                <a:solidFill>
+                  <a:schemeClr val="tx1"/>
+                </a:solidFill>
+              </a:rPr>
+              <a:t>Provided by Eclipse or added via user-definition, bundle, or ruble</a:t>
+            </a:r>
+          </a:p>
+        </p:txBody>
+      </p:sp>
+    </p:spTree>
+    <p:extLst>
+      <p:ext uri="{BB962C8B-B14F-4D97-AF65-F5344CB8AC3E}">
+        <p14:creationId xmlns:p14="http://schemas.microsoft.com/office/powerpoint/2010/main" val="2657407659"/>
+      </p:ext>
+    </p:extLst>
+  </p:cSld>
+  <p:clrMapOvr>
+    <a:masterClrMapping/>
+  </p:clrMapOvr>
+  <p:timing>
+    <p:tnLst>
+      <p:par>
+        <p:cTn xmlns:p14="http://schemas.microsoft.com/office/powerpoint/2010/main" id="1" dur="indefinite" restart="never" nodeType="tmRoot">
+          <p:childTnLst>
+            <p:seq concurrent="1" nextAc="seek">
+              <p:cTn id="2" dur="indefinite" nodeType="mainSeq">
+                <p:childTnLst>
+                  <p:par>
+                    <p:cTn id="3" fill="hold">
+                      <p:stCondLst>
+                        <p:cond delay="indefinite"/>
+                      </p:stCondLst>
+                      <p:childTnLst>
+                        <p:par>
+                          <p:cTn id="4" fill="hold">
+                            <p:stCondLst>
+                              <p:cond delay="0"/>
+                            </p:stCondLst>
+                            <p:childTnLst>
+                              <p:par>
+                                <p:cTn id="5" presetID="2" presetClass="entr" presetSubtype="4" fill="hold" grpId="0" nodeType="clickEffect">
+                                  <p:stCondLst>
+                                    <p:cond delay="0"/>
+                                  </p:stCondLst>
+                                  <p:childTnLst>
+                                    <p:set>
+                                      <p:cBhvr>
+                                        <p:cTn id="6" dur="1" fill="hold">
+                                          <p:stCondLst>
+                                            <p:cond delay="0"/>
+                                          </p:stCondLst>
+                                        </p:cTn>
+                                        <p:tgtEl>
+                                          <p:spTgt spid="8"/>
+                                        </p:tgtEl>
+                                        <p:attrNameLst>
+                                          <p:attrName>style.visibility</p:attrName>
+                                        </p:attrNameLst>
+                                      </p:cBhvr>
+                                      <p:to>
+                                        <p:strVal val="visible"/>
+                                      </p:to>
+                                    </p:set>
+                                    <p:anim calcmode="lin" valueType="num">
+                                      <p:cBhvr additive="base">
+                                        <p:cTn id="7" dur="500" fill="hold"/>
+                                        <p:tgtEl>
+                                          <p:spTgt spid="8"/>
+                                        </p:tgtEl>
+                                        <p:attrNameLst>
+                                          <p:attrName>ppt_x</p:attrName>
+                                        </p:attrNameLst>
+                                      </p:cBhvr>
+                                      <p:tavLst>
+                                        <p:tav tm="0">
+                                          <p:val>
+                                            <p:strVal val="#ppt_x"/>
+                                          </p:val>
+                                        </p:tav>
+                                        <p:tav tm="100000">
+                                          <p:val>
+                                            <p:strVal val="#ppt_x"/>
+                                          </p:val>
+                                        </p:tav>
+                                      </p:tavLst>
+                                    </p:anim>
+                                    <p:anim calcmode="lin" valueType="num">
+                                      <p:cBhvr additive="base">
+                                        <p:cTn id="8" dur="500" fill="hold"/>
+                                        <p:tgtEl>
+                                          <p:spTgt spid="8"/>
+                                        </p:tgtEl>
+                                        <p:attrNameLst>
+                                          <p:attrName>ppt_y</p:attrName>
+                                        </p:attrNameLst>
+                                      </p:cBhvr>
+                                      <p:tavLst>
+                                        <p:tav tm="0">
+                                          <p:val>
+                                            <p:strVal val="1+#ppt_h/2"/>
+                                          </p:val>
+                                        </p:tav>
+                                        <p:tav tm="100000">
+                                          <p:val>
+                                            <p:strVal val="#ppt_y"/>
+                                          </p:val>
+                                        </p:tav>
+                                      </p:tavLst>
+                                    </p:anim>
+                                  </p:childTnLst>
+                                </p:cTn>
+                              </p:par>
+                            </p:childTnLst>
+                          </p:cTn>
+                        </p:par>
+                      </p:childTnLst>
+                    </p:cTn>
+                  </p:par>
+                  <p:par>
+                    <p:cTn id="9" fill="hold">
+                      <p:stCondLst>
+                        <p:cond delay="indefinite"/>
+                      </p:stCondLst>
+                      <p:childTnLst>
+                        <p:par>
+                          <p:cTn id="10" fill="hold">
+                            <p:stCondLst>
+                              <p:cond delay="0"/>
+                            </p:stCondLst>
+                            <p:childTnLst>
+                              <p:par>
+                                <p:cTn id="11" presetID="2" presetClass="entr" presetSubtype="4" fill="hold" grpId="0" nodeType="clickEffect">
+                                  <p:stCondLst>
+                                    <p:cond delay="0"/>
+                                  </p:stCondLst>
+                                  <p:childTnLst>
+                                    <p:set>
+                                      <p:cBhvr>
+                                        <p:cTn id="12" dur="1" fill="hold">
+                                          <p:stCondLst>
+                                            <p:cond delay="0"/>
+                                          </p:stCondLst>
+                                        </p:cTn>
+                                        <p:tgtEl>
+                                          <p:spTgt spid="9"/>
+                                        </p:tgtEl>
+                                        <p:attrNameLst>
+                                          <p:attrName>style.visibility</p:attrName>
+                                        </p:attrNameLst>
+                                      </p:cBhvr>
+                                      <p:to>
+                                        <p:strVal val="visible"/>
+                                      </p:to>
+                                    </p:set>
+                                    <p:anim calcmode="lin" valueType="num">
+                                      <p:cBhvr additive="base">
+                                        <p:cTn id="13" dur="500" fill="hold"/>
+                                        <p:tgtEl>
+                                          <p:spTgt spid="9"/>
+                                        </p:tgtEl>
+                                        <p:attrNameLst>
+                                          <p:attrName>ppt_x</p:attrName>
+                                        </p:attrNameLst>
+                                      </p:cBhvr>
+                                      <p:tavLst>
+                                        <p:tav tm="0">
+                                          <p:val>
+                                            <p:strVal val="#ppt_x"/>
+                                          </p:val>
+                                        </p:tav>
+                                        <p:tav tm="100000">
+                                          <p:val>
+                                            <p:strVal val="#ppt_x"/>
+                                          </p:val>
+                                        </p:tav>
+                                      </p:tavLst>
+                                    </p:anim>
+                                    <p:anim calcmode="lin" valueType="num">
+                                      <p:cBhvr additive="base">
+                                        <p:cTn id="14" dur="500" fill="hold"/>
+                                        <p:tgtEl>
+                                          <p:spTgt spid="9"/>
+                                        </p:tgtEl>
+                                        <p:attrNameLst>
+                                          <p:attrName>ppt_y</p:attrName>
+                                        </p:attrNameLst>
+                                      </p:cBhvr>
+                                      <p:tavLst>
+                                        <p:tav tm="0">
+                                          <p:val>
+                                            <p:strVal val="1+#ppt_h/2"/>
+                                          </p:val>
+                                        </p:tav>
+                                        <p:tav tm="100000">
+                                          <p:val>
+                                            <p:strVal val="#ppt_y"/>
+                                          </p:val>
+                                        </p:tav>
+                                      </p:tavLst>
+                                    </p:anim>
+                                  </p:childTnLst>
+                                </p:cTn>
+                              </p:par>
+                              <p:par>
+                                <p:cTn id="15" presetID="9" presetClass="exit" presetSubtype="0" fill="hold" grpId="1" nodeType="withEffect">
+                                  <p:stCondLst>
+                                    <p:cond delay="0"/>
+                                  </p:stCondLst>
+                                  <p:childTnLst>
+                                    <p:animEffect transition="out" filter="dissolve">
+                                      <p:cBhvr>
+                                        <p:cTn id="16" dur="500"/>
+                                        <p:tgtEl>
+                                          <p:spTgt spid="8"/>
+                                        </p:tgtEl>
+                                      </p:cBhvr>
+                                    </p:animEffect>
+                                    <p:set>
+                                      <p:cBhvr>
+                                        <p:cTn id="17" dur="1" fill="hold">
+                                          <p:stCondLst>
+                                            <p:cond delay="499"/>
+                                          </p:stCondLst>
+                                        </p:cTn>
+                                        <p:tgtEl>
+                                          <p:spTgt spid="8"/>
+                                        </p:tgtEl>
+                                        <p:attrNameLst>
+                                          <p:attrName>style.visibility</p:attrName>
+                                        </p:attrNameLst>
+                                      </p:cBhvr>
+                                      <p:to>
+                                        <p:strVal val="hidden"/>
+                                      </p:to>
+                                    </p:set>
+                                  </p:childTnLst>
+                                </p:cTn>
+                              </p:par>
+                            </p:childTnLst>
+                          </p:cTn>
+                        </p:par>
+                      </p:childTnLst>
+                    </p:cTn>
+                  </p:par>
+                  <p:par>
+                    <p:cTn id="18" fill="hold">
+                      <p:stCondLst>
+                        <p:cond delay="indefinite"/>
+                      </p:stCondLst>
+                      <p:childTnLst>
+                        <p:par>
+                          <p:cTn id="19" fill="hold">
+                            <p:stCondLst>
+                              <p:cond delay="0"/>
+                            </p:stCondLst>
+                            <p:childTnLst>
+                              <p:par>
+                                <p:cTn id="20" presetID="2" presetClass="entr" presetSubtype="4" fill="hold" grpId="0" nodeType="clickEffect">
+                                  <p:stCondLst>
+                                    <p:cond delay="0"/>
+                                  </p:stCondLst>
+                                  <p:childTnLst>
+                                    <p:set>
+                                      <p:cBhvr>
+                                        <p:cTn id="21" dur="1" fill="hold">
+                                          <p:stCondLst>
+                                            <p:cond delay="0"/>
+                                          </p:stCondLst>
+                                        </p:cTn>
+                                        <p:tgtEl>
+                                          <p:spTgt spid="10"/>
+                                        </p:tgtEl>
+                                        <p:attrNameLst>
+                                          <p:attrName>style.visibility</p:attrName>
+                                        </p:attrNameLst>
+                                      </p:cBhvr>
+                                      <p:to>
+                                        <p:strVal val="visible"/>
+                                      </p:to>
+                                    </p:set>
+                                    <p:anim calcmode="lin" valueType="num">
+                                      <p:cBhvr additive="base">
+                                        <p:cTn id="22" dur="500" fill="hold"/>
+                                        <p:tgtEl>
+                                          <p:spTgt spid="10"/>
+                                        </p:tgtEl>
+                                        <p:attrNameLst>
+                                          <p:attrName>ppt_x</p:attrName>
+                                        </p:attrNameLst>
+                                      </p:cBhvr>
+                                      <p:tavLst>
+                                        <p:tav tm="0">
+                                          <p:val>
+                                            <p:strVal val="#ppt_x"/>
+                                          </p:val>
+                                        </p:tav>
+                                        <p:tav tm="100000">
+                                          <p:val>
+                                            <p:strVal val="#ppt_x"/>
+                                          </p:val>
+                                        </p:tav>
+                                      </p:tavLst>
+                                    </p:anim>
+                                    <p:anim calcmode="lin" valueType="num">
+                                      <p:cBhvr additive="base">
+                                        <p:cTn id="23" dur="500" fill="hold"/>
+                                        <p:tgtEl>
+                                          <p:spTgt spid="10"/>
+                                        </p:tgtEl>
+                                        <p:attrNameLst>
+                                          <p:attrName>ppt_y</p:attrName>
+                                        </p:attrNameLst>
+                                      </p:cBhvr>
+                                      <p:tavLst>
+                                        <p:tav tm="0">
+                                          <p:val>
+                                            <p:strVal val="1+#ppt_h/2"/>
+                                          </p:val>
+                                        </p:tav>
+                                        <p:tav tm="100000">
+                                          <p:val>
+                                            <p:strVal val="#ppt_y"/>
+                                          </p:val>
+                                        </p:tav>
+                                      </p:tavLst>
+                                    </p:anim>
+                                  </p:childTnLst>
+                                </p:cTn>
+                              </p:par>
+                              <p:par>
+                                <p:cTn id="24" presetID="9" presetClass="exit" presetSubtype="0" fill="hold" grpId="1" nodeType="withEffect">
+                                  <p:stCondLst>
+                                    <p:cond delay="0"/>
+                                  </p:stCondLst>
+                                  <p:childTnLst>
+                                    <p:animEffect transition="out" filter="dissolve">
+                                      <p:cBhvr>
+                                        <p:cTn id="25" dur="500"/>
+                                        <p:tgtEl>
+                                          <p:spTgt spid="9"/>
+                                        </p:tgtEl>
+                                      </p:cBhvr>
+                                    </p:animEffect>
+                                    <p:set>
+                                      <p:cBhvr>
+                                        <p:cTn id="26" dur="1" fill="hold">
+                                          <p:stCondLst>
+                                            <p:cond delay="499"/>
+                                          </p:stCondLst>
+                                        </p:cTn>
+                                        <p:tgtEl>
+                                          <p:spTgt spid="9"/>
+                                        </p:tgtEl>
+                                        <p:attrNameLst>
+                                          <p:attrName>style.visibility</p:attrName>
+                                        </p:attrNameLst>
+                                      </p:cBhvr>
+                                      <p:to>
+                                        <p:strVal val="hidden"/>
+                                      </p:to>
+                                    </p:set>
+                                  </p:childTnLst>
+                                </p:cTn>
+                              </p:par>
+                            </p:childTnLst>
+                          </p:cTn>
+                        </p:par>
+                      </p:childTnLst>
+                    </p:cTn>
+                  </p:par>
+                  <p:par>
+                    <p:cTn id="27" fill="hold">
+                      <p:stCondLst>
+                        <p:cond delay="indefinite"/>
+                      </p:stCondLst>
+                      <p:childTnLst>
+                        <p:par>
+                          <p:cTn id="28" fill="hold">
+                            <p:stCondLst>
+                              <p:cond delay="0"/>
+                            </p:stCondLst>
+                            <p:childTnLst>
+                              <p:par>
+                                <p:cTn id="29" presetID="2" presetClass="entr" presetSubtype="4" fill="hold" grpId="0" nodeType="clickEffect">
+                                  <p:stCondLst>
+                                    <p:cond delay="0"/>
+                                  </p:stCondLst>
+                                  <p:childTnLst>
+                                    <p:set>
+                                      <p:cBhvr>
+                                        <p:cTn id="30" dur="1" fill="hold">
+                                          <p:stCondLst>
+                                            <p:cond delay="0"/>
+                                          </p:stCondLst>
+                                        </p:cTn>
+                                        <p:tgtEl>
+                                          <p:spTgt spid="11"/>
+                                        </p:tgtEl>
+                                        <p:attrNameLst>
+                                          <p:attrName>style.visibility</p:attrName>
+                                        </p:attrNameLst>
+                                      </p:cBhvr>
+                                      <p:to>
+                                        <p:strVal val="visible"/>
+                                      </p:to>
+                                    </p:set>
+                                    <p:anim calcmode="lin" valueType="num">
+                                      <p:cBhvr additive="base">
+                                        <p:cTn id="31" dur="500" fill="hold"/>
+                                        <p:tgtEl>
+                                          <p:spTgt spid="11"/>
+                                        </p:tgtEl>
+                                        <p:attrNameLst>
+                                          <p:attrName>ppt_x</p:attrName>
+                                        </p:attrNameLst>
+                                      </p:cBhvr>
+                                      <p:tavLst>
+                                        <p:tav tm="0">
+                                          <p:val>
+                                            <p:strVal val="#ppt_x"/>
+                                          </p:val>
+                                        </p:tav>
+                                        <p:tav tm="100000">
+                                          <p:val>
+                                            <p:strVal val="#ppt_x"/>
+                                          </p:val>
+                                        </p:tav>
+                                      </p:tavLst>
+                                    </p:anim>
+                                    <p:anim calcmode="lin" valueType="num">
+                                      <p:cBhvr additive="base">
+                                        <p:cTn id="32" dur="500" fill="hold"/>
+                                        <p:tgtEl>
+                                          <p:spTgt spid="11"/>
+                                        </p:tgtEl>
+                                        <p:attrNameLst>
+                                          <p:attrName>ppt_y</p:attrName>
+                                        </p:attrNameLst>
+                                      </p:cBhvr>
+                                      <p:tavLst>
+                                        <p:tav tm="0">
+                                          <p:val>
+                                            <p:strVal val="1+#ppt_h/2"/>
+                                          </p:val>
+                                        </p:tav>
+                                        <p:tav tm="100000">
+                                          <p:val>
+                                            <p:strVal val="#ppt_y"/>
+                                          </p:val>
+                                        </p:tav>
+                                      </p:tavLst>
+                                    </p:anim>
+                                  </p:childTnLst>
+                                </p:cTn>
+                              </p:par>
+                              <p:par>
+                                <p:cTn id="33" presetID="9" presetClass="exit" presetSubtype="0" fill="hold" grpId="1" nodeType="withEffect">
+                                  <p:stCondLst>
+                                    <p:cond delay="0"/>
+                                  </p:stCondLst>
+                                  <p:childTnLst>
+                                    <p:animEffect transition="out" filter="dissolve">
+                                      <p:cBhvr>
+                                        <p:cTn id="34" dur="500"/>
+                                        <p:tgtEl>
+                                          <p:spTgt spid="10"/>
+                                        </p:tgtEl>
+                                      </p:cBhvr>
+                                    </p:animEffect>
+                                    <p:set>
+                                      <p:cBhvr>
+                                        <p:cTn id="35" dur="1" fill="hold">
+                                          <p:stCondLst>
+                                            <p:cond delay="499"/>
+                                          </p:stCondLst>
+                                        </p:cTn>
+                                        <p:tgtEl>
+                                          <p:spTgt spid="10"/>
+                                        </p:tgtEl>
+                                        <p:attrNameLst>
+                                          <p:attrName>style.visibility</p:attrName>
+                                        </p:attrNameLst>
+                                      </p:cBhvr>
+                                      <p:to>
+                                        <p:strVal val="hidden"/>
+                                      </p:to>
+                                    </p:set>
+                                  </p:childTnLst>
+                                </p:cTn>
+                              </p:par>
+                            </p:childTnLst>
+                          </p:cTn>
+                        </p:par>
+                      </p:childTnLst>
+                    </p:cTn>
+                  </p:par>
+                  <p:par>
+                    <p:cTn id="36" fill="hold">
+                      <p:stCondLst>
+                        <p:cond delay="indefinite"/>
+                      </p:stCondLst>
+                      <p:childTnLst>
+                        <p:par>
+                          <p:cTn id="37" fill="hold">
+                            <p:stCondLst>
+                              <p:cond delay="0"/>
+                            </p:stCondLst>
+                            <p:childTnLst>
+                              <p:par>
+                                <p:cTn id="38" presetID="2" presetClass="entr" presetSubtype="4" fill="hold" grpId="0" nodeType="clickEffect">
+                                  <p:stCondLst>
+                                    <p:cond delay="0"/>
+                                  </p:stCondLst>
+                                  <p:childTnLst>
+                                    <p:set>
+                                      <p:cBhvr>
+                                        <p:cTn id="39" dur="1" fill="hold">
+                                          <p:stCondLst>
+                                            <p:cond delay="0"/>
+                                          </p:stCondLst>
+                                        </p:cTn>
+                                        <p:tgtEl>
+                                          <p:spTgt spid="12"/>
+                                        </p:tgtEl>
+                                        <p:attrNameLst>
+                                          <p:attrName>style.visibility</p:attrName>
+                                        </p:attrNameLst>
+                                      </p:cBhvr>
+                                      <p:to>
+                                        <p:strVal val="visible"/>
+                                      </p:to>
+                                    </p:set>
+                                    <p:anim calcmode="lin" valueType="num">
+                                      <p:cBhvr additive="base">
+                                        <p:cTn id="40" dur="500" fill="hold"/>
+                                        <p:tgtEl>
+                                          <p:spTgt spid="12"/>
+                                        </p:tgtEl>
+                                        <p:attrNameLst>
+                                          <p:attrName>ppt_x</p:attrName>
+                                        </p:attrNameLst>
+                                      </p:cBhvr>
+                                      <p:tavLst>
+                                        <p:tav tm="0">
+                                          <p:val>
+                                            <p:strVal val="#ppt_x"/>
+                                          </p:val>
+                                        </p:tav>
+                                        <p:tav tm="100000">
+                                          <p:val>
+                                            <p:strVal val="#ppt_x"/>
+                                          </p:val>
+                                        </p:tav>
+                                      </p:tavLst>
+                                    </p:anim>
+                                    <p:anim calcmode="lin" valueType="num">
+                                      <p:cBhvr additive="base">
+                                        <p:cTn id="41" dur="500" fill="hold"/>
+                                        <p:tgtEl>
+                                          <p:spTgt spid="12"/>
+                                        </p:tgtEl>
+                                        <p:attrNameLst>
+                                          <p:attrName>ppt_y</p:attrName>
+                                        </p:attrNameLst>
+                                      </p:cBhvr>
+                                      <p:tavLst>
+                                        <p:tav tm="0">
+                                          <p:val>
+                                            <p:strVal val="1+#ppt_h/2"/>
+                                          </p:val>
+                                        </p:tav>
+                                        <p:tav tm="100000">
+                                          <p:val>
+                                            <p:strVal val="#ppt_y"/>
+                                          </p:val>
+                                        </p:tav>
+                                      </p:tavLst>
+                                    </p:anim>
+                                  </p:childTnLst>
+                                </p:cTn>
+                              </p:par>
+                              <p:par>
+                                <p:cTn id="42" presetID="9" presetClass="exit" presetSubtype="0" fill="hold" grpId="1" nodeType="withEffect">
+                                  <p:stCondLst>
+                                    <p:cond delay="0"/>
+                                  </p:stCondLst>
+                                  <p:childTnLst>
+                                    <p:animEffect transition="out" filter="dissolve">
+                                      <p:cBhvr>
+                                        <p:cTn id="43" dur="500"/>
+                                        <p:tgtEl>
+                                          <p:spTgt spid="11"/>
+                                        </p:tgtEl>
+                                      </p:cBhvr>
+                                    </p:animEffect>
+                                    <p:set>
+                                      <p:cBhvr>
+                                        <p:cTn id="44" dur="1" fill="hold">
+                                          <p:stCondLst>
+                                            <p:cond delay="499"/>
+                                          </p:stCondLst>
+                                        </p:cTn>
+                                        <p:tgtEl>
+                                          <p:spTgt spid="11"/>
+                                        </p:tgtEl>
+                                        <p:attrNameLst>
+                                          <p:attrName>style.visibility</p:attrName>
+                                        </p:attrNameLst>
+                                      </p:cBhvr>
+                                      <p:to>
+                                        <p:strVal val="hidden"/>
+                                      </p:to>
+                                    </p:set>
+                                  </p:childTnLst>
+                                </p:cTn>
+                              </p:par>
+                              <p:par>
+                                <p:cTn id="45" presetID="9" presetClass="exit" presetSubtype="0" fill="hold" nodeType="withEffect">
+                                  <p:stCondLst>
+                                    <p:cond delay="0"/>
+                                  </p:stCondLst>
+                                  <p:childTnLst>
+                                    <p:animEffect transition="out" filter="dissolve">
+                                      <p:cBhvr>
+                                        <p:cTn id="46" dur="500"/>
+                                        <p:tgtEl>
+                                          <p:spTgt spid="5"/>
+                                        </p:tgtEl>
+                                      </p:cBhvr>
+                                    </p:animEffect>
+                                    <p:set>
+                                      <p:cBhvr>
+                                        <p:cTn id="47" dur="1" fill="hold">
+                                          <p:stCondLst>
+                                            <p:cond delay="499"/>
+                                          </p:stCondLst>
+                                        </p:cTn>
+                                        <p:tgtEl>
+                                          <p:spTgt spid="5"/>
+                                        </p:tgtEl>
+                                        <p:attrNameLst>
+                                          <p:attrName>style.visibility</p:attrName>
+                                        </p:attrNameLst>
+                                      </p:cBhvr>
+                                      <p:to>
+                                        <p:strVal val="hidden"/>
+                                      </p:to>
+                                    </p:set>
+                                  </p:childTnLst>
+                                </p:cTn>
+                              </p:par>
+                            </p:childTnLst>
+                          </p:cTn>
+                        </p:par>
+                      </p:childTnLst>
+                    </p:cTn>
+                  </p:par>
+                </p:childTnLst>
+              </p:cTn>
+              <p:prevCondLst>
+                <p:cond evt="onPrev" delay="0">
+                  <p:tgtEl>
+                    <p:sldTgt/>
+                  </p:tgtEl>
+                </p:cond>
+              </p:prevCondLst>
+              <p:nextCondLst>
+                <p:cond evt="onNext" delay="0">
+                  <p:tgtEl>
+                    <p:sldTgt/>
+                  </p:tgtEl>
+                </p:cond>
+              </p:nextCondLst>
+            </p:seq>
+          </p:childTnLst>
+        </p:cTn>
+      </p:par>
+    </p:tnLst>
+    <p:bldLst>
+      <p:bldP spid="8" grpId="0" animBg="1"/>
+      <p:bldP spid="8" grpId="1" animBg="1"/>
+      <p:bldP spid="9" grpId="0" animBg="1"/>
+      <p:bldP spid="9" grpId="1" animBg="1"/>
+      <p:bldP spid="10" grpId="0" animBg="1"/>
+      <p:bldP spid="10" grpId="1" animBg="1"/>
+      <p:bldP spid="11" grpId="0" animBg="1"/>
+      <p:bldP spid="11" grpId="1" animBg="1"/>
+      <p:bldP spid="12" grpId="0" animBg="1"/>
+    </p:bldLst>
+  </p:timing>
+</p:sld>
+</file>
+
+<file path=ppt/slides/slide19.xml><?xml version="1.0" encoding="utf-8"?>
+<p:sld xmlns:a="http://schemas.openxmlformats.org/drawingml/2006/main" xmlns:r="http://schemas.openxmlformats.org/officeDocument/2006/relationships" xmlns:p="http://schemas.openxmlformats.org/presentationml/2006/main">
+  <p:cSld>
+    <p:spTree>
+      <p:nvGrpSpPr>
+        <p:cNvPr id="1" name=""/>
+        <p:cNvGrpSpPr/>
+        <p:nvPr/>
+      </p:nvGrpSpPr>
+      <p:grpSpPr>
+        <a:xfrm>
+          <a:off x="0" y="0"/>
+          <a:ext cx="0" cy="0"/>
+          <a:chOff x="0" y="0"/>
+          <a:chExt cx="0" cy="0"/>
+        </a:xfrm>
+      </p:grpSpPr>
+      <p:sp>
+        <p:nvSpPr>
+          <p:cNvPr id="2" name="Title 1"/>
+          <p:cNvSpPr>
+            <a:spLocks noGrp="1"/>
+          </p:cNvSpPr>
+          <p:nvPr>
+            <p:ph type="title"/>
+          </p:nvPr>
+        </p:nvSpPr>
+        <p:spPr/>
+        <p:txBody>
+          <a:bodyPr/>
+          <a:lstStyle/>
+          <a:p>
+            <a:r>
+              <a:rPr lang="en-US" dirty="0" smtClean="0"/>
+              <a:t>Commands</a:t>
+            </a:r>
+            <a:endParaRPr lang="en-US" dirty="0"/>
+          </a:p>
+        </p:txBody>
+      </p:sp>
+      <p:sp>
+        <p:nvSpPr>
+          <p:cNvPr id="3" name="Content Placeholder 2"/>
+          <p:cNvSpPr>
+            <a:spLocks noGrp="1"/>
+          </p:cNvSpPr>
+          <p:nvPr>
+            <p:ph idx="1"/>
+          </p:nvPr>
+        </p:nvSpPr>
+        <p:spPr/>
+        <p:txBody>
+          <a:bodyPr/>
+          <a:lstStyle/>
+          <a:p>
+            <a:r>
               <a:rPr lang="en-US" dirty="0" smtClean="0"/>
               <a:t>Built-in commands</a:t>
             </a:r>
@@ -12914,12 +14473,13 @@
             <a:endParaRPr lang="en-US" dirty="0" smtClean="0"/>
           </a:p>
           <a:p>
-            <a:endParaRPr lang="en-US" dirty="0" smtClean="0"/>
-          </a:p>
-          <a:p>
             <a:r>
               <a:rPr lang="en-US" dirty="0" smtClean="0"/>
-              <a:t>To see available shortcuts:</a:t>
+              <a:t>To see available </a:t>
+            </a:r>
+            <a:r>
+              <a:rPr lang="en-US" dirty="0" smtClean="0"/>
+              <a:t>commands:</a:t>
             </a:r>
             <a:endParaRPr lang="en-US" dirty="0"/>
           </a:p>
@@ -12927,18 +14487,56 @@
             <a:pPr lvl="1"/>
             <a:r>
               <a:rPr lang="en-US" dirty="0" smtClean="0"/>
-              <a:t>Help, Key Assist…</a:t>
+              <a:t>Right</a:t>
+            </a:r>
+            <a:r>
+              <a:rPr lang="en-US" dirty="0" smtClean="0"/>
+              <a:t>-click, choose Commands </a:t>
+            </a:r>
+            <a:r>
+              <a:rPr lang="en-US" dirty="0" smtClean="0"/>
+              <a:t/>
+            </a:r>
+            <a:br>
+              <a:rPr lang="en-US" dirty="0" smtClean="0"/>
+            </a:br>
+            <a:r>
+              <a:rPr lang="en-US" dirty="0" smtClean="0"/>
+              <a:t>and </a:t>
+            </a:r>
+            <a:r>
+              <a:rPr lang="en-US" dirty="0" smtClean="0"/>
+              <a:t>explore </a:t>
+            </a:r>
+            <a:r>
+              <a:rPr lang="en-US" dirty="0" smtClean="0"/>
+              <a:t>submenus</a:t>
             </a:r>
           </a:p>
           <a:p>
             <a:pPr lvl="1"/>
+            <a:endParaRPr lang="en-US" dirty="0"/>
+          </a:p>
+          <a:p>
             <a:r>
               <a:rPr lang="en-US" dirty="0" smtClean="0"/>
-              <a:t>Right-click, choose </a:t>
-            </a:r>
+              <a:t>Many have shortcuts</a:t>
+            </a:r>
+            <a:endParaRPr lang="en-US" dirty="0"/>
+          </a:p>
+          <a:p>
+            <a:pPr marL="800100" lvl="2" indent="-342900"/>
             <a:r>
               <a:rPr lang="en-US" dirty="0" smtClean="0"/>
-              <a:t>Commands and explore submenus</a:t>
+              <a:t>See more by choosing Help</a:t>
+            </a:r>
+            <a:r>
+              <a:rPr lang="en-US" dirty="0"/>
+              <a:t>, Key Assist</a:t>
+            </a:r>
+            <a:r>
+              <a:rPr lang="en-US" dirty="0" smtClean="0"/>
+              <a:t>…</a:t>
             </a:r>
             <a:endParaRPr lang="en-US" dirty="0"/>
           </a:p>
@@ -12965,7 +14563,7 @@
         </p:blipFill>
         <p:spPr>
           <a:xfrm>
-            <a:off x="3653320" y="1670401"/>
+            <a:off x="3599848" y="1911025"/>
             <a:ext cx="5140424" cy="721360"/>
           </a:xfrm>
           <a:prstGeom prst="rect">
@@ -13005,7 +14603,7 @@
         </p:blipFill>
         <p:spPr>
           <a:xfrm>
-            <a:off x="5283736" y="2264293"/>
+            <a:off x="5230264" y="2504917"/>
             <a:ext cx="3596640" cy="1910080"/>
           </a:xfrm>
           <a:prstGeom prst="rect">
@@ -13033,7 +14631,7 @@
         </p:nvSpPr>
         <p:spPr bwMode="auto">
           <a:xfrm>
-            <a:off x="4689131" y="3942461"/>
+            <a:off x="5181090" y="1413040"/>
             <a:ext cx="3572550" cy="461665"/>
           </a:xfrm>
           <a:prstGeom prst="rect">
@@ -13093,217 +14691,13 @@
   <p:clrMapOvr>
     <a:masterClrMapping/>
   </p:clrMapOvr>
-</p:sld>
-</file>
-
-<file path=ppt/slides/slide19.xml><?xml version="1.0" encoding="utf-8"?>
-<p:sld xmlns:a="http://schemas.openxmlformats.org/drawingml/2006/main" xmlns:r="http://schemas.openxmlformats.org/officeDocument/2006/relationships" xmlns:p="http://schemas.openxmlformats.org/presentationml/2006/main">
-  <p:cSld>
-    <p:spTree>
-      <p:nvGrpSpPr>
-        <p:cNvPr id="1" name=""/>
-        <p:cNvGrpSpPr/>
-        <p:nvPr/>
-      </p:nvGrpSpPr>
-      <p:grpSpPr>
-        <a:xfrm>
-          <a:off x="0" y="0"/>
-          <a:ext cx="0" cy="0"/>
-          <a:chOff x="0" y="0"/>
-          <a:chExt cx="0" cy="0"/>
-        </a:xfrm>
-      </p:grpSpPr>
-      <p:sp>
-        <p:nvSpPr>
-          <p:cNvPr id="55297" name="Title 1"/>
-          <p:cNvSpPr>
-            <a:spLocks noGrp="1"/>
-          </p:cNvSpPr>
-          <p:nvPr>
-            <p:ph type="title"/>
-          </p:nvPr>
-        </p:nvSpPr>
-        <p:spPr>
-          <a:xfrm>
-            <a:off x="457200" y="204788"/>
-            <a:ext cx="8229600" cy="809625"/>
-          </a:xfrm>
-        </p:spPr>
-        <p:txBody>
-          <a:bodyPr/>
-          <a:lstStyle/>
-          <a:p>
-            <a:pPr eaLnBrk="1" hangingPunct="1"/>
-            <a:r>
-              <a:rPr lang="en-US" dirty="0">
-                <a:latin typeface="Trebuchet MS" charset="0"/>
-              </a:rPr>
-              <a:t>Extending and maintaining Ti Studio</a:t>
-            </a:r>
-          </a:p>
-        </p:txBody>
-      </p:sp>
-      <p:sp>
-        <p:nvSpPr>
-          <p:cNvPr id="55298" name="Content Placeholder 2"/>
-          <p:cNvSpPr>
-            <a:spLocks noGrp="1"/>
-          </p:cNvSpPr>
-          <p:nvPr>
-            <p:ph idx="1"/>
-          </p:nvPr>
-        </p:nvSpPr>
-        <p:spPr/>
-        <p:txBody>
-          <a:bodyPr/>
-          <a:lstStyle/>
-          <a:p>
-            <a:pPr marL="0" indent="0" eaLnBrk="1" hangingPunct="1"/>
-            <a:r>
-              <a:rPr lang="en-US" dirty="0" smtClean="0">
-                <a:latin typeface="Trebuchet MS" charset="0"/>
-              </a:rPr>
-              <a:t>Titanium API updates: </a:t>
-            </a:r>
-          </a:p>
-          <a:p>
-            <a:pPr marL="114300" lvl="1" eaLnBrk="1" hangingPunct="1"/>
-            <a:r>
-              <a:rPr lang="en-US" dirty="0">
-                <a:latin typeface="Trebuchet MS" charset="0"/>
-              </a:rPr>
-              <a:t>	</a:t>
-            </a:r>
-            <a:r>
-              <a:rPr lang="en-US" dirty="0" smtClean="0">
-                <a:latin typeface="Trebuchet MS" charset="0"/>
-              </a:rPr>
-              <a:t>(Released APIs) </a:t>
-            </a:r>
-            <a:r>
-              <a:rPr lang="en-US" dirty="0" smtClean="0">
-                <a:latin typeface="Trebuchet MS" charset="0"/>
-              </a:rPr>
-              <a:t>Help &gt; Check for Titanium SDK Updates</a:t>
-            </a:r>
-          </a:p>
-          <a:p>
-            <a:pPr marL="114300" lvl="1" eaLnBrk="1" hangingPunct="1"/>
-            <a:r>
-              <a:rPr lang="en-US" dirty="0">
-                <a:latin typeface="Trebuchet MS" charset="0"/>
-              </a:rPr>
-              <a:t>	</a:t>
-            </a:r>
-            <a:r>
-              <a:rPr lang="en-US" dirty="0" smtClean="0">
-                <a:latin typeface="Trebuchet MS" charset="0"/>
-              </a:rPr>
-              <a:t>(CI builds) Help &gt; Install Titanium SDK from URL</a:t>
-            </a:r>
-            <a:endParaRPr lang="en-US" dirty="0" smtClean="0">
-              <a:latin typeface="Trebuchet MS" charset="0"/>
-            </a:endParaRPr>
-          </a:p>
-          <a:p>
-            <a:pPr marL="0" indent="0" eaLnBrk="1" hangingPunct="1"/>
-            <a:endParaRPr lang="en-US" dirty="0">
-              <a:latin typeface="Trebuchet MS" charset="0"/>
-            </a:endParaRPr>
-          </a:p>
-          <a:p>
-            <a:pPr marL="0" indent="0" eaLnBrk="1" hangingPunct="1"/>
-            <a:r>
-              <a:rPr lang="en-US" dirty="0" smtClean="0">
-                <a:latin typeface="Trebuchet MS" charset="0"/>
-              </a:rPr>
-              <a:t>Titanium Studio updates:</a:t>
-            </a:r>
-          </a:p>
-          <a:p>
-            <a:pPr marL="114300" lvl="1" eaLnBrk="1" hangingPunct="1"/>
-            <a:r>
-              <a:rPr lang="en-US" dirty="0" smtClean="0">
-                <a:latin typeface="Trebuchet MS" charset="0"/>
-              </a:rPr>
-              <a:t>	Help &gt; Check for Updates</a:t>
-            </a:r>
-            <a:endParaRPr lang="en-US" dirty="0">
-              <a:latin typeface="Trebuchet MS" charset="0"/>
-            </a:endParaRPr>
-          </a:p>
-          <a:p>
-            <a:pPr marL="0" indent="0" eaLnBrk="1" hangingPunct="1"/>
-            <a:endParaRPr lang="en-US" dirty="0" smtClean="0">
-              <a:latin typeface="Trebuchet MS" charset="0"/>
-            </a:endParaRPr>
-          </a:p>
-          <a:p>
-            <a:pPr marL="0" indent="0" eaLnBrk="1" hangingPunct="1"/>
-            <a:r>
-              <a:rPr lang="en-US" dirty="0" smtClean="0">
-                <a:latin typeface="Trebuchet MS" charset="0"/>
-              </a:rPr>
-              <a:t>Add</a:t>
-            </a:r>
-            <a:r>
-              <a:rPr lang="en-US" dirty="0">
-                <a:latin typeface="Trebuchet MS" charset="0"/>
-              </a:rPr>
-              <a:t>-ons – e.g. SVN </a:t>
-            </a:r>
-            <a:r>
-              <a:rPr lang="en-US" dirty="0" smtClean="0">
-                <a:latin typeface="Trebuchet MS" charset="0"/>
-              </a:rPr>
-              <a:t>tools:</a:t>
-            </a:r>
-          </a:p>
-          <a:p>
-            <a:pPr marL="114300" lvl="1" eaLnBrk="1" hangingPunct="1"/>
-            <a:r>
-              <a:rPr lang="en-US" dirty="0" smtClean="0">
-                <a:latin typeface="Trebuchet MS" charset="0"/>
-              </a:rPr>
-              <a:t>	Help &gt; Install New Software</a:t>
-            </a:r>
-            <a:br>
-              <a:rPr lang="en-US" dirty="0" smtClean="0">
-                <a:latin typeface="Trebuchet MS" charset="0"/>
-              </a:rPr>
-            </a:br>
-            <a:r>
-              <a:rPr lang="en-US" dirty="0" smtClean="0">
-                <a:latin typeface="Trebuchet MS" charset="0"/>
-              </a:rPr>
-              <a:t>	Click Available Sites, enable download sites</a:t>
-            </a:r>
-          </a:p>
-          <a:p>
-            <a:pPr marL="114300" lvl="1" eaLnBrk="1" hangingPunct="1"/>
-            <a:r>
-              <a:rPr lang="en-US" dirty="0">
-                <a:latin typeface="Trebuchet MS" charset="0"/>
-              </a:rPr>
-              <a:t>	</a:t>
-            </a:r>
-            <a:r>
-              <a:rPr lang="en-US" dirty="0" smtClean="0">
-                <a:latin typeface="Trebuchet MS" charset="0"/>
-              </a:rPr>
-              <a:t>Download and install via the wizard</a:t>
-            </a:r>
-            <a:endParaRPr lang="en-US" dirty="0">
-              <a:latin typeface="Trebuchet MS" charset="0"/>
-            </a:endParaRPr>
-          </a:p>
-        </p:txBody>
-      </p:sp>
-    </p:spTree>
-  </p:cSld>
-  <p:clrMapOvr>
-    <a:masterClrMapping/>
-  </p:clrMapOvr>
+  <p:timing>
+    <p:tnLst>
+      <p:par>
+        <p:cTn xmlns:p14="http://schemas.microsoft.com/office/powerpoint/2010/main" id="1" dur="indefinite" restart="never" nodeType="tmRoot"/>
+      </p:par>
+    </p:tnLst>
+  </p:timing>
 </p:sld>
 </file>
 
@@ -13448,6 +14842,564 @@
 </file>
 
 <file path=ppt/slides/slide20.xml><?xml version="1.0" encoding="utf-8"?>
+<p:sld xmlns:a="http://schemas.openxmlformats.org/drawingml/2006/main" xmlns:r="http://schemas.openxmlformats.org/officeDocument/2006/relationships" xmlns:p="http://schemas.openxmlformats.org/presentationml/2006/main">
+  <p:cSld>
+    <p:spTree>
+      <p:nvGrpSpPr>
+        <p:cNvPr id="1" name=""/>
+        <p:cNvGrpSpPr/>
+        <p:nvPr/>
+      </p:nvGrpSpPr>
+      <p:grpSpPr>
+        <a:xfrm>
+          <a:off x="0" y="0"/>
+          <a:ext cx="0" cy="0"/>
+          <a:chOff x="0" y="0"/>
+          <a:chExt cx="0" cy="0"/>
+        </a:xfrm>
+      </p:grpSpPr>
+      <p:sp>
+        <p:nvSpPr>
+          <p:cNvPr id="2" name="Title 1"/>
+          <p:cNvSpPr>
+            <a:spLocks noGrp="1"/>
+          </p:cNvSpPr>
+          <p:nvPr>
+            <p:ph type="title"/>
+          </p:nvPr>
+        </p:nvSpPr>
+        <p:spPr/>
+        <p:txBody>
+          <a:bodyPr/>
+          <a:lstStyle/>
+          <a:p>
+            <a:r>
+              <a:rPr lang="en-US" dirty="0" smtClean="0"/>
+              <a:t>Snippets</a:t>
+            </a:r>
+            <a:endParaRPr lang="en-US" dirty="0"/>
+          </a:p>
+        </p:txBody>
+      </p:sp>
+      <p:sp>
+        <p:nvSpPr>
+          <p:cNvPr id="3" name="Content Placeholder 2"/>
+          <p:cNvSpPr>
+            <a:spLocks noGrp="1"/>
+          </p:cNvSpPr>
+          <p:nvPr>
+            <p:ph idx="1"/>
+          </p:nvPr>
+        </p:nvSpPr>
+        <p:spPr/>
+        <p:txBody>
+          <a:bodyPr/>
+          <a:lstStyle/>
+          <a:p>
+            <a:r>
+              <a:rPr lang="en-US" dirty="0" smtClean="0"/>
+              <a:t>Show up within code assist</a:t>
+            </a:r>
+          </a:p>
+          <a:p>
+            <a:endParaRPr lang="en-US" dirty="0"/>
+          </a:p>
+          <a:p>
+            <a:r>
+              <a:rPr lang="en-US" dirty="0" smtClean="0"/>
+              <a:t>Need to create a bundle to contain your snippet</a:t>
+            </a:r>
+          </a:p>
+          <a:p>
+            <a:endParaRPr lang="en-US" dirty="0"/>
+          </a:p>
+          <a:p>
+            <a:r>
+              <a:rPr lang="en-US" dirty="0" smtClean="0"/>
+              <a:t>Wiki for how-to info:</a:t>
+            </a:r>
+          </a:p>
+          <a:p>
+            <a:pPr lvl="1"/>
+            <a:r>
+              <a:rPr lang="en-US" dirty="0"/>
+              <a:t>http://</a:t>
+            </a:r>
+            <a:r>
+              <a:rPr lang="en-US" dirty="0" err="1"/>
+              <a:t>wiki.appcelerator.org</a:t>
+            </a:r>
+            <a:r>
+              <a:rPr lang="en-US" dirty="0"/>
+              <a:t>/display/tis/</a:t>
+            </a:r>
+            <a:r>
+              <a:rPr lang="en-US" dirty="0" err="1"/>
+              <a:t>Creating+a+new+snippet</a:t>
+            </a:r>
+            <a:endParaRPr lang="en-US" dirty="0"/>
+          </a:p>
+        </p:txBody>
+      </p:sp>
+    </p:spTree>
+    <p:extLst>
+      <p:ext uri="{BB962C8B-B14F-4D97-AF65-F5344CB8AC3E}">
+        <p14:creationId xmlns:p14="http://schemas.microsoft.com/office/powerpoint/2010/main" val="2709828331"/>
+      </p:ext>
+    </p:extLst>
+  </p:cSld>
+  <p:clrMapOvr>
+    <a:masterClrMapping/>
+  </p:clrMapOvr>
+  <p:timing>
+    <p:tnLst>
+      <p:par>
+        <p:cTn xmlns:p14="http://schemas.microsoft.com/office/powerpoint/2010/main" id="1" dur="indefinite" restart="never" nodeType="tmRoot"/>
+      </p:par>
+    </p:tnLst>
+  </p:timing>
+</p:sld>
+</file>
+
+<file path=ppt/slides/slide21.xml><?xml version="1.0" encoding="utf-8"?>
+<p:sld xmlns:a="http://schemas.openxmlformats.org/drawingml/2006/main" xmlns:r="http://schemas.openxmlformats.org/officeDocument/2006/relationships" xmlns:p="http://schemas.openxmlformats.org/presentationml/2006/main">
+  <p:cSld>
+    <p:spTree>
+      <p:nvGrpSpPr>
+        <p:cNvPr id="1" name=""/>
+        <p:cNvGrpSpPr/>
+        <p:nvPr/>
+      </p:nvGrpSpPr>
+      <p:grpSpPr>
+        <a:xfrm>
+          <a:off x="0" y="0"/>
+          <a:ext cx="0" cy="0"/>
+          <a:chOff x="0" y="0"/>
+          <a:chExt cx="0" cy="0"/>
+        </a:xfrm>
+      </p:grpSpPr>
+      <p:sp>
+        <p:nvSpPr>
+          <p:cNvPr id="2" name="Title 1"/>
+          <p:cNvSpPr>
+            <a:spLocks noGrp="1"/>
+          </p:cNvSpPr>
+          <p:nvPr>
+            <p:ph type="title"/>
+          </p:nvPr>
+        </p:nvSpPr>
+        <p:spPr/>
+        <p:txBody>
+          <a:bodyPr/>
+          <a:lstStyle/>
+          <a:p>
+            <a:r>
+              <a:rPr lang="en-US" dirty="0" smtClean="0"/>
+              <a:t>Bundles and Rubles</a:t>
+            </a:r>
+            <a:endParaRPr lang="en-US" dirty="0"/>
+          </a:p>
+        </p:txBody>
+      </p:sp>
+      <p:sp>
+        <p:nvSpPr>
+          <p:cNvPr id="3" name="Content Placeholder 2"/>
+          <p:cNvSpPr>
+            <a:spLocks noGrp="1"/>
+          </p:cNvSpPr>
+          <p:nvPr>
+            <p:ph idx="1"/>
+          </p:nvPr>
+        </p:nvSpPr>
+        <p:spPr/>
+        <p:txBody>
+          <a:bodyPr/>
+          <a:lstStyle/>
+          <a:p>
+            <a:r>
+              <a:rPr lang="en-US" dirty="0" smtClean="0"/>
+              <a:t>Built-in bundles</a:t>
+            </a:r>
+          </a:p>
+          <a:p>
+            <a:endParaRPr lang="en-US" dirty="0"/>
+          </a:p>
+          <a:p>
+            <a:r>
+              <a:rPr lang="en-US" dirty="0" smtClean="0"/>
+              <a:t>Import </a:t>
+            </a:r>
+            <a:r>
+              <a:rPr lang="en-US" dirty="0" err="1" smtClean="0"/>
+              <a:t>TextMate</a:t>
+            </a:r>
+            <a:r>
+              <a:rPr lang="en-US" dirty="0" smtClean="0"/>
+              <a:t> bundles</a:t>
+            </a:r>
+          </a:p>
+          <a:p>
+            <a:pPr lvl="1">
+              <a:buFont typeface="Arial"/>
+              <a:buChar char="•"/>
+            </a:pPr>
+            <a:r>
+              <a:rPr lang="en-US" dirty="0" smtClean="0"/>
+              <a:t> </a:t>
+            </a:r>
+            <a:r>
+              <a:rPr lang="en-US" dirty="0" smtClean="0">
+                <a:hlinkClick r:id="rId3"/>
+              </a:rPr>
+              <a:t>http</a:t>
+            </a:r>
+            <a:r>
+              <a:rPr lang="en-US" dirty="0">
+                <a:hlinkClick r:id="rId3"/>
+              </a:rPr>
+              <a:t>://manual.macromates.com/en/</a:t>
+            </a:r>
+            <a:r>
+              <a:rPr lang="en-US" dirty="0" smtClean="0">
+                <a:hlinkClick r:id="rId3"/>
+              </a:rPr>
+              <a:t>bundles</a:t>
+            </a:r>
+            <a:endParaRPr lang="en-US" dirty="0" smtClean="0"/>
+          </a:p>
+          <a:p>
+            <a:pPr lvl="1">
+              <a:buFont typeface="Arial"/>
+              <a:buChar char="•"/>
+            </a:pPr>
+            <a:r>
+              <a:rPr lang="en-US" dirty="0" smtClean="0"/>
+              <a:t> </a:t>
+            </a:r>
+            <a:r>
+              <a:rPr lang="en-US" dirty="0" smtClean="0">
+                <a:hlinkClick r:id="rId4"/>
+              </a:rPr>
+              <a:t>http</a:t>
+            </a:r>
+            <a:r>
+              <a:rPr lang="en-US" dirty="0">
+                <a:hlinkClick r:id="rId4"/>
+              </a:rPr>
+              <a:t>://svn.textmate.org/trunk/Bundles</a:t>
+            </a:r>
+            <a:r>
+              <a:rPr lang="en-US" dirty="0" smtClean="0">
+                <a:hlinkClick r:id="rId4"/>
+              </a:rPr>
+              <a:t>/</a:t>
+            </a:r>
+            <a:endParaRPr lang="en-US" dirty="0" smtClean="0"/>
+          </a:p>
+          <a:p>
+            <a:endParaRPr lang="en-US" dirty="0"/>
+          </a:p>
+          <a:p>
+            <a:r>
+              <a:rPr lang="en-US" dirty="0" smtClean="0"/>
+              <a:t>Import Rubles</a:t>
+            </a:r>
+          </a:p>
+          <a:p>
+            <a:pPr lvl="1">
+              <a:buFont typeface="Arial"/>
+              <a:buChar char="•"/>
+            </a:pPr>
+            <a:r>
+              <a:rPr lang="en-US" dirty="0" smtClean="0"/>
+              <a:t> “Official</a:t>
+            </a:r>
+            <a:r>
+              <a:rPr lang="en-US" dirty="0"/>
+              <a:t>” rubles - </a:t>
+            </a:r>
+            <a:r>
+              <a:rPr lang="en-US" dirty="0">
+                <a:hlinkClick r:id="rId5"/>
+              </a:rPr>
+              <a:t>https://github.com/</a:t>
+            </a:r>
+            <a:r>
+              <a:rPr lang="en-US" dirty="0" smtClean="0">
+                <a:hlinkClick r:id="rId5"/>
+              </a:rPr>
+              <a:t>aptana</a:t>
+            </a:r>
+            <a:endParaRPr lang="en-US" dirty="0" smtClean="0"/>
+          </a:p>
+          <a:p>
+            <a:endParaRPr lang="en-US" dirty="0"/>
+          </a:p>
+          <a:p>
+            <a:r>
+              <a:rPr lang="en-US" dirty="0" smtClean="0"/>
+              <a:t>Writing your own, see the wiki</a:t>
+            </a:r>
+          </a:p>
+          <a:p>
+            <a:pPr lvl="1">
+              <a:buFont typeface="Arial"/>
+              <a:buChar char="•"/>
+            </a:pPr>
+            <a:r>
+              <a:rPr lang="en-US" dirty="0"/>
+              <a:t> </a:t>
+            </a:r>
+            <a:r>
+              <a:rPr lang="en-US" dirty="0">
+                <a:hlinkClick r:id="rId6"/>
+              </a:rPr>
+              <a:t>http://wiki.appcelerator.org/display/tis/Creating+a+new+</a:t>
+            </a:r>
+            <a:r>
+              <a:rPr lang="en-US" dirty="0" smtClean="0">
+                <a:hlinkClick r:id="rId6"/>
+              </a:rPr>
+              <a:t>Ruble</a:t>
+            </a:r>
+            <a:endParaRPr lang="en-US" dirty="0" smtClean="0"/>
+          </a:p>
+          <a:p>
+            <a:pPr lvl="1"/>
+            <a:endParaRPr lang="en-US" dirty="0"/>
+          </a:p>
+        </p:txBody>
+      </p:sp>
+    </p:spTree>
+    <p:extLst>
+      <p:ext uri="{BB962C8B-B14F-4D97-AF65-F5344CB8AC3E}">
+        <p14:creationId xmlns:p14="http://schemas.microsoft.com/office/powerpoint/2010/main" val="573573471"/>
+      </p:ext>
+    </p:extLst>
+  </p:cSld>
+  <p:clrMapOvr>
+    <a:masterClrMapping/>
+  </p:clrMapOvr>
+  <p:timing>
+    <p:tnLst>
+      <p:par>
+        <p:cTn xmlns:p14="http://schemas.microsoft.com/office/powerpoint/2010/main" id="1" dur="indefinite" restart="never" nodeType="tmRoot"/>
+      </p:par>
+    </p:tnLst>
+  </p:timing>
+</p:sld>
+</file>
+
+<file path=ppt/slides/slide22.xml><?xml version="1.0" encoding="utf-8"?>
+<p:sld xmlns:a="http://schemas.openxmlformats.org/drawingml/2006/main" xmlns:r="http://schemas.openxmlformats.org/officeDocument/2006/relationships" xmlns:p="http://schemas.openxmlformats.org/presentationml/2006/main">
+  <p:cSld>
+    <p:spTree>
+      <p:nvGrpSpPr>
+        <p:cNvPr id="1" name=""/>
+        <p:cNvGrpSpPr/>
+        <p:nvPr/>
+      </p:nvGrpSpPr>
+      <p:grpSpPr>
+        <a:xfrm>
+          <a:off x="0" y="0"/>
+          <a:ext cx="0" cy="0"/>
+          <a:chOff x="0" y="0"/>
+          <a:chExt cx="0" cy="0"/>
+        </a:xfrm>
+      </p:grpSpPr>
+      <p:sp>
+        <p:nvSpPr>
+          <p:cNvPr id="55297" name="Title 1"/>
+          <p:cNvSpPr>
+            <a:spLocks noGrp="1"/>
+          </p:cNvSpPr>
+          <p:nvPr>
+            <p:ph type="title"/>
+          </p:nvPr>
+        </p:nvSpPr>
+        <p:spPr>
+          <a:xfrm>
+            <a:off x="457200" y="204788"/>
+            <a:ext cx="8229600" cy="809625"/>
+          </a:xfrm>
+        </p:spPr>
+        <p:txBody>
+          <a:bodyPr/>
+          <a:lstStyle/>
+          <a:p>
+            <a:pPr eaLnBrk="1" hangingPunct="1"/>
+            <a:r>
+              <a:rPr lang="en-US" dirty="0">
+                <a:latin typeface="Trebuchet MS" charset="0"/>
+              </a:rPr>
+              <a:t>Extending and maintaining Ti Studio</a:t>
+            </a:r>
+          </a:p>
+        </p:txBody>
+      </p:sp>
+      <p:sp>
+        <p:nvSpPr>
+          <p:cNvPr id="55298" name="Content Placeholder 2"/>
+          <p:cNvSpPr>
+            <a:spLocks noGrp="1"/>
+          </p:cNvSpPr>
+          <p:nvPr>
+            <p:ph idx="1"/>
+          </p:nvPr>
+        </p:nvSpPr>
+        <p:spPr/>
+        <p:txBody>
+          <a:bodyPr/>
+          <a:lstStyle/>
+          <a:p>
+            <a:pPr marL="0" indent="0" eaLnBrk="1" hangingPunct="1"/>
+            <a:r>
+              <a:rPr lang="en-US" dirty="0" smtClean="0">
+                <a:latin typeface="Trebuchet MS" charset="0"/>
+              </a:rPr>
+              <a:t>Titanium API updates: </a:t>
+            </a:r>
+          </a:p>
+          <a:p>
+            <a:pPr marL="114300" lvl="1" eaLnBrk="1" hangingPunct="1"/>
+            <a:r>
+              <a:rPr lang="en-US" dirty="0">
+                <a:latin typeface="Trebuchet MS" charset="0"/>
+              </a:rPr>
+              <a:t>	</a:t>
+            </a:r>
+            <a:r>
+              <a:rPr lang="en-US" dirty="0" smtClean="0">
+                <a:latin typeface="Trebuchet MS" charset="0"/>
+              </a:rPr>
+              <a:t>(Released APIs) Help &gt; Check for Titanium SDK Updates</a:t>
+            </a:r>
+          </a:p>
+          <a:p>
+            <a:pPr marL="114300" lvl="1" eaLnBrk="1" hangingPunct="1"/>
+            <a:r>
+              <a:rPr lang="en-US" dirty="0">
+                <a:latin typeface="Trebuchet MS" charset="0"/>
+              </a:rPr>
+              <a:t>	</a:t>
+            </a:r>
+            <a:r>
+              <a:rPr lang="en-US" dirty="0" smtClean="0">
+                <a:latin typeface="Trebuchet MS" charset="0"/>
+              </a:rPr>
+              <a:t>(CI builds) Help &gt; Install Titanium SDK from URL</a:t>
+            </a:r>
+          </a:p>
+          <a:p>
+            <a:pPr marL="0" indent="0" eaLnBrk="1" hangingPunct="1"/>
+            <a:endParaRPr lang="en-US" dirty="0">
+              <a:latin typeface="Trebuchet MS" charset="0"/>
+            </a:endParaRPr>
+          </a:p>
+          <a:p>
+            <a:pPr marL="0" indent="0" eaLnBrk="1" hangingPunct="1"/>
+            <a:r>
+              <a:rPr lang="en-US" dirty="0" smtClean="0">
+                <a:latin typeface="Trebuchet MS" charset="0"/>
+              </a:rPr>
+              <a:t>Titanium Studio updates:</a:t>
+            </a:r>
+          </a:p>
+          <a:p>
+            <a:pPr marL="114300" lvl="1" eaLnBrk="1" hangingPunct="1"/>
+            <a:r>
+              <a:rPr lang="en-US" dirty="0" smtClean="0">
+                <a:latin typeface="Trebuchet MS" charset="0"/>
+              </a:rPr>
+              <a:t>	Help &gt; Check for Updates</a:t>
+            </a:r>
+            <a:endParaRPr lang="en-US" dirty="0">
+              <a:latin typeface="Trebuchet MS" charset="0"/>
+            </a:endParaRPr>
+          </a:p>
+          <a:p>
+            <a:pPr marL="0" indent="0" eaLnBrk="1" hangingPunct="1"/>
+            <a:endParaRPr lang="en-US" dirty="0" smtClean="0">
+              <a:latin typeface="Trebuchet MS" charset="0"/>
+            </a:endParaRPr>
+          </a:p>
+          <a:p>
+            <a:pPr marL="0" indent="0" eaLnBrk="1" hangingPunct="1"/>
+            <a:r>
+              <a:rPr lang="en-US" dirty="0" smtClean="0">
+                <a:latin typeface="Trebuchet MS" charset="0"/>
+              </a:rPr>
+              <a:t>Add</a:t>
+            </a:r>
+            <a:r>
+              <a:rPr lang="en-US" dirty="0">
+                <a:latin typeface="Trebuchet MS" charset="0"/>
+              </a:rPr>
+              <a:t>-ons – e.g. SVN </a:t>
+            </a:r>
+            <a:r>
+              <a:rPr lang="en-US" dirty="0" smtClean="0">
+                <a:latin typeface="Trebuchet MS" charset="0"/>
+              </a:rPr>
+              <a:t>tools:</a:t>
+            </a:r>
+          </a:p>
+          <a:p>
+            <a:pPr marL="114300" lvl="1" eaLnBrk="1" hangingPunct="1"/>
+            <a:r>
+              <a:rPr lang="en-US" dirty="0" smtClean="0">
+                <a:latin typeface="Trebuchet MS" charset="0"/>
+              </a:rPr>
+              <a:t>	Help &gt; Install New Software</a:t>
+            </a:r>
+            <a:br>
+              <a:rPr lang="en-US" dirty="0" smtClean="0">
+                <a:latin typeface="Trebuchet MS" charset="0"/>
+              </a:rPr>
+            </a:br>
+            <a:r>
+              <a:rPr lang="en-US" dirty="0" smtClean="0">
+                <a:latin typeface="Trebuchet MS" charset="0"/>
+              </a:rPr>
+              <a:t>	Click Available Sites, enable download sites</a:t>
+            </a:r>
+          </a:p>
+          <a:p>
+            <a:pPr marL="114300" lvl="1" eaLnBrk="1" hangingPunct="1"/>
+            <a:r>
+              <a:rPr lang="en-US" dirty="0">
+                <a:latin typeface="Trebuchet MS" charset="0"/>
+              </a:rPr>
+              <a:t>	</a:t>
+            </a:r>
+            <a:r>
+              <a:rPr lang="en-US" dirty="0" smtClean="0">
+                <a:latin typeface="Trebuchet MS" charset="0"/>
+              </a:rPr>
+              <a:t>Download and install via the wizard</a:t>
+            </a:r>
+            <a:endParaRPr lang="en-US" dirty="0">
+              <a:latin typeface="Trebuchet MS" charset="0"/>
+            </a:endParaRPr>
+          </a:p>
+        </p:txBody>
+      </p:sp>
+    </p:spTree>
+  </p:cSld>
+  <p:clrMapOvr>
+    <a:masterClrMapping/>
+  </p:clrMapOvr>
+  <p:timing>
+    <p:tnLst>
+      <p:par>
+        <p:cTn xmlns:p14="http://schemas.microsoft.com/office/powerpoint/2010/main" id="1" dur="indefinite" restart="never" nodeType="tmRoot"/>
+      </p:par>
+    </p:tnLst>
+  </p:timing>
+</p:sld>
+</file>
+
+<file path=ppt/slides/slide23.xml><?xml version="1.0" encoding="utf-8"?>
 <p:sld xmlns:a="http://schemas.openxmlformats.org/drawingml/2006/main" xmlns:r="http://schemas.openxmlformats.org/officeDocument/2006/relationships" xmlns:p="http://schemas.openxmlformats.org/presentationml/2006/main">
   <p:cSld>
     <p:spTree>
@@ -13556,10 +15508,17 @@
   <p:clrMapOvr>
     <a:masterClrMapping/>
   </p:clrMapOvr>
+  <p:timing>
+    <p:tnLst>
+      <p:par>
+        <p:cTn xmlns:p14="http://schemas.microsoft.com/office/powerpoint/2010/main" id="1" dur="indefinite" restart="never" nodeType="tmRoot"/>
+      </p:par>
+    </p:tnLst>
+  </p:timing>
 </p:sld>
 </file>
 
-<file path=ppt/slides/slide21.xml><?xml version="1.0" encoding="utf-8"?>
+<file path=ppt/slides/slide24.xml><?xml version="1.0" encoding="utf-8"?>
 <p:sld xmlns:a="http://schemas.openxmlformats.org/drawingml/2006/main" xmlns:r="http://schemas.openxmlformats.org/officeDocument/2006/relationships" xmlns:p="http://schemas.openxmlformats.org/presentationml/2006/main">
   <p:cSld>
     <p:spTree>

</xml_diff>

<commit_message>
Mostly final versions of slides for 300, 345
</commit_message>
<xml_diff>
--- a/300/300.pptx
+++ b/300/300.pptx
@@ -6,10 +6,10 @@
     <p:sldMasterId id="2147483754" r:id="rId2"/>
   </p:sldMasterIdLst>
   <p:notesMasterIdLst>
-    <p:notesMasterId r:id="rId27"/>
+    <p:notesMasterId r:id="rId28"/>
   </p:notesMasterIdLst>
   <p:handoutMasterIdLst>
-    <p:handoutMasterId r:id="rId28"/>
+    <p:handoutMasterId r:id="rId29"/>
   </p:handoutMasterIdLst>
   <p:sldIdLst>
     <p:sldId id="256" r:id="rId3"/>
@@ -23,19 +23,20 @@
     <p:sldId id="323" r:id="rId11"/>
     <p:sldId id="321" r:id="rId12"/>
     <p:sldId id="332" r:id="rId13"/>
-    <p:sldId id="333" r:id="rId14"/>
-    <p:sldId id="337" r:id="rId15"/>
-    <p:sldId id="322" r:id="rId16"/>
-    <p:sldId id="334" r:id="rId17"/>
-    <p:sldId id="329" r:id="rId18"/>
-    <p:sldId id="330" r:id="rId19"/>
-    <p:sldId id="338" r:id="rId20"/>
-    <p:sldId id="331" r:id="rId21"/>
-    <p:sldId id="339" r:id="rId22"/>
-    <p:sldId id="340" r:id="rId23"/>
-    <p:sldId id="327" r:id="rId24"/>
-    <p:sldId id="318" r:id="rId25"/>
-    <p:sldId id="317" r:id="rId26"/>
+    <p:sldId id="341" r:id="rId14"/>
+    <p:sldId id="333" r:id="rId15"/>
+    <p:sldId id="337" r:id="rId16"/>
+    <p:sldId id="322" r:id="rId17"/>
+    <p:sldId id="334" r:id="rId18"/>
+    <p:sldId id="329" r:id="rId19"/>
+    <p:sldId id="330" r:id="rId20"/>
+    <p:sldId id="338" r:id="rId21"/>
+    <p:sldId id="331" r:id="rId22"/>
+    <p:sldId id="339" r:id="rId23"/>
+    <p:sldId id="340" r:id="rId24"/>
+    <p:sldId id="327" r:id="rId25"/>
+    <p:sldId id="318" r:id="rId26"/>
+    <p:sldId id="317" r:id="rId27"/>
   </p:sldIdLst>
   <p:sldSz cx="9144000" cy="6858000" type="screen4x3"/>
   <p:notesSz cx="6858000" cy="9144000"/>
@@ -258,7 +259,7 @@
               <a:pPr>
                 <a:defRPr/>
               </a:pPr>
-              <a:t>6/3/11</a:t>
+              <a:t>6/10/11</a:t>
             </a:fld>
             <a:endParaRPr lang="en-US"/>
           </a:p>
@@ -441,7 +442,7 @@
               <a:pPr>
                 <a:defRPr/>
               </a:pPr>
-              <a:t>6/3/11</a:t>
+              <a:t>6/10/11</a:t>
             </a:fld>
             <a:endParaRPr lang="en-US"/>
           </a:p>
@@ -1151,21 +1152,39 @@
           <a:p>
             <a:r>
               <a:rPr lang="en-US" dirty="0" smtClean="0"/>
-              <a:t>Overview of main</a:t>
-            </a:r>
+              <a:t>Not really debugging, but Studio provides code validation</a:t>
+            </a:r>
+          </a:p>
+          <a:p>
             <a:r>
               <a:rPr lang="en-US" baseline="0" dirty="0" smtClean="0"/>
-              <a:t> debug UI elements</a:t>
+              <a:t>Inline – red x in the margin</a:t>
+            </a:r>
+          </a:p>
+          <a:p>
+            <a:r>
+              <a:rPr lang="en-US" baseline="0" dirty="0" smtClean="0"/>
+              <a:t>Problems console shows </a:t>
+            </a:r>
+            <a:r>
+              <a:rPr lang="en-US" baseline="0" dirty="0" err="1" smtClean="0"/>
+              <a:t>JSLint</a:t>
+            </a:r>
+            <a:r>
+              <a:rPr lang="en-US" baseline="0" dirty="0" smtClean="0"/>
+              <a:t> and other errors</a:t>
+            </a:r>
+          </a:p>
+          <a:p>
+            <a:r>
+              <a:rPr lang="en-US" baseline="0" dirty="0" smtClean="0"/>
+              <a:t>Set preferences to enable or disable validators</a:t>
             </a:r>
           </a:p>
           <a:p>
             <a:endParaRPr lang="en-US" baseline="0" dirty="0" smtClean="0"/>
           </a:p>
           <a:p>
-            <a:r>
-              <a:rPr lang="en-US" baseline="0" dirty="0" smtClean="0"/>
-              <a:t>More info on next slide, so don’t go too deep here</a:t>
-            </a:r>
             <a:endParaRPr lang="en-US" dirty="0"/>
           </a:p>
         </p:txBody>
@@ -1193,7 +1212,7 @@
               <a:pPr>
                 <a:defRPr/>
               </a:pPr>
-              <a:t>13</a:t>
+              <a:t>12</a:t>
             </a:fld>
             <a:endParaRPr lang="en-US"/>
           </a:p>
@@ -1202,7 +1221,7 @@
     </p:spTree>
     <p:extLst>
       <p:ext uri="{BB962C8B-B14F-4D97-AF65-F5344CB8AC3E}">
-        <p14:creationId xmlns:p14="http://schemas.microsoft.com/office/powerpoint/2010/main" val="554821219"/>
+        <p14:creationId xmlns:p14="http://schemas.microsoft.com/office/powerpoint/2010/main" val="961220368"/>
       </p:ext>
     </p:extLst>
   </p:cSld>
@@ -1258,32 +1277,20 @@
           <a:p>
             <a:r>
               <a:rPr lang="en-US" dirty="0" smtClean="0"/>
-              <a:t>You</a:t>
-            </a:r>
-            <a:r>
-              <a:rPr lang="en-US" baseline="0" dirty="0" smtClean="0"/>
-              <a:t> can examine variables</a:t>
-            </a:r>
-          </a:p>
-          <a:p>
-            <a:r>
-              <a:rPr lang="en-US" baseline="0" dirty="0" smtClean="0"/>
-              <a:t>Set in-memory variables</a:t>
-            </a:r>
-          </a:p>
-          <a:p>
-            <a:r>
-              <a:rPr lang="en-US" baseline="0" dirty="0" smtClean="0"/>
-              <a:t>Manage breakpoint conditions</a:t>
-            </a:r>
-          </a:p>
-          <a:p>
-            <a:endParaRPr lang="en-US" baseline="0" dirty="0" smtClean="0"/>
-          </a:p>
-          <a:p>
-            <a:endParaRPr lang="en-US" baseline="0" dirty="0" smtClean="0"/>
-          </a:p>
-          <a:p>
+              <a:t>Set by double-clicking line</a:t>
+            </a:r>
+          </a:p>
+          <a:p>
+            <a:r>
+              <a:rPr lang="en-US" dirty="0" smtClean="0"/>
+              <a:t>Clear by double-clicking</a:t>
+            </a:r>
+          </a:p>
+          <a:p>
+            <a:r>
+              <a:rPr lang="en-US" dirty="0" smtClean="0"/>
+              <a:t>Use Debug menu to build</a:t>
+            </a:r>
             <a:endParaRPr lang="en-US" dirty="0"/>
           </a:p>
         </p:txBody>
@@ -1311,7 +1318,7 @@
               <a:pPr>
                 <a:defRPr/>
               </a:pPr>
-              <a:t>14</a:t>
+              <a:t>13</a:t>
             </a:fld>
             <a:endParaRPr lang="en-US"/>
           </a:p>
@@ -1320,7 +1327,7 @@
     </p:spTree>
     <p:extLst>
       <p:ext uri="{BB962C8B-B14F-4D97-AF65-F5344CB8AC3E}">
-        <p14:creationId xmlns:p14="http://schemas.microsoft.com/office/powerpoint/2010/main" val="961220368"/>
+        <p14:creationId xmlns:p14="http://schemas.microsoft.com/office/powerpoint/2010/main" val="1621067713"/>
       </p:ext>
     </p:extLst>
   </p:cSld>
@@ -1376,23 +1383,20 @@
           <a:p>
             <a:r>
               <a:rPr lang="en-US" dirty="0" smtClean="0"/>
-              <a:t>Themes</a:t>
+              <a:t>Overview of main</a:t>
             </a:r>
             <a:r>
               <a:rPr lang="en-US" baseline="0" dirty="0" smtClean="0"/>
-              <a:t> control colors and fonts for perspectives</a:t>
-            </a:r>
+              <a:t> debug UI elements</a:t>
+            </a:r>
+          </a:p>
+          <a:p>
+            <a:endParaRPr lang="en-US" baseline="0" dirty="0" smtClean="0"/>
           </a:p>
           <a:p>
             <a:r>
               <a:rPr lang="en-US" baseline="0" dirty="0" smtClean="0"/>
-              <a:t>Many built in</a:t>
-            </a:r>
-          </a:p>
-          <a:p>
-            <a:r>
-              <a:rPr lang="en-US" baseline="0" dirty="0" smtClean="0"/>
-              <a:t>You can download and install additional themes</a:t>
+              <a:t>More info on next slide, so don’t go too deep here</a:t>
             </a:r>
             <a:endParaRPr lang="en-US" dirty="0"/>
           </a:p>
@@ -1421,7 +1425,7 @@
               <a:pPr>
                 <a:defRPr/>
               </a:pPr>
-              <a:t>16</a:t>
+              <a:t>14</a:t>
             </a:fld>
             <a:endParaRPr lang="en-US"/>
           </a:p>
@@ -1430,7 +1434,7 @@
     </p:spTree>
     <p:extLst>
       <p:ext uri="{BB962C8B-B14F-4D97-AF65-F5344CB8AC3E}">
-        <p14:creationId xmlns:p14="http://schemas.microsoft.com/office/powerpoint/2010/main" val="2190807626"/>
+        <p14:creationId xmlns:p14="http://schemas.microsoft.com/office/powerpoint/2010/main" val="554821219"/>
       </p:ext>
     </p:extLst>
   </p:cSld>
@@ -1486,18 +1490,32 @@
           <a:p>
             <a:r>
               <a:rPr lang="en-US" dirty="0" smtClean="0"/>
-              <a:t>Review Eclipse terminology,</a:t>
-            </a:r>
-          </a:p>
-          <a:p>
-            <a:r>
-              <a:rPr lang="en-US" dirty="0" smtClean="0"/>
-              <a:t>Editor</a:t>
+              <a:t>You</a:t>
             </a:r>
             <a:r>
               <a:rPr lang="en-US" baseline="0" dirty="0" smtClean="0"/>
-              <a:t> is window in which you change code or project parameters</a:t>
-            </a:r>
+              <a:t> can examine variables</a:t>
+            </a:r>
+          </a:p>
+          <a:p>
+            <a:r>
+              <a:rPr lang="en-US" baseline="0" dirty="0" smtClean="0"/>
+              <a:t>Set in-memory variables</a:t>
+            </a:r>
+          </a:p>
+          <a:p>
+            <a:r>
+              <a:rPr lang="en-US" baseline="0" dirty="0" smtClean="0"/>
+              <a:t>Manage breakpoint conditions</a:t>
+            </a:r>
+          </a:p>
+          <a:p>
+            <a:endParaRPr lang="en-US" baseline="0" dirty="0" smtClean="0"/>
+          </a:p>
+          <a:p>
+            <a:endParaRPr lang="en-US" baseline="0" dirty="0" smtClean="0"/>
+          </a:p>
+          <a:p>
             <a:endParaRPr lang="en-US" dirty="0"/>
           </a:p>
         </p:txBody>
@@ -1525,7 +1543,7 @@
               <a:pPr>
                 <a:defRPr/>
               </a:pPr>
-              <a:t>17</a:t>
+              <a:t>15</a:t>
             </a:fld>
             <a:endParaRPr lang="en-US"/>
           </a:p>
@@ -1534,7 +1552,7 @@
     </p:spTree>
     <p:extLst>
       <p:ext uri="{BB962C8B-B14F-4D97-AF65-F5344CB8AC3E}">
-        <p14:creationId xmlns:p14="http://schemas.microsoft.com/office/powerpoint/2010/main" val="2639021608"/>
+        <p14:creationId xmlns:p14="http://schemas.microsoft.com/office/powerpoint/2010/main" val="961220368"/>
       </p:ext>
     </p:extLst>
   </p:cSld>
@@ -1590,11 +1608,23 @@
           <a:p>
             <a:r>
               <a:rPr lang="en-US" dirty="0" smtClean="0"/>
-              <a:t>Bundles</a:t>
+              <a:t>Themes</a:t>
             </a:r>
             <a:r>
               <a:rPr lang="en-US" baseline="0" dirty="0" smtClean="0"/>
-              <a:t> and Rubles are basically identical, except that Rubles are written in Ruby while Bundles could be written with other scripting languages.</a:t>
+              <a:t> control colors and fonts for perspectives</a:t>
+            </a:r>
+          </a:p>
+          <a:p>
+            <a:r>
+              <a:rPr lang="en-US" baseline="0" dirty="0" smtClean="0"/>
+              <a:t>Many built in</a:t>
+            </a:r>
+          </a:p>
+          <a:p>
+            <a:r>
+              <a:rPr lang="en-US" baseline="0" dirty="0" smtClean="0"/>
+              <a:t>You can download and install additional themes</a:t>
             </a:r>
             <a:endParaRPr lang="en-US" dirty="0"/>
           </a:p>
@@ -1623,7 +1653,7 @@
               <a:pPr>
                 <a:defRPr/>
               </a:pPr>
-              <a:t>18</a:t>
+              <a:t>17</a:t>
             </a:fld>
             <a:endParaRPr lang="en-US"/>
           </a:p>
@@ -1632,7 +1662,7 @@
     </p:spTree>
     <p:extLst>
       <p:ext uri="{BB962C8B-B14F-4D97-AF65-F5344CB8AC3E}">
-        <p14:creationId xmlns:p14="http://schemas.microsoft.com/office/powerpoint/2010/main" val="778537474"/>
+        <p14:creationId xmlns:p14="http://schemas.microsoft.com/office/powerpoint/2010/main" val="2190807626"/>
       </p:ext>
     </p:extLst>
   </p:cSld>
@@ -1688,11 +1718,20 @@
           <a:p>
             <a:r>
               <a:rPr lang="en-US" dirty="0" smtClean="0"/>
-              <a:t>Examples</a:t>
+              <a:t>Editor</a:t>
             </a:r>
             <a:r>
               <a:rPr lang="en-US" baseline="0" dirty="0" smtClean="0"/>
-              <a:t> include:</a:t>
+              <a:t> is window in which you change code or project parameters</a:t>
+            </a:r>
+          </a:p>
+          <a:p>
+            <a:endParaRPr lang="en-US" baseline="0" dirty="0" smtClean="0"/>
+          </a:p>
+          <a:p>
+            <a:r>
+              <a:rPr lang="en-US" baseline="0" dirty="0" smtClean="0"/>
+              <a:t>Editor-specific preferences</a:t>
             </a:r>
           </a:p>
           <a:p>
@@ -1701,14 +1740,31 @@
               <a:buChar char="•"/>
             </a:pPr>
             <a:r>
-              <a:rPr lang="en-US" dirty="0" smtClean="0"/>
-              <a:t>Command-Shift-F</a:t>
-            </a:r>
-            <a:r>
               <a:rPr lang="en-US" baseline="0" dirty="0" smtClean="0"/>
-              <a:t> to reformat code</a:t>
-            </a:r>
-            <a:endParaRPr lang="en-US" dirty="0" smtClean="0"/>
+              <a:t>Code assist on/off, tab handling, </a:t>
+            </a:r>
+            <a:r>
+              <a:rPr lang="en-US" baseline="0" smtClean="0"/>
+              <a:t>code folding</a:t>
+            </a:r>
+            <a:endParaRPr lang="en-US" baseline="0" dirty="0" smtClean="0"/>
+          </a:p>
+          <a:p>
+            <a:endParaRPr lang="en-US" baseline="0" dirty="0" smtClean="0"/>
+          </a:p>
+          <a:p>
+            <a:r>
+              <a:rPr lang="en-US" baseline="0" dirty="0" smtClean="0"/>
+              <a:t>General editor </a:t>
+            </a:r>
+            <a:r>
+              <a:rPr lang="en-US" baseline="0" dirty="0" err="1" smtClean="0"/>
+              <a:t>prefs</a:t>
+            </a:r>
+            <a:r>
+              <a:rPr lang="en-US" baseline="0" dirty="0" smtClean="0"/>
+              <a:t> include:</a:t>
+            </a:r>
           </a:p>
           <a:p>
             <a:pPr marL="171450" indent="-171450">
@@ -1716,22 +1772,8 @@
               <a:buChar char="•"/>
             </a:pPr>
             <a:r>
-              <a:rPr lang="en-US" dirty="0" smtClean="0"/>
-              <a:t>Command</a:t>
-            </a:r>
-            <a:r>
               <a:rPr lang="en-US" baseline="0" dirty="0" smtClean="0"/>
-              <a:t>-/ to comment out the current line</a:t>
-            </a:r>
-          </a:p>
-          <a:p>
-            <a:pPr marL="171450" indent="-171450">
-              <a:buFont typeface="Arial"/>
-              <a:buChar char="•"/>
-            </a:pPr>
-            <a:r>
-              <a:rPr lang="en-US" baseline="0" dirty="0" smtClean="0"/>
-              <a:t>Command-Option-/ to comment out the selected block</a:t>
+              <a:t>Line numbering, highlight color</a:t>
             </a:r>
             <a:endParaRPr lang="en-US" dirty="0"/>
           </a:p>
@@ -1760,7 +1802,7 @@
               <a:pPr>
                 <a:defRPr/>
               </a:pPr>
-              <a:t>19</a:t>
+              <a:t>18</a:t>
             </a:fld>
             <a:endParaRPr lang="en-US"/>
           </a:p>
@@ -1769,7 +1811,7 @@
     </p:spTree>
     <p:extLst>
       <p:ext uri="{BB962C8B-B14F-4D97-AF65-F5344CB8AC3E}">
-        <p14:creationId xmlns:p14="http://schemas.microsoft.com/office/powerpoint/2010/main" val="3163856772"/>
+        <p14:creationId xmlns:p14="http://schemas.microsoft.com/office/powerpoint/2010/main" val="2639021608"/>
       </p:ext>
     </p:extLst>
   </p:cSld>
@@ -1823,6 +1865,14 @@
           <a:bodyPr/>
           <a:lstStyle/>
           <a:p>
+            <a:r>
+              <a:rPr lang="en-US" dirty="0" smtClean="0"/>
+              <a:t>Bundles</a:t>
+            </a:r>
+            <a:r>
+              <a:rPr lang="en-US" baseline="0" dirty="0" smtClean="0"/>
+              <a:t> and Rubles are basically identical, except that Rubles are written in Ruby while Bundles could be written with other scripting languages.</a:t>
+            </a:r>
             <a:endParaRPr lang="en-US" dirty="0"/>
           </a:p>
         </p:txBody>
@@ -1850,7 +1900,7 @@
               <a:pPr>
                 <a:defRPr/>
               </a:pPr>
-              <a:t>20</a:t>
+              <a:t>19</a:t>
             </a:fld>
             <a:endParaRPr lang="en-US"/>
           </a:p>
@@ -1859,7 +1909,7 @@
     </p:spTree>
     <p:extLst>
       <p:ext uri="{BB962C8B-B14F-4D97-AF65-F5344CB8AC3E}">
-        <p14:creationId xmlns:p14="http://schemas.microsoft.com/office/powerpoint/2010/main" val="3163856772"/>
+        <p14:creationId xmlns:p14="http://schemas.microsoft.com/office/powerpoint/2010/main" val="778537474"/>
       </p:ext>
     </p:extLst>
   </p:cSld>
@@ -1915,56 +1965,50 @@
           <a:p>
             <a:r>
               <a:rPr lang="en-US" dirty="0" smtClean="0"/>
-              <a:t>Rubles and Bundles are the primary way to extend Ti Studio (without writing Java code)</a:t>
-            </a:r>
-          </a:p>
-          <a:p>
+              <a:t>Examples</a:t>
+            </a:r>
+            <a:r>
+              <a:rPr lang="en-US" baseline="0" dirty="0" smtClean="0"/>
+              <a:t> include:</a:t>
+            </a:r>
+          </a:p>
+          <a:p>
+            <a:pPr marL="171450" indent="-171450">
+              <a:buFont typeface="Arial"/>
+              <a:buChar char="•"/>
+            </a:pPr>
             <a:r>
               <a:rPr lang="en-US" dirty="0" smtClean="0"/>
-              <a:t>Many are included</a:t>
-            </a:r>
-          </a:p>
-          <a:p>
+              <a:t>Command-Shift-F</a:t>
+            </a:r>
+            <a:r>
+              <a:rPr lang="en-US" baseline="0" dirty="0" smtClean="0"/>
+              <a:t> to reformat code</a:t>
+            </a:r>
+            <a:endParaRPr lang="en-US" dirty="0" smtClean="0"/>
+          </a:p>
+          <a:p>
+            <a:pPr marL="171450" indent="-171450">
+              <a:buFont typeface="Arial"/>
+              <a:buChar char="•"/>
+            </a:pPr>
             <a:r>
               <a:rPr lang="en-US" dirty="0" smtClean="0"/>
-              <a:t>You can download web </a:t>
-            </a:r>
-            <a:r>
-              <a:rPr lang="en-US" dirty="0" err="1" smtClean="0"/>
-              <a:t>dev</a:t>
-            </a:r>
-            <a:r>
-              <a:rPr lang="en-US" dirty="0" smtClean="0"/>
-              <a:t> oriented bundles from </a:t>
-            </a:r>
-            <a:r>
-              <a:rPr lang="en-US" dirty="0" err="1" smtClean="0"/>
-              <a:t>GitHub</a:t>
-            </a:r>
-            <a:endParaRPr lang="en-US" dirty="0" smtClean="0"/>
-          </a:p>
-          <a:p>
-            <a:r>
-              <a:rPr lang="en-US" dirty="0" smtClean="0"/>
-              <a:t>There</a:t>
+              <a:t>Command</a:t>
             </a:r>
             <a:r>
               <a:rPr lang="en-US" baseline="0" dirty="0" smtClean="0"/>
-              <a:t> aren’t currently any Titanium-specific Rubles published, maybe someday</a:t>
-            </a:r>
-          </a:p>
-          <a:p>
+              <a:t>-/ to comment out the current line</a:t>
+            </a:r>
+          </a:p>
+          <a:p>
+            <a:pPr marL="171450" indent="-171450">
+              <a:buFont typeface="Arial"/>
+              <a:buChar char="•"/>
+            </a:pPr>
             <a:r>
               <a:rPr lang="en-US" baseline="0" dirty="0" smtClean="0"/>
-              <a:t>Studio supports and can import </a:t>
-            </a:r>
-            <a:r>
-              <a:rPr lang="en-US" baseline="0" dirty="0" err="1" smtClean="0"/>
-              <a:t>TextMate</a:t>
-            </a:r>
-            <a:r>
-              <a:rPr lang="en-US" baseline="0" dirty="0" smtClean="0"/>
-              <a:t> bundles</a:t>
+              <a:t>Command-Option-/ to comment out the selected block</a:t>
             </a:r>
             <a:endParaRPr lang="en-US" dirty="0"/>
           </a:p>
@@ -1993,7 +2037,7 @@
               <a:pPr>
                 <a:defRPr/>
               </a:pPr>
-              <a:t>21</a:t>
+              <a:t>20</a:t>
             </a:fld>
             <a:endParaRPr lang="en-US"/>
           </a:p>
@@ -2056,32 +2100,6 @@
           <a:bodyPr/>
           <a:lstStyle/>
           <a:p>
-            <a:r>
-              <a:rPr lang="en-US" dirty="0" smtClean="0"/>
-              <a:t>Three main types of updates:</a:t>
-            </a:r>
-          </a:p>
-          <a:p>
-            <a:r>
-              <a:rPr lang="en-US" dirty="0" smtClean="0"/>
-              <a:t>API updates – to get new Titanium APIs</a:t>
-            </a:r>
-          </a:p>
-          <a:p>
-            <a:r>
-              <a:rPr lang="en-US" dirty="0" smtClean="0"/>
-              <a:t>Ti</a:t>
-            </a:r>
-            <a:r>
-              <a:rPr lang="en-US" baseline="0" dirty="0" smtClean="0"/>
-              <a:t> Studio updates</a:t>
-            </a:r>
-          </a:p>
-          <a:p>
-            <a:r>
-              <a:rPr lang="en-US" baseline="0" dirty="0" smtClean="0"/>
-              <a:t>Install add-ons, such as SVN support</a:t>
-            </a:r>
             <a:endParaRPr lang="en-US" dirty="0"/>
           </a:p>
         </p:txBody>
@@ -2109,7 +2127,7 @@
               <a:pPr>
                 <a:defRPr/>
               </a:pPr>
-              <a:t>22</a:t>
+              <a:t>21</a:t>
             </a:fld>
             <a:endParaRPr lang="en-US"/>
           </a:p>
@@ -2118,7 +2136,7 @@
     </p:spTree>
     <p:extLst>
       <p:ext uri="{BB962C8B-B14F-4D97-AF65-F5344CB8AC3E}">
-        <p14:creationId xmlns:p14="http://schemas.microsoft.com/office/powerpoint/2010/main" val="1750815042"/>
+        <p14:creationId xmlns:p14="http://schemas.microsoft.com/office/powerpoint/2010/main" val="3163856772"/>
       </p:ext>
     </p:extLst>
   </p:cSld>
@@ -2147,7 +2165,7 @@
       </p:grpSpPr>
       <p:sp>
         <p:nvSpPr>
-          <p:cNvPr id="56321" name="Slide Image Placeholder 1"/>
+          <p:cNvPr id="2" name="Slide Image Placeholder 1"/>
           <p:cNvSpPr>
             <a:spLocks noGrp="1" noRot="1" noChangeAspect="1"/>
           </p:cNvSpPr>
@@ -2155,33 +2173,11 @@
             <p:ph type="sldImg"/>
           </p:nvPr>
         </p:nvSpPr>
-        <p:spPr bwMode="auto">
-          <a:noFill/>
-          <a:ln>
-            <a:solidFill>
-              <a:srgbClr val="000000"/>
-            </a:solidFill>
-            <a:miter lim="800000"/>
-            <a:headEnd/>
-            <a:tailEnd/>
-          </a:ln>
-          <a:extLst>
-            <a:ext uri="{909E8E84-426E-40dd-AFC4-6F175D3DCCD1}">
-              <a14:hiddenFill xmlns:a14="http://schemas.microsoft.com/office/drawing/2010/main">
-                <a:solidFill>
-                  <a:srgbClr val="FFFFFF"/>
-                </a:solidFill>
-              </a14:hiddenFill>
-            </a:ext>
-            <a:ext uri="{FAA26D3D-D897-4be2-8F04-BA451C77F1D7}">
-              <ma14:placeholderFlag xmlns:ma14="http://schemas.microsoft.com/office/mac/drawingml/2011/main" val="1"/>
-            </a:ext>
-          </a:extLst>
-        </p:spPr>
-      </p:sp>
-      <p:sp>
-        <p:nvSpPr>
-          <p:cNvPr id="56322" name="Notes Placeholder 2"/>
+        <p:spPr/>
+      </p:sp>
+      <p:sp>
+        <p:nvSpPr>
+          <p:cNvPr id="3" name="Notes Placeholder 2"/>
           <p:cNvSpPr>
             <a:spLocks noGrp="1"/>
           </p:cNvSpPr>
@@ -2189,276 +2185,103 @@
             <p:ph type="body" idx="1"/>
           </p:nvPr>
         </p:nvSpPr>
-        <p:spPr bwMode="auto">
-          <a:noFill/>
-          <a:extLst>
-            <a:ext uri="{909E8E84-426E-40dd-AFC4-6F175D3DCCD1}">
-              <a14:hiddenFill xmlns:a14="http://schemas.microsoft.com/office/drawing/2010/main">
-                <a:solidFill>
-                  <a:srgbClr val="FFFFFF"/>
-                </a:solidFill>
-              </a14:hiddenFill>
-            </a:ext>
-            <a:ext uri="{91240B29-F687-4f45-9708-019B960494DF}">
-              <a14:hiddenLine xmlns:a14="http://schemas.microsoft.com/office/drawing/2010/main" w="9525">
-                <a:solidFill>
-                  <a:srgbClr val="000000"/>
-                </a:solidFill>
-                <a:miter lim="800000"/>
-                <a:headEnd/>
-                <a:tailEnd/>
-              </a14:hiddenLine>
-            </a:ext>
-            <a:ext uri="{FAA26D3D-D897-4be2-8F04-BA451C77F1D7}">
-              <ma14:placeholderFlag xmlns:ma14="http://schemas.microsoft.com/office/mac/drawingml/2011/main" val="1"/>
-            </a:ext>
-          </a:extLst>
-        </p:spPr>
-        <p:txBody>
-          <a:bodyPr wrap="square" numCol="1" anchor="t" anchorCtr="0" compatLnSpc="1">
-            <a:prstTxWarp prst="textNoShape">
-              <a:avLst/>
-            </a:prstTxWarp>
-          </a:bodyPr>
+        <p:spPr/>
+        <p:txBody>
+          <a:bodyPr/>
+          <a:lstStyle/>
+          <a:p>
+            <a:r>
+              <a:rPr lang="en-US" dirty="0" smtClean="0"/>
+              <a:t>Rubles and Bundles are the primary way to extend Ti Studio (without writing Java code)</a:t>
+            </a:r>
+          </a:p>
+          <a:p>
+            <a:r>
+              <a:rPr lang="en-US" dirty="0" smtClean="0"/>
+              <a:t>Many are included</a:t>
+            </a:r>
+          </a:p>
+          <a:p>
+            <a:r>
+              <a:rPr lang="en-US" dirty="0" smtClean="0"/>
+              <a:t>You can download web </a:t>
+            </a:r>
+            <a:r>
+              <a:rPr lang="en-US" dirty="0" err="1" smtClean="0"/>
+              <a:t>dev</a:t>
+            </a:r>
+            <a:r>
+              <a:rPr lang="en-US" dirty="0" smtClean="0"/>
+              <a:t> oriented bundles from </a:t>
+            </a:r>
+            <a:r>
+              <a:rPr lang="en-US" dirty="0" err="1" smtClean="0"/>
+              <a:t>GitHub</a:t>
+            </a:r>
+            <a:endParaRPr lang="en-US" dirty="0" smtClean="0"/>
+          </a:p>
+          <a:p>
+            <a:r>
+              <a:rPr lang="en-US" dirty="0" smtClean="0"/>
+              <a:t>There</a:t>
+            </a:r>
+            <a:r>
+              <a:rPr lang="en-US" baseline="0" dirty="0" smtClean="0"/>
+              <a:t> aren’t currently any Titanium-specific Rubles published, maybe someday</a:t>
+            </a:r>
+          </a:p>
+          <a:p>
+            <a:r>
+              <a:rPr lang="en-US" baseline="0" dirty="0" smtClean="0"/>
+              <a:t>Studio supports and can import </a:t>
+            </a:r>
+            <a:r>
+              <a:rPr lang="en-US" baseline="0" dirty="0" err="1" smtClean="0"/>
+              <a:t>TextMate</a:t>
+            </a:r>
+            <a:r>
+              <a:rPr lang="en-US" baseline="0" dirty="0" smtClean="0"/>
+              <a:t> bundles</a:t>
+            </a:r>
+            <a:endParaRPr lang="en-US" dirty="0"/>
+          </a:p>
+        </p:txBody>
+      </p:sp>
+      <p:sp>
+        <p:nvSpPr>
+          <p:cNvPr id="4" name="Slide Number Placeholder 3"/>
+          <p:cNvSpPr>
+            <a:spLocks noGrp="1"/>
+          </p:cNvSpPr>
+          <p:nvPr>
+            <p:ph type="sldNum" sz="quarter" idx="10"/>
+          </p:nvPr>
+        </p:nvSpPr>
+        <p:spPr/>
+        <p:txBody>
+          <a:bodyPr/>
           <a:lstStyle/>
           <a:p>
             <a:pPr>
               <a:defRPr/>
             </a:pPr>
-            <a:r>
-              <a:rPr lang="en-US" sz="1200" dirty="0" smtClean="0"/>
-              <a:t>Ideas:</a:t>
-            </a:r>
-          </a:p>
-          <a:p>
-            <a:pPr marL="342900" indent="-342900">
-              <a:buFontTx/>
-              <a:buChar char="-"/>
-              <a:defRPr/>
-            </a:pPr>
-            <a:r>
-              <a:rPr lang="en-US" sz="1200" dirty="0" smtClean="0"/>
-              <a:t>debug a project</a:t>
-            </a:r>
-          </a:p>
-          <a:p>
-            <a:pPr marL="342900" indent="-342900">
-              <a:buFontTx/>
-              <a:buChar char="-"/>
-              <a:defRPr/>
-            </a:pPr>
-            <a:r>
-              <a:rPr lang="en-US" sz="1200" dirty="0" smtClean="0"/>
-              <a:t>import a </a:t>
-            </a:r>
-            <a:r>
-              <a:rPr lang="en-US" sz="1200" dirty="0" err="1" smtClean="0"/>
-              <a:t>textmate</a:t>
-            </a:r>
-            <a:r>
-              <a:rPr lang="en-US" sz="1200" dirty="0" smtClean="0"/>
-              <a:t> theme and/or bundle</a:t>
-            </a:r>
-          </a:p>
-          <a:p>
-            <a:pPr marL="342900" indent="-342900">
-              <a:buFontTx/>
-              <a:buChar char="-"/>
-              <a:defRPr/>
-            </a:pPr>
-            <a:r>
-              <a:rPr lang="en-US" sz="1200" dirty="0" smtClean="0"/>
-              <a:t>configure or create a shortcut</a:t>
-            </a:r>
-          </a:p>
-          <a:p>
-            <a:pPr marL="342900" indent="-342900">
-              <a:buFontTx/>
-              <a:buChar char="-"/>
-              <a:defRPr/>
-            </a:pPr>
-            <a:r>
-              <a:rPr lang="en-US" sz="1200" dirty="0" smtClean="0"/>
-              <a:t>configure colors and theme settings</a:t>
-            </a:r>
-          </a:p>
-          <a:p>
-            <a:pPr marL="342900" indent="-342900">
-              <a:buFontTx/>
-              <a:buChar char="-"/>
-              <a:defRPr/>
-            </a:pPr>
-            <a:r>
-              <a:rPr lang="en-US" sz="1200" dirty="0" smtClean="0"/>
-              <a:t>configure Ti Mobile settings (API level, emulator options)</a:t>
-            </a:r>
-          </a:p>
-          <a:p>
-            <a:pPr eaLnBrk="1" hangingPunct="1"/>
-            <a:endParaRPr lang="en-US" dirty="0">
-              <a:latin typeface="Calibri" charset="0"/>
-            </a:endParaRPr>
-          </a:p>
-        </p:txBody>
-      </p:sp>
-      <p:sp>
-        <p:nvSpPr>
-          <p:cNvPr id="56323" name="Slide Number Placeholder 3"/>
-          <p:cNvSpPr>
-            <a:spLocks noGrp="1"/>
-          </p:cNvSpPr>
-          <p:nvPr>
-            <p:ph type="sldNum" sz="quarter" idx="5"/>
-          </p:nvPr>
-        </p:nvSpPr>
-        <p:spPr bwMode="auto">
-          <a:noFill/>
-          <a:extLst>
-            <a:ext uri="{909E8E84-426E-40dd-AFC4-6F175D3DCCD1}">
-              <a14:hiddenFill xmlns:a14="http://schemas.microsoft.com/office/drawing/2010/main">
-                <a:solidFill>
-                  <a:srgbClr val="FFFFFF"/>
-                </a:solidFill>
-              </a14:hiddenFill>
-            </a:ext>
-            <a:ext uri="{91240B29-F687-4f45-9708-019B960494DF}">
-              <a14:hiddenLine xmlns:a14="http://schemas.microsoft.com/office/drawing/2010/main" w="9525">
-                <a:solidFill>
-                  <a:srgbClr val="000000"/>
-                </a:solidFill>
-                <a:miter lim="800000"/>
-                <a:headEnd/>
-                <a:tailEnd/>
-              </a14:hiddenLine>
-            </a:ext>
-          </a:extLst>
-        </p:spPr>
-        <p:txBody>
-          <a:bodyPr wrap="square" numCol="1" anchorCtr="0" compatLnSpc="1">
-            <a:prstTxWarp prst="textNoShape">
-              <a:avLst/>
-            </a:prstTxWarp>
-          </a:bodyPr>
-          <a:lstStyle>
-            <a:lvl1pPr eaLnBrk="0" hangingPunct="0">
-              <a:defRPr sz="2400">
-                <a:solidFill>
-                  <a:schemeClr val="tx1"/>
-                </a:solidFill>
-                <a:latin typeface="Trebuchet MS" charset="0"/>
-                <a:ea typeface="ＭＳ Ｐゴシック" charset="0"/>
-                <a:cs typeface="ＭＳ Ｐゴシック" charset="0"/>
-              </a:defRPr>
-            </a:lvl1pPr>
-            <a:lvl2pPr marL="742950" indent="-285750" eaLnBrk="0" hangingPunct="0">
-              <a:defRPr sz="2400">
-                <a:solidFill>
-                  <a:schemeClr val="tx1"/>
-                </a:solidFill>
-                <a:latin typeface="Trebuchet MS" charset="0"/>
-                <a:ea typeface="ＭＳ Ｐゴシック" charset="0"/>
-              </a:defRPr>
-            </a:lvl2pPr>
-            <a:lvl3pPr marL="1143000" indent="-228600" eaLnBrk="0" hangingPunct="0">
-              <a:defRPr sz="2400">
-                <a:solidFill>
-                  <a:schemeClr val="tx1"/>
-                </a:solidFill>
-                <a:latin typeface="Trebuchet MS" charset="0"/>
-                <a:ea typeface="ＭＳ Ｐゴシック" charset="0"/>
-              </a:defRPr>
-            </a:lvl3pPr>
-            <a:lvl4pPr marL="1600200" indent="-228600" eaLnBrk="0" hangingPunct="0">
-              <a:defRPr sz="2400">
-                <a:solidFill>
-                  <a:schemeClr val="tx1"/>
-                </a:solidFill>
-                <a:latin typeface="Trebuchet MS" charset="0"/>
-                <a:ea typeface="ＭＳ Ｐゴシック" charset="0"/>
-              </a:defRPr>
-            </a:lvl4pPr>
-            <a:lvl5pPr marL="2057400" indent="-228600" eaLnBrk="0" hangingPunct="0">
-              <a:defRPr sz="2400">
-                <a:solidFill>
-                  <a:schemeClr val="tx1"/>
-                </a:solidFill>
-                <a:latin typeface="Trebuchet MS" charset="0"/>
-                <a:ea typeface="ＭＳ Ｐゴシック" charset="0"/>
-              </a:defRPr>
-            </a:lvl5pPr>
-            <a:lvl6pPr marL="2514600" indent="-228600" eaLnBrk="0" fontAlgn="base" hangingPunct="0">
-              <a:spcBef>
-                <a:spcPct val="0"/>
-              </a:spcBef>
-              <a:spcAft>
-                <a:spcPct val="0"/>
-              </a:spcAft>
-              <a:defRPr sz="2400">
-                <a:solidFill>
-                  <a:schemeClr val="tx1"/>
-                </a:solidFill>
-                <a:latin typeface="Trebuchet MS" charset="0"/>
-                <a:ea typeface="ＭＳ Ｐゴシック" charset="0"/>
-              </a:defRPr>
-            </a:lvl6pPr>
-            <a:lvl7pPr marL="2971800" indent="-228600" eaLnBrk="0" fontAlgn="base" hangingPunct="0">
-              <a:spcBef>
-                <a:spcPct val="0"/>
-              </a:spcBef>
-              <a:spcAft>
-                <a:spcPct val="0"/>
-              </a:spcAft>
-              <a:defRPr sz="2400">
-                <a:solidFill>
-                  <a:schemeClr val="tx1"/>
-                </a:solidFill>
-                <a:latin typeface="Trebuchet MS" charset="0"/>
-                <a:ea typeface="ＭＳ Ｐゴシック" charset="0"/>
-              </a:defRPr>
-            </a:lvl7pPr>
-            <a:lvl8pPr marL="3429000" indent="-228600" eaLnBrk="0" fontAlgn="base" hangingPunct="0">
-              <a:spcBef>
-                <a:spcPct val="0"/>
-              </a:spcBef>
-              <a:spcAft>
-                <a:spcPct val="0"/>
-              </a:spcAft>
-              <a:defRPr sz="2400">
-                <a:solidFill>
-                  <a:schemeClr val="tx1"/>
-                </a:solidFill>
-                <a:latin typeface="Trebuchet MS" charset="0"/>
-                <a:ea typeface="ＭＳ Ｐゴシック" charset="0"/>
-              </a:defRPr>
-            </a:lvl8pPr>
-            <a:lvl9pPr marL="3886200" indent="-228600" eaLnBrk="0" fontAlgn="base" hangingPunct="0">
-              <a:spcBef>
-                <a:spcPct val="0"/>
-              </a:spcBef>
-              <a:spcAft>
-                <a:spcPct val="0"/>
-              </a:spcAft>
-              <a:defRPr sz="2400">
-                <a:solidFill>
-                  <a:schemeClr val="tx1"/>
-                </a:solidFill>
-                <a:latin typeface="Trebuchet MS" charset="0"/>
-                <a:ea typeface="ＭＳ Ｐゴシック" charset="0"/>
-              </a:defRPr>
-            </a:lvl9pPr>
-          </a:lstStyle>
-          <a:p>
-            <a:pPr eaLnBrk="1" hangingPunct="1"/>
-            <a:fld id="{6382B355-693A-8047-A11A-9E0C32488441}" type="slidenum">
-              <a:rPr lang="en-US" sz="1200"/>
-              <a:pPr eaLnBrk="1" hangingPunct="1"/>
-              <a:t>24</a:t>
+            <a:fld id="{0B02E734-84D0-8641-B8E0-8B1913E3457A}" type="slidenum">
+              <a:rPr lang="en-US" smtClean="0"/>
+              <a:pPr>
+                <a:defRPr/>
+              </a:pPr>
+              <a:t>22</a:t>
             </a:fld>
-            <a:endParaRPr lang="en-US" sz="1200"/>
+            <a:endParaRPr lang="en-US"/>
           </a:p>
         </p:txBody>
       </p:sp>
     </p:spTree>
+    <p:extLst>
+      <p:ext uri="{BB962C8B-B14F-4D97-AF65-F5344CB8AC3E}">
+        <p14:creationId xmlns:p14="http://schemas.microsoft.com/office/powerpoint/2010/main" val="3163856772"/>
+      </p:ext>
+    </p:extLst>
   </p:cSld>
   <p:clrMapOvr>
     <a:masterClrMapping/>
@@ -2592,6 +2415,460 @@
         <p14:creationId xmlns:p14="http://schemas.microsoft.com/office/powerpoint/2010/main" val="2264689857"/>
       </p:ext>
     </p:extLst>
+  </p:cSld>
+  <p:clrMapOvr>
+    <a:masterClrMapping/>
+  </p:clrMapOvr>
+</p:notes>
+</file>
+
+<file path=ppt/notesSlides/notesSlide20.xml><?xml version="1.0" encoding="utf-8"?>
+<p:notes xmlns:a="http://schemas.openxmlformats.org/drawingml/2006/main" xmlns:r="http://schemas.openxmlformats.org/officeDocument/2006/relationships" xmlns:p="http://schemas.openxmlformats.org/presentationml/2006/main">
+  <p:cSld>
+    <p:spTree>
+      <p:nvGrpSpPr>
+        <p:cNvPr id="1" name=""/>
+        <p:cNvGrpSpPr/>
+        <p:nvPr/>
+      </p:nvGrpSpPr>
+      <p:grpSpPr>
+        <a:xfrm>
+          <a:off x="0" y="0"/>
+          <a:ext cx="0" cy="0"/>
+          <a:chOff x="0" y="0"/>
+          <a:chExt cx="0" cy="0"/>
+        </a:xfrm>
+      </p:grpSpPr>
+      <p:sp>
+        <p:nvSpPr>
+          <p:cNvPr id="2" name="Slide Image Placeholder 1"/>
+          <p:cNvSpPr>
+            <a:spLocks noGrp="1" noRot="1" noChangeAspect="1"/>
+          </p:cNvSpPr>
+          <p:nvPr>
+            <p:ph type="sldImg"/>
+          </p:nvPr>
+        </p:nvSpPr>
+        <p:spPr/>
+      </p:sp>
+      <p:sp>
+        <p:nvSpPr>
+          <p:cNvPr id="3" name="Notes Placeholder 2"/>
+          <p:cNvSpPr>
+            <a:spLocks noGrp="1"/>
+          </p:cNvSpPr>
+          <p:nvPr>
+            <p:ph type="body" idx="1"/>
+          </p:nvPr>
+        </p:nvSpPr>
+        <p:spPr/>
+        <p:txBody>
+          <a:bodyPr/>
+          <a:lstStyle/>
+          <a:p>
+            <a:r>
+              <a:rPr lang="en-US" dirty="0" smtClean="0"/>
+              <a:t>Three main types of updates:</a:t>
+            </a:r>
+          </a:p>
+          <a:p>
+            <a:r>
+              <a:rPr lang="en-US" dirty="0" smtClean="0"/>
+              <a:t>API updates – to get new Titanium APIs</a:t>
+            </a:r>
+          </a:p>
+          <a:p>
+            <a:r>
+              <a:rPr lang="en-US" dirty="0" smtClean="0"/>
+              <a:t>Ti</a:t>
+            </a:r>
+            <a:r>
+              <a:rPr lang="en-US" baseline="0" dirty="0" smtClean="0"/>
+              <a:t> Studio updates</a:t>
+            </a:r>
+          </a:p>
+          <a:p>
+            <a:r>
+              <a:rPr lang="en-US" baseline="0" dirty="0" smtClean="0"/>
+              <a:t>Install add-ons, such as SVN support</a:t>
+            </a:r>
+            <a:endParaRPr lang="en-US" dirty="0"/>
+          </a:p>
+        </p:txBody>
+      </p:sp>
+      <p:sp>
+        <p:nvSpPr>
+          <p:cNvPr id="4" name="Slide Number Placeholder 3"/>
+          <p:cNvSpPr>
+            <a:spLocks noGrp="1"/>
+          </p:cNvSpPr>
+          <p:nvPr>
+            <p:ph type="sldNum" sz="quarter" idx="10"/>
+          </p:nvPr>
+        </p:nvSpPr>
+        <p:spPr/>
+        <p:txBody>
+          <a:bodyPr/>
+          <a:lstStyle/>
+          <a:p>
+            <a:pPr>
+              <a:defRPr/>
+            </a:pPr>
+            <a:fld id="{0B02E734-84D0-8641-B8E0-8B1913E3457A}" type="slidenum">
+              <a:rPr lang="en-US" smtClean="0"/>
+              <a:pPr>
+                <a:defRPr/>
+              </a:pPr>
+              <a:t>23</a:t>
+            </a:fld>
+            <a:endParaRPr lang="en-US"/>
+          </a:p>
+        </p:txBody>
+      </p:sp>
+    </p:spTree>
+    <p:extLst>
+      <p:ext uri="{BB962C8B-B14F-4D97-AF65-F5344CB8AC3E}">
+        <p14:creationId xmlns:p14="http://schemas.microsoft.com/office/powerpoint/2010/main" val="1750815042"/>
+      </p:ext>
+    </p:extLst>
+  </p:cSld>
+  <p:clrMapOvr>
+    <a:masterClrMapping/>
+  </p:clrMapOvr>
+</p:notes>
+</file>
+
+<file path=ppt/notesSlides/notesSlide21.xml><?xml version="1.0" encoding="utf-8"?>
+<p:notes xmlns:a="http://schemas.openxmlformats.org/drawingml/2006/main" xmlns:r="http://schemas.openxmlformats.org/officeDocument/2006/relationships" xmlns:p="http://schemas.openxmlformats.org/presentationml/2006/main">
+  <p:cSld>
+    <p:spTree>
+      <p:nvGrpSpPr>
+        <p:cNvPr id="1" name=""/>
+        <p:cNvGrpSpPr/>
+        <p:nvPr/>
+      </p:nvGrpSpPr>
+      <p:grpSpPr>
+        <a:xfrm>
+          <a:off x="0" y="0"/>
+          <a:ext cx="0" cy="0"/>
+          <a:chOff x="0" y="0"/>
+          <a:chExt cx="0" cy="0"/>
+        </a:xfrm>
+      </p:grpSpPr>
+      <p:sp>
+        <p:nvSpPr>
+          <p:cNvPr id="56321" name="Slide Image Placeholder 1"/>
+          <p:cNvSpPr>
+            <a:spLocks noGrp="1" noRot="1" noChangeAspect="1"/>
+          </p:cNvSpPr>
+          <p:nvPr>
+            <p:ph type="sldImg"/>
+          </p:nvPr>
+        </p:nvSpPr>
+        <p:spPr bwMode="auto">
+          <a:noFill/>
+          <a:ln>
+            <a:solidFill>
+              <a:srgbClr val="000000"/>
+            </a:solidFill>
+            <a:miter lim="800000"/>
+            <a:headEnd/>
+            <a:tailEnd/>
+          </a:ln>
+          <a:extLst>
+            <a:ext uri="{909E8E84-426E-40dd-AFC4-6F175D3DCCD1}">
+              <a14:hiddenFill xmlns:a14="http://schemas.microsoft.com/office/drawing/2010/main">
+                <a:solidFill>
+                  <a:srgbClr val="FFFFFF"/>
+                </a:solidFill>
+              </a14:hiddenFill>
+            </a:ext>
+            <a:ext uri="{FAA26D3D-D897-4be2-8F04-BA451C77F1D7}">
+              <ma14:placeholderFlag xmlns:ma14="http://schemas.microsoft.com/office/mac/drawingml/2011/main" val="1"/>
+            </a:ext>
+          </a:extLst>
+        </p:spPr>
+      </p:sp>
+      <p:sp>
+        <p:nvSpPr>
+          <p:cNvPr id="56322" name="Notes Placeholder 2"/>
+          <p:cNvSpPr>
+            <a:spLocks noGrp="1"/>
+          </p:cNvSpPr>
+          <p:nvPr>
+            <p:ph type="body" idx="1"/>
+          </p:nvPr>
+        </p:nvSpPr>
+        <p:spPr bwMode="auto">
+          <a:noFill/>
+          <a:extLst>
+            <a:ext uri="{909E8E84-426E-40dd-AFC4-6F175D3DCCD1}">
+              <a14:hiddenFill xmlns:a14="http://schemas.microsoft.com/office/drawing/2010/main">
+                <a:solidFill>
+                  <a:srgbClr val="FFFFFF"/>
+                </a:solidFill>
+              </a14:hiddenFill>
+            </a:ext>
+            <a:ext uri="{91240B29-F687-4f45-9708-019B960494DF}">
+              <a14:hiddenLine xmlns:a14="http://schemas.microsoft.com/office/drawing/2010/main" w="9525">
+                <a:solidFill>
+                  <a:srgbClr val="000000"/>
+                </a:solidFill>
+                <a:miter lim="800000"/>
+                <a:headEnd/>
+                <a:tailEnd/>
+              </a14:hiddenLine>
+            </a:ext>
+            <a:ext uri="{FAA26D3D-D897-4be2-8F04-BA451C77F1D7}">
+              <ma14:placeholderFlag xmlns:ma14="http://schemas.microsoft.com/office/mac/drawingml/2011/main" val="1"/>
+            </a:ext>
+          </a:extLst>
+        </p:spPr>
+        <p:txBody>
+          <a:bodyPr wrap="square" numCol="1" anchor="t" anchorCtr="0" compatLnSpc="1">
+            <a:prstTxWarp prst="textNoShape">
+              <a:avLst/>
+            </a:prstTxWarp>
+          </a:bodyPr>
+          <a:lstStyle/>
+          <a:p>
+            <a:pPr>
+              <a:defRPr/>
+            </a:pPr>
+            <a:r>
+              <a:rPr lang="en-US" sz="1200" dirty="0" smtClean="0"/>
+              <a:t>Ideas:</a:t>
+            </a:r>
+          </a:p>
+          <a:p>
+            <a:pPr marL="342900" indent="-342900">
+              <a:buFontTx/>
+              <a:buChar char="-"/>
+              <a:defRPr/>
+            </a:pPr>
+            <a:r>
+              <a:rPr lang="en-US" sz="1200" dirty="0" smtClean="0"/>
+              <a:t>debug a project</a:t>
+            </a:r>
+          </a:p>
+          <a:p>
+            <a:pPr marL="342900" indent="-342900">
+              <a:buFontTx/>
+              <a:buChar char="-"/>
+              <a:defRPr/>
+            </a:pPr>
+            <a:r>
+              <a:rPr lang="en-US" sz="1200" dirty="0" smtClean="0"/>
+              <a:t>import a </a:t>
+            </a:r>
+            <a:r>
+              <a:rPr lang="en-US" sz="1200" dirty="0" err="1" smtClean="0"/>
+              <a:t>textmate</a:t>
+            </a:r>
+            <a:r>
+              <a:rPr lang="en-US" sz="1200" dirty="0" smtClean="0"/>
+              <a:t> theme and/or bundle</a:t>
+            </a:r>
+          </a:p>
+          <a:p>
+            <a:pPr marL="342900" indent="-342900">
+              <a:buFontTx/>
+              <a:buChar char="-"/>
+              <a:defRPr/>
+            </a:pPr>
+            <a:r>
+              <a:rPr lang="en-US" sz="1200" dirty="0" smtClean="0"/>
+              <a:t>configure or create a shortcut</a:t>
+            </a:r>
+          </a:p>
+          <a:p>
+            <a:pPr marL="342900" indent="-342900">
+              <a:buFontTx/>
+              <a:buChar char="-"/>
+              <a:defRPr/>
+            </a:pPr>
+            <a:r>
+              <a:rPr lang="en-US" sz="1200" dirty="0" smtClean="0"/>
+              <a:t>configure colors and theme settings</a:t>
+            </a:r>
+          </a:p>
+          <a:p>
+            <a:pPr marL="342900" indent="-342900">
+              <a:buFontTx/>
+              <a:buChar char="-"/>
+              <a:defRPr/>
+            </a:pPr>
+            <a:r>
+              <a:rPr lang="en-US" sz="1200" dirty="0" smtClean="0"/>
+              <a:t>configure Ti Mobile settings (API level, emulator options)</a:t>
+            </a:r>
+          </a:p>
+          <a:p>
+            <a:pPr eaLnBrk="1" hangingPunct="1"/>
+            <a:endParaRPr lang="en-US" dirty="0">
+              <a:latin typeface="Calibri" charset="0"/>
+            </a:endParaRPr>
+          </a:p>
+        </p:txBody>
+      </p:sp>
+      <p:sp>
+        <p:nvSpPr>
+          <p:cNvPr id="56323" name="Slide Number Placeholder 3"/>
+          <p:cNvSpPr>
+            <a:spLocks noGrp="1"/>
+          </p:cNvSpPr>
+          <p:nvPr>
+            <p:ph type="sldNum" sz="quarter" idx="5"/>
+          </p:nvPr>
+        </p:nvSpPr>
+        <p:spPr bwMode="auto">
+          <a:noFill/>
+          <a:extLst>
+            <a:ext uri="{909E8E84-426E-40dd-AFC4-6F175D3DCCD1}">
+              <a14:hiddenFill xmlns:a14="http://schemas.microsoft.com/office/drawing/2010/main">
+                <a:solidFill>
+                  <a:srgbClr val="FFFFFF"/>
+                </a:solidFill>
+              </a14:hiddenFill>
+            </a:ext>
+            <a:ext uri="{91240B29-F687-4f45-9708-019B960494DF}">
+              <a14:hiddenLine xmlns:a14="http://schemas.microsoft.com/office/drawing/2010/main" w="9525">
+                <a:solidFill>
+                  <a:srgbClr val="000000"/>
+                </a:solidFill>
+                <a:miter lim="800000"/>
+                <a:headEnd/>
+                <a:tailEnd/>
+              </a14:hiddenLine>
+            </a:ext>
+          </a:extLst>
+        </p:spPr>
+        <p:txBody>
+          <a:bodyPr wrap="square" numCol="1" anchorCtr="0" compatLnSpc="1">
+            <a:prstTxWarp prst="textNoShape">
+              <a:avLst/>
+            </a:prstTxWarp>
+          </a:bodyPr>
+          <a:lstStyle>
+            <a:lvl1pPr eaLnBrk="0" hangingPunct="0">
+              <a:defRPr sz="2400">
+                <a:solidFill>
+                  <a:schemeClr val="tx1"/>
+                </a:solidFill>
+                <a:latin typeface="Trebuchet MS" charset="0"/>
+                <a:ea typeface="ＭＳ Ｐゴシック" charset="0"/>
+                <a:cs typeface="ＭＳ Ｐゴシック" charset="0"/>
+              </a:defRPr>
+            </a:lvl1pPr>
+            <a:lvl2pPr marL="742950" indent="-285750" eaLnBrk="0" hangingPunct="0">
+              <a:defRPr sz="2400">
+                <a:solidFill>
+                  <a:schemeClr val="tx1"/>
+                </a:solidFill>
+                <a:latin typeface="Trebuchet MS" charset="0"/>
+                <a:ea typeface="ＭＳ Ｐゴシック" charset="0"/>
+              </a:defRPr>
+            </a:lvl2pPr>
+            <a:lvl3pPr marL="1143000" indent="-228600" eaLnBrk="0" hangingPunct="0">
+              <a:defRPr sz="2400">
+                <a:solidFill>
+                  <a:schemeClr val="tx1"/>
+                </a:solidFill>
+                <a:latin typeface="Trebuchet MS" charset="0"/>
+                <a:ea typeface="ＭＳ Ｐゴシック" charset="0"/>
+              </a:defRPr>
+            </a:lvl3pPr>
+            <a:lvl4pPr marL="1600200" indent="-228600" eaLnBrk="0" hangingPunct="0">
+              <a:defRPr sz="2400">
+                <a:solidFill>
+                  <a:schemeClr val="tx1"/>
+                </a:solidFill>
+                <a:latin typeface="Trebuchet MS" charset="0"/>
+                <a:ea typeface="ＭＳ Ｐゴシック" charset="0"/>
+              </a:defRPr>
+            </a:lvl4pPr>
+            <a:lvl5pPr marL="2057400" indent="-228600" eaLnBrk="0" hangingPunct="0">
+              <a:defRPr sz="2400">
+                <a:solidFill>
+                  <a:schemeClr val="tx1"/>
+                </a:solidFill>
+                <a:latin typeface="Trebuchet MS" charset="0"/>
+                <a:ea typeface="ＭＳ Ｐゴシック" charset="0"/>
+              </a:defRPr>
+            </a:lvl5pPr>
+            <a:lvl6pPr marL="2514600" indent="-228600" eaLnBrk="0" fontAlgn="base" hangingPunct="0">
+              <a:spcBef>
+                <a:spcPct val="0"/>
+              </a:spcBef>
+              <a:spcAft>
+                <a:spcPct val="0"/>
+              </a:spcAft>
+              <a:defRPr sz="2400">
+                <a:solidFill>
+                  <a:schemeClr val="tx1"/>
+                </a:solidFill>
+                <a:latin typeface="Trebuchet MS" charset="0"/>
+                <a:ea typeface="ＭＳ Ｐゴシック" charset="0"/>
+              </a:defRPr>
+            </a:lvl6pPr>
+            <a:lvl7pPr marL="2971800" indent="-228600" eaLnBrk="0" fontAlgn="base" hangingPunct="0">
+              <a:spcBef>
+                <a:spcPct val="0"/>
+              </a:spcBef>
+              <a:spcAft>
+                <a:spcPct val="0"/>
+              </a:spcAft>
+              <a:defRPr sz="2400">
+                <a:solidFill>
+                  <a:schemeClr val="tx1"/>
+                </a:solidFill>
+                <a:latin typeface="Trebuchet MS" charset="0"/>
+                <a:ea typeface="ＭＳ Ｐゴシック" charset="0"/>
+              </a:defRPr>
+            </a:lvl7pPr>
+            <a:lvl8pPr marL="3429000" indent="-228600" eaLnBrk="0" fontAlgn="base" hangingPunct="0">
+              <a:spcBef>
+                <a:spcPct val="0"/>
+              </a:spcBef>
+              <a:spcAft>
+                <a:spcPct val="0"/>
+              </a:spcAft>
+              <a:defRPr sz="2400">
+                <a:solidFill>
+                  <a:schemeClr val="tx1"/>
+                </a:solidFill>
+                <a:latin typeface="Trebuchet MS" charset="0"/>
+                <a:ea typeface="ＭＳ Ｐゴシック" charset="0"/>
+              </a:defRPr>
+            </a:lvl8pPr>
+            <a:lvl9pPr marL="3886200" indent="-228600" eaLnBrk="0" fontAlgn="base" hangingPunct="0">
+              <a:spcBef>
+                <a:spcPct val="0"/>
+              </a:spcBef>
+              <a:spcAft>
+                <a:spcPct val="0"/>
+              </a:spcAft>
+              <a:defRPr sz="2400">
+                <a:solidFill>
+                  <a:schemeClr val="tx1"/>
+                </a:solidFill>
+                <a:latin typeface="Trebuchet MS" charset="0"/>
+                <a:ea typeface="ＭＳ Ｐゴシック" charset="0"/>
+              </a:defRPr>
+            </a:lvl9pPr>
+          </a:lstStyle>
+          <a:p>
+            <a:pPr eaLnBrk="1" hangingPunct="1"/>
+            <a:fld id="{6382B355-693A-8047-A11A-9E0C32488441}" type="slidenum">
+              <a:rPr lang="en-US" sz="1200"/>
+              <a:pPr eaLnBrk="1" hangingPunct="1"/>
+              <a:t>25</a:t>
+            </a:fld>
+            <a:endParaRPr lang="en-US" sz="1200"/>
+          </a:p>
+        </p:txBody>
+      </p:sp>
+    </p:spTree>
   </p:cSld>
   <p:clrMapOvr>
     <a:masterClrMapping/>
@@ -2980,6 +3257,47 @@
           <a:p>
             <a:r>
               <a:rPr lang="en-US" dirty="0" smtClean="0"/>
+              <a:t>Code</a:t>
+            </a:r>
+            <a:r>
+              <a:rPr lang="en-US" baseline="0" dirty="0" smtClean="0"/>
+              <a:t> completions offers  “content assist proposals”</a:t>
+            </a:r>
+          </a:p>
+          <a:p>
+            <a:r>
+              <a:rPr lang="en-US" baseline="0" dirty="0" smtClean="0"/>
+              <a:t>Code assist displays “context information” pop-ups with arguments and parameters</a:t>
+            </a:r>
+            <a:endParaRPr lang="en-US" dirty="0" smtClean="0"/>
+          </a:p>
+          <a:p>
+            <a:r>
+              <a:rPr lang="en-US" dirty="0" smtClean="0"/>
+              <a:t>Custom code assist:</a:t>
+            </a:r>
+            <a:endParaRPr lang="en-US" baseline="0" dirty="0" smtClean="0"/>
+          </a:p>
+          <a:p>
+            <a:pPr marL="171450" marR="0" indent="-171450" algn="l" defTabSz="457200" rtl="0" eaLnBrk="0" fontAlgn="base" latinLnBrk="0" hangingPunct="0">
+              <a:lnSpc>
+                <a:spcPct val="100000"/>
+              </a:lnSpc>
+              <a:spcBef>
+                <a:spcPct val="30000"/>
+              </a:spcBef>
+              <a:spcAft>
+                <a:spcPct val="0"/>
+              </a:spcAft>
+              <a:buClrTx/>
+              <a:buSzTx/>
+              <a:buFont typeface="Arial"/>
+              <a:buChar char="•"/>
+              <a:tabLst/>
+              <a:defRPr/>
+            </a:pPr>
+            <a:r>
+              <a:rPr lang="en-US" dirty="0" smtClean="0"/>
               <a:t>Use </a:t>
             </a:r>
             <a:r>
@@ -2992,16 +3310,10 @@
             </a:r>
           </a:p>
           <a:p>
-            <a:r>
-              <a:rPr lang="en-US" dirty="0" smtClean="0"/>
-              <a:t>Code assist will then pick</a:t>
-            </a:r>
-            <a:r>
-              <a:rPr lang="en-US" baseline="0" dirty="0" smtClean="0"/>
-              <a:t> up your documentation and provide custom code assistance</a:t>
-            </a:r>
-          </a:p>
-          <a:p>
+            <a:pPr marL="171450" indent="-171450">
+              <a:buFont typeface="Arial"/>
+              <a:buChar char="•"/>
+            </a:pPr>
             <a:r>
               <a:rPr lang="en-US" baseline="0" dirty="0" smtClean="0"/>
               <a:t>Notations should be added in specific order, see wiki for full details</a:t>
@@ -3246,17 +3558,37 @@
           <a:p>
             <a:r>
               <a:rPr lang="en-US" dirty="0" smtClean="0"/>
-              <a:t>You can use Titanium Studio for all your mobile and web development</a:t>
-            </a:r>
-          </a:p>
-          <a:p>
-            <a:r>
-              <a:rPr lang="en-US" dirty="0" smtClean="0"/>
-              <a:t>Deployment options go beyond</a:t>
+              <a:t>Common</a:t>
             </a:r>
             <a:r>
               <a:rPr lang="en-US" baseline="0" dirty="0" smtClean="0"/>
-              <a:t> mobile</a:t>
+              <a:t> use cases include:</a:t>
+            </a:r>
+          </a:p>
+          <a:p>
+            <a:r>
+              <a:rPr lang="en-US" baseline="0" dirty="0" smtClean="0"/>
+              <a:t>Launching Android debug tools (</a:t>
+            </a:r>
+            <a:r>
+              <a:rPr lang="en-US" baseline="0" dirty="0" err="1" smtClean="0"/>
+              <a:t>ddms</a:t>
+            </a:r>
+            <a:r>
+              <a:rPr lang="en-US" baseline="0" dirty="0" smtClean="0"/>
+              <a:t>)</a:t>
+            </a:r>
+          </a:p>
+          <a:p>
+            <a:r>
+              <a:rPr lang="en-US" baseline="0" dirty="0" smtClean="0"/>
+              <a:t>Copying files</a:t>
+            </a:r>
+          </a:p>
+          <a:p>
+            <a:r>
+              <a:rPr lang="en-US" baseline="0" dirty="0" smtClean="0"/>
+              <a:t>Pushing a CI build to your repository</a:t>
             </a:r>
             <a:endParaRPr lang="en-US" dirty="0"/>
           </a:p>
@@ -3285,7 +3617,7 @@
               <a:pPr>
                 <a:defRPr/>
               </a:pPr>
-              <a:t>10</a:t>
+              <a:t>9</a:t>
             </a:fld>
             <a:endParaRPr lang="en-US"/>
           </a:p>
@@ -3294,7 +3626,7 @@
     </p:spTree>
     <p:extLst>
       <p:ext uri="{BB962C8B-B14F-4D97-AF65-F5344CB8AC3E}">
-        <p14:creationId xmlns:p14="http://schemas.microsoft.com/office/powerpoint/2010/main" val="636962213"/>
+        <p14:creationId xmlns:p14="http://schemas.microsoft.com/office/powerpoint/2010/main" val="2796561886"/>
       </p:ext>
     </p:extLst>
   </p:cSld>
@@ -3350,19 +3682,17 @@
           <a:p>
             <a:r>
               <a:rPr lang="en-US" dirty="0" smtClean="0"/>
-              <a:t>Set by double-clicking line</a:t>
+              <a:t>You can use Titanium Studio for all your mobile and web development</a:t>
             </a:r>
           </a:p>
           <a:p>
             <a:r>
               <a:rPr lang="en-US" dirty="0" smtClean="0"/>
-              <a:t>Clear by double-clicking</a:t>
-            </a:r>
-          </a:p>
-          <a:p>
-            <a:r>
-              <a:rPr lang="en-US" dirty="0" smtClean="0"/>
-              <a:t>Use Debug menu to build</a:t>
+              <a:t>Deployment options go beyond</a:t>
+            </a:r>
+            <a:r>
+              <a:rPr lang="en-US" baseline="0" dirty="0" smtClean="0"/>
+              <a:t> mobile</a:t>
             </a:r>
             <a:endParaRPr lang="en-US" dirty="0"/>
           </a:p>
@@ -3391,7 +3721,7 @@
               <a:pPr>
                 <a:defRPr/>
               </a:pPr>
-              <a:t>12</a:t>
+              <a:t>10</a:t>
             </a:fld>
             <a:endParaRPr lang="en-US"/>
           </a:p>
@@ -3400,7 +3730,7 @@
     </p:spTree>
     <p:extLst>
       <p:ext uri="{BB962C8B-B14F-4D97-AF65-F5344CB8AC3E}">
-        <p14:creationId xmlns:p14="http://schemas.microsoft.com/office/powerpoint/2010/main" val="1621067713"/>
+        <p14:creationId xmlns:p14="http://schemas.microsoft.com/office/powerpoint/2010/main" val="636962213"/>
       </p:ext>
     </p:extLst>
   </p:cSld>
@@ -3732,7 +4062,7 @@
               <a:pPr>
                 <a:defRPr/>
               </a:pPr>
-              <a:t>6/3/11</a:t>
+              <a:t>6/10/11</a:t>
             </a:fld>
             <a:endParaRPr lang="en-US"/>
           </a:p>
@@ -4022,7 +4352,7 @@
               <a:pPr>
                 <a:defRPr/>
               </a:pPr>
-              <a:t>6/3/11</a:t>
+              <a:t>6/10/11</a:t>
             </a:fld>
             <a:endParaRPr lang="en-US"/>
           </a:p>
@@ -4219,7 +4549,7 @@
               <a:pPr>
                 <a:defRPr/>
               </a:pPr>
-              <a:t>6/3/11</a:t>
+              <a:t>6/10/11</a:t>
             </a:fld>
             <a:endParaRPr lang="en-US"/>
           </a:p>
@@ -4426,7 +4756,7 @@
               <a:pPr>
                 <a:defRPr/>
               </a:pPr>
-              <a:t>6/3/11</a:t>
+              <a:t>6/10/11</a:t>
             </a:fld>
             <a:endParaRPr lang="en-US"/>
           </a:p>
@@ -4695,7 +5025,7 @@
               <a:pPr>
                 <a:defRPr/>
               </a:pPr>
-              <a:t>6/3/11</a:t>
+              <a:t>6/10/11</a:t>
             </a:fld>
             <a:endParaRPr lang="en-US"/>
           </a:p>
@@ -4892,7 +5222,7 @@
               <a:pPr>
                 <a:defRPr/>
               </a:pPr>
-              <a:t>6/3/11</a:t>
+              <a:t>6/10/11</a:t>
             </a:fld>
             <a:endParaRPr lang="en-US"/>
           </a:p>
@@ -5165,7 +5495,7 @@
               <a:pPr>
                 <a:defRPr/>
               </a:pPr>
-              <a:t>6/3/11</a:t>
+              <a:t>6/10/11</a:t>
             </a:fld>
             <a:endParaRPr lang="en-US"/>
           </a:p>
@@ -5480,7 +5810,7 @@
               <a:pPr>
                 <a:defRPr/>
               </a:pPr>
-              <a:t>6/3/11</a:t>
+              <a:t>6/10/11</a:t>
             </a:fld>
             <a:endParaRPr lang="en-US"/>
           </a:p>
@@ -5929,7 +6259,7 @@
               <a:pPr>
                 <a:defRPr/>
               </a:pPr>
-              <a:t>6/3/11</a:t>
+              <a:t>6/10/11</a:t>
             </a:fld>
             <a:endParaRPr lang="en-US"/>
           </a:p>
@@ -6074,7 +6404,7 @@
               <a:pPr>
                 <a:defRPr/>
               </a:pPr>
-              <a:t>6/3/11</a:t>
+              <a:t>6/10/11</a:t>
             </a:fld>
             <a:endParaRPr lang="en-US"/>
           </a:p>
@@ -6196,7 +6526,7 @@
               <a:pPr>
                 <a:defRPr/>
               </a:pPr>
-              <a:t>6/3/11</a:t>
+              <a:t>6/10/11</a:t>
             </a:fld>
             <a:endParaRPr lang="en-US"/>
           </a:p>
@@ -6414,7 +6744,7 @@
               <a:pPr>
                 <a:defRPr/>
               </a:pPr>
-              <a:t>6/3/11</a:t>
+              <a:t>6/10/11</a:t>
             </a:fld>
             <a:endParaRPr lang="en-US"/>
           </a:p>
@@ -6718,7 +7048,7 @@
               <a:pPr>
                 <a:defRPr/>
               </a:pPr>
-              <a:t>6/3/11</a:t>
+              <a:t>6/10/11</a:t>
             </a:fld>
             <a:endParaRPr lang="en-US"/>
           </a:p>
@@ -7001,7 +7331,7 @@
               <a:pPr>
                 <a:defRPr/>
               </a:pPr>
-              <a:t>6/3/11</a:t>
+              <a:t>6/10/11</a:t>
             </a:fld>
             <a:endParaRPr lang="en-US"/>
           </a:p>
@@ -7198,7 +7528,7 @@
               <a:pPr>
                 <a:defRPr/>
               </a:pPr>
-              <a:t>6/3/11</a:t>
+              <a:t>6/10/11</a:t>
             </a:fld>
             <a:endParaRPr lang="en-US"/>
           </a:p>
@@ -7405,7 +7735,7 @@
               <a:pPr>
                 <a:defRPr/>
               </a:pPr>
-              <a:t>6/3/11</a:t>
+              <a:t>6/10/11</a:t>
             </a:fld>
             <a:endParaRPr lang="en-US"/>
           </a:p>
@@ -7913,7 +8243,7 @@
               <a:pPr>
                 <a:defRPr/>
               </a:pPr>
-              <a:t>6/3/11</a:t>
+              <a:t>6/10/11</a:t>
             </a:fld>
             <a:endParaRPr lang="en-US"/>
           </a:p>
@@ -8219,7 +8549,7 @@
               <a:pPr>
                 <a:defRPr/>
               </a:pPr>
-              <a:t>6/3/11</a:t>
+              <a:t>6/10/11</a:t>
             </a:fld>
             <a:endParaRPr lang="en-US"/>
           </a:p>
@@ -8543,7 +8873,7 @@
               <a:pPr>
                 <a:defRPr/>
               </a:pPr>
-              <a:t>6/3/11</a:t>
+              <a:t>6/10/11</a:t>
             </a:fld>
             <a:endParaRPr lang="en-US"/>
           </a:p>
@@ -8992,7 +9322,7 @@
               <a:pPr>
                 <a:defRPr/>
               </a:pPr>
-              <a:t>6/3/11</a:t>
+              <a:t>6/10/11</a:t>
             </a:fld>
             <a:endParaRPr lang="en-US"/>
           </a:p>
@@ -9137,7 +9467,7 @@
               <a:pPr>
                 <a:defRPr/>
               </a:pPr>
-              <a:t>6/3/11</a:t>
+              <a:t>6/10/11</a:t>
             </a:fld>
             <a:endParaRPr lang="en-US"/>
           </a:p>
@@ -9259,7 +9589,7 @@
               <a:pPr>
                 <a:defRPr/>
               </a:pPr>
-              <a:t>6/3/11</a:t>
+              <a:t>6/10/11</a:t>
             </a:fld>
             <a:endParaRPr lang="en-US"/>
           </a:p>
@@ -9563,7 +9893,7 @@
               <a:pPr>
                 <a:defRPr/>
               </a:pPr>
-              <a:t>6/3/11</a:t>
+              <a:t>6/10/11</a:t>
             </a:fld>
             <a:endParaRPr lang="en-US"/>
           </a:p>
@@ -9849,7 +10179,7 @@
               <a:pPr>
                 <a:defRPr/>
               </a:pPr>
-              <a:t>6/3/11</a:t>
+              <a:t>6/10/11</a:t>
             </a:fld>
             <a:endParaRPr lang="en-US"/>
           </a:p>
@@ -10819,7 +11149,7 @@
               <a:pPr>
                 <a:defRPr/>
               </a:pPr>
-              <a:t>6/3/11</a:t>
+              <a:t>6/10/11</a:t>
             </a:fld>
             <a:endParaRPr lang="en-US"/>
           </a:p>
@@ -11785,11 +12115,20 @@
           <a:p>
             <a:pPr eaLnBrk="1" hangingPunct="1"/>
             <a:r>
-              <a:rPr lang="en-US">
+              <a:rPr lang="en-US" dirty="0">
                 <a:latin typeface="Trebuchet MS" charset="0"/>
               </a:rPr>
-              <a:t>Deployment and distribution</a:t>
-            </a:r>
+              <a:t>Deployment and </a:t>
+            </a:r>
+            <a:r>
+              <a:rPr lang="en-US" dirty="0" smtClean="0">
+                <a:latin typeface="Trebuchet MS" charset="0"/>
+              </a:rPr>
+              <a:t>Distribution</a:t>
+            </a:r>
+            <a:endParaRPr lang="en-US" dirty="0">
+              <a:latin typeface="Trebuchet MS" charset="0"/>
+            </a:endParaRPr>
           </a:p>
         </p:txBody>
       </p:sp>
@@ -12060,6 +12399,268 @@
               <a:rPr lang="en-US" dirty="0" smtClean="0">
                 <a:latin typeface="Trebuchet MS" charset="0"/>
               </a:rPr>
+              <a:t>Code Validation</a:t>
+            </a:r>
+            <a:endParaRPr lang="en-US" dirty="0">
+              <a:latin typeface="Trebuchet MS" charset="0"/>
+            </a:endParaRPr>
+          </a:p>
+        </p:txBody>
+      </p:sp>
+      <p:sp>
+        <p:nvSpPr>
+          <p:cNvPr id="52226" name="Content Placeholder 2"/>
+          <p:cNvSpPr>
+            <a:spLocks noGrp="1"/>
+          </p:cNvSpPr>
+          <p:nvPr>
+            <p:ph idx="1"/>
+          </p:nvPr>
+        </p:nvSpPr>
+        <p:spPr/>
+        <p:txBody>
+          <a:bodyPr/>
+          <a:lstStyle/>
+          <a:p>
+            <a:pPr marL="0" indent="0" eaLnBrk="1" hangingPunct="1"/>
+            <a:r>
+              <a:rPr lang="en-US" dirty="0" smtClean="0">
+                <a:latin typeface="Trebuchet MS" charset="0"/>
+              </a:rPr>
+              <a:t>Inline Validation</a:t>
+            </a:r>
+          </a:p>
+          <a:p>
+            <a:pPr marL="0" indent="0" eaLnBrk="1" hangingPunct="1"/>
+            <a:endParaRPr lang="en-US" dirty="0">
+              <a:latin typeface="Trebuchet MS" charset="0"/>
+            </a:endParaRPr>
+          </a:p>
+          <a:p>
+            <a:pPr marL="0" indent="0" eaLnBrk="1" hangingPunct="1"/>
+            <a:r>
+              <a:rPr lang="en-US" dirty="0" smtClean="0">
+                <a:latin typeface="Trebuchet MS" charset="0"/>
+              </a:rPr>
+              <a:t>Problems Console</a:t>
+            </a:r>
+          </a:p>
+          <a:p>
+            <a:pPr marL="0" indent="0" eaLnBrk="1" hangingPunct="1"/>
+            <a:endParaRPr lang="en-US" dirty="0" smtClean="0">
+              <a:latin typeface="Trebuchet MS" charset="0"/>
+            </a:endParaRPr>
+          </a:p>
+          <a:p>
+            <a:pPr marL="0" indent="0" eaLnBrk="1" hangingPunct="1"/>
+            <a:endParaRPr lang="en-US" dirty="0">
+              <a:latin typeface="Trebuchet MS" charset="0"/>
+            </a:endParaRPr>
+          </a:p>
+          <a:p>
+            <a:pPr marL="0" indent="0" eaLnBrk="1" hangingPunct="1"/>
+            <a:endParaRPr lang="en-US" dirty="0" smtClean="0">
+              <a:latin typeface="Trebuchet MS" charset="0"/>
+            </a:endParaRPr>
+          </a:p>
+          <a:p>
+            <a:pPr marL="0" indent="0" eaLnBrk="1" hangingPunct="1"/>
+            <a:endParaRPr lang="en-US" dirty="0" smtClean="0">
+              <a:latin typeface="Trebuchet MS" charset="0"/>
+            </a:endParaRPr>
+          </a:p>
+          <a:p>
+            <a:pPr marL="0" indent="0" eaLnBrk="1" hangingPunct="1"/>
+            <a:r>
+              <a:rPr lang="en-US" dirty="0" smtClean="0">
+                <a:latin typeface="Trebuchet MS" charset="0"/>
+              </a:rPr>
+              <a:t>Validation Preferences</a:t>
+            </a:r>
+          </a:p>
+          <a:p>
+            <a:pPr marL="114300" lvl="1" eaLnBrk="1" hangingPunct="1"/>
+            <a:r>
+              <a:rPr lang="en-US" dirty="0" smtClean="0">
+                <a:latin typeface="Trebuchet MS" charset="0"/>
+              </a:rPr>
+              <a:t>	Preferences &gt; </a:t>
+            </a:r>
+            <a:r>
+              <a:rPr lang="en-US" dirty="0">
+                <a:latin typeface="Trebuchet MS" charset="0"/>
+              </a:rPr>
+              <a:t>Titanium Studio </a:t>
+            </a:r>
+            <a:r>
+              <a:rPr lang="en-US" dirty="0" smtClean="0">
+                <a:latin typeface="Trebuchet MS" charset="0"/>
+              </a:rPr>
+              <a:t>&gt; </a:t>
+            </a:r>
+            <a:r>
+              <a:rPr lang="en-US" dirty="0">
+                <a:latin typeface="Trebuchet MS" charset="0"/>
+              </a:rPr>
+              <a:t>Validation </a:t>
+            </a:r>
+            <a:r>
+              <a:rPr lang="en-US" dirty="0" smtClean="0">
+                <a:latin typeface="Trebuchet MS" charset="0"/>
+              </a:rPr>
+              <a:t>&gt; JavaScript</a:t>
+            </a:r>
+          </a:p>
+          <a:p>
+            <a:pPr marL="0" indent="0" eaLnBrk="1" hangingPunct="1"/>
+            <a:endParaRPr lang="en-US" dirty="0">
+              <a:latin typeface="Trebuchet MS" charset="0"/>
+            </a:endParaRPr>
+          </a:p>
+        </p:txBody>
+      </p:sp>
+      <p:pic>
+        <p:nvPicPr>
+          <p:cNvPr id="2" name="Picture 1" descr="Screen shot 2011-06-10 at 11.11.56 AM.png"/>
+          <p:cNvPicPr>
+            <a:picLocks noChangeAspect="1"/>
+          </p:cNvPicPr>
+          <p:nvPr/>
+        </p:nvPicPr>
+        <p:blipFill>
+          <a:blip r:embed="rId3">
+            <a:extLst>
+              <a:ext uri="{28A0092B-C50C-407E-A947-70E740481C1C}">
+                <a14:useLocalDpi xmlns:a14="http://schemas.microsoft.com/office/drawing/2010/main" val="0"/>
+              </a:ext>
+            </a:extLst>
+          </a:blip>
+          <a:stretch>
+            <a:fillRect/>
+          </a:stretch>
+        </p:blipFill>
+        <p:spPr>
+          <a:xfrm>
+            <a:off x="6311900" y="1346200"/>
+            <a:ext cx="1923047" cy="678722"/>
+          </a:xfrm>
+          <a:prstGeom prst="rect">
+            <a:avLst/>
+          </a:prstGeom>
+          <a:ln>
+            <a:noFill/>
+          </a:ln>
+          <a:effectLst>
+            <a:outerShdw blurRad="292100" dist="139700" dir="2700000" algn="tl" rotWithShape="0">
+              <a:srgbClr val="333333">
+                <a:alpha val="65000"/>
+              </a:srgbClr>
+            </a:outerShdw>
+          </a:effectLst>
+        </p:spPr>
+      </p:pic>
+      <p:pic>
+        <p:nvPicPr>
+          <p:cNvPr id="3" name="Picture 2" descr="Screen shot 2011-06-10 at 11.14.12 AM.png"/>
+          <p:cNvPicPr>
+            <a:picLocks noChangeAspect="1"/>
+          </p:cNvPicPr>
+          <p:nvPr/>
+        </p:nvPicPr>
+        <p:blipFill>
+          <a:blip r:embed="rId4">
+            <a:extLst>
+              <a:ext uri="{28A0092B-C50C-407E-A947-70E740481C1C}">
+                <a14:useLocalDpi xmlns:a14="http://schemas.microsoft.com/office/drawing/2010/main" val="0"/>
+              </a:ext>
+            </a:extLst>
+          </a:blip>
+          <a:stretch>
+            <a:fillRect/>
+          </a:stretch>
+        </p:blipFill>
+        <p:spPr>
+          <a:xfrm>
+            <a:off x="1978526" y="2861521"/>
+            <a:ext cx="6896100" cy="1114425"/>
+          </a:xfrm>
+          <a:prstGeom prst="rect">
+            <a:avLst/>
+          </a:prstGeom>
+          <a:ln>
+            <a:noFill/>
+          </a:ln>
+          <a:effectLst>
+            <a:outerShdw blurRad="292100" dist="139700" dir="2700000" algn="tl" rotWithShape="0">
+              <a:srgbClr val="333333">
+                <a:alpha val="65000"/>
+              </a:srgbClr>
+            </a:outerShdw>
+          </a:effectLst>
+        </p:spPr>
+      </p:pic>
+    </p:spTree>
+    <p:extLst>
+      <p:ext uri="{BB962C8B-B14F-4D97-AF65-F5344CB8AC3E}">
+        <p14:creationId xmlns:p14="http://schemas.microsoft.com/office/powerpoint/2010/main" val="291679770"/>
+      </p:ext>
+    </p:extLst>
+  </p:cSld>
+  <p:clrMapOvr>
+    <a:masterClrMapping/>
+  </p:clrMapOvr>
+  <p:timing>
+    <p:tnLst>
+      <p:par>
+        <p:cTn xmlns:p14="http://schemas.microsoft.com/office/powerpoint/2010/main" id="1" dur="indefinite" restart="never" nodeType="tmRoot"/>
+      </p:par>
+    </p:tnLst>
+  </p:timing>
+</p:sld>
+</file>
+
+<file path=ppt/slides/slide13.xml><?xml version="1.0" encoding="utf-8"?>
+<p:sld xmlns:a="http://schemas.openxmlformats.org/drawingml/2006/main" xmlns:r="http://schemas.openxmlformats.org/officeDocument/2006/relationships" xmlns:p="http://schemas.openxmlformats.org/presentationml/2006/main">
+  <p:cSld>
+    <p:spTree>
+      <p:nvGrpSpPr>
+        <p:cNvPr id="1" name=""/>
+        <p:cNvGrpSpPr/>
+        <p:nvPr/>
+      </p:nvGrpSpPr>
+      <p:grpSpPr>
+        <a:xfrm>
+          <a:off x="0" y="0"/>
+          <a:ext cx="0" cy="0"/>
+          <a:chOff x="0" y="0"/>
+          <a:chExt cx="0" cy="0"/>
+        </a:xfrm>
+      </p:grpSpPr>
+      <p:sp>
+        <p:nvSpPr>
+          <p:cNvPr id="52225" name="Title 1"/>
+          <p:cNvSpPr>
+            <a:spLocks noGrp="1"/>
+          </p:cNvSpPr>
+          <p:nvPr>
+            <p:ph type="title"/>
+          </p:nvPr>
+        </p:nvSpPr>
+        <p:spPr>
+          <a:xfrm>
+            <a:off x="457200" y="204788"/>
+            <a:ext cx="8229600" cy="809625"/>
+          </a:xfrm>
+        </p:spPr>
+        <p:txBody>
+          <a:bodyPr/>
+          <a:lstStyle/>
+          <a:p>
+            <a:pPr eaLnBrk="1" hangingPunct="1"/>
+            <a:r>
+              <a:rPr lang="en-US" dirty="0" smtClean="0">
+                <a:latin typeface="Trebuchet MS" charset="0"/>
+              </a:rPr>
               <a:t>Breakpoints</a:t>
             </a:r>
             <a:endParaRPr lang="en-US" dirty="0">
@@ -12280,7 +12881,7 @@
 </p:sld>
 </file>
 
-<file path=ppt/slides/slide13.xml><?xml version="1.0" encoding="utf-8"?>
+<file path=ppt/slides/slide14.xml><?xml version="1.0" encoding="utf-8"?>
 <p:sld xmlns:a="http://schemas.openxmlformats.org/drawingml/2006/main" xmlns:r="http://schemas.openxmlformats.org/officeDocument/2006/relationships" xmlns:p="http://schemas.openxmlformats.org/presentationml/2006/main">
   <p:cSld>
     <p:spTree>
@@ -12314,7 +12915,7 @@
           <a:p>
             <a:r>
               <a:rPr lang="en-US" dirty="0" smtClean="0"/>
-              <a:t>Debug perspective</a:t>
+              <a:t>Debug Perspective</a:t>
             </a:r>
             <a:endParaRPr lang="en-US" dirty="0"/>
           </a:p>
@@ -12666,7 +13267,7 @@
 </p:sld>
 </file>
 
-<file path=ppt/slides/slide14.xml><?xml version="1.0" encoding="utf-8"?>
+<file path=ppt/slides/slide15.xml><?xml version="1.0" encoding="utf-8"?>
 <p:sld xmlns:a="http://schemas.openxmlformats.org/drawingml/2006/main" xmlns:r="http://schemas.openxmlformats.org/officeDocument/2006/relationships" xmlns:p="http://schemas.openxmlformats.org/presentationml/2006/main">
   <p:cSld>
     <p:spTree>
@@ -12708,7 +13309,7 @@
               <a:rPr lang="en-US" dirty="0" smtClean="0">
                 <a:latin typeface="Trebuchet MS" charset="0"/>
               </a:rPr>
-              <a:t>Variables state</a:t>
+              <a:t>Variables State</a:t>
             </a:r>
             <a:endParaRPr lang="en-US" dirty="0">
               <a:latin typeface="Trebuchet MS" charset="0"/>
@@ -12821,7 +13422,7 @@
 </p:sld>
 </file>
 
-<file path=ppt/slides/slide15.xml><?xml version="1.0" encoding="utf-8"?>
+<file path=ppt/slides/slide16.xml><?xml version="1.0" encoding="utf-8"?>
 <p:sld xmlns:a="http://schemas.openxmlformats.org/drawingml/2006/main" xmlns:r="http://schemas.openxmlformats.org/officeDocument/2006/relationships" xmlns:p="http://schemas.openxmlformats.org/presentationml/2006/main">
   <p:cSld>
     <p:spTree>
@@ -12944,7 +13545,7 @@
 </p:sld>
 </file>
 
-<file path=ppt/slides/slide16.xml><?xml version="1.0" encoding="utf-8"?>
+<file path=ppt/slides/slide17.xml><?xml version="1.0" encoding="utf-8"?>
 <p:sld xmlns:a="http://schemas.openxmlformats.org/drawingml/2006/main" xmlns:r="http://schemas.openxmlformats.org/officeDocument/2006/relationships" xmlns:p="http://schemas.openxmlformats.org/presentationml/2006/main">
   <p:cSld>
     <p:spTree>
@@ -13084,145 +13685,6 @@
     <p:extLst>
       <p:ext uri="{BB962C8B-B14F-4D97-AF65-F5344CB8AC3E}">
         <p14:creationId xmlns:p14="http://schemas.microsoft.com/office/powerpoint/2010/main" val="1446930609"/>
-      </p:ext>
-    </p:extLst>
-  </p:cSld>
-  <p:clrMapOvr>
-    <a:masterClrMapping/>
-  </p:clrMapOvr>
-</p:sld>
-</file>
-
-<file path=ppt/slides/slide17.xml><?xml version="1.0" encoding="utf-8"?>
-<p:sld xmlns:a="http://schemas.openxmlformats.org/drawingml/2006/main" xmlns:r="http://schemas.openxmlformats.org/officeDocument/2006/relationships" xmlns:p="http://schemas.openxmlformats.org/presentationml/2006/main">
-  <p:cSld>
-    <p:spTree>
-      <p:nvGrpSpPr>
-        <p:cNvPr id="1" name=""/>
-        <p:cNvGrpSpPr/>
-        <p:nvPr/>
-      </p:nvGrpSpPr>
-      <p:grpSpPr>
-        <a:xfrm>
-          <a:off x="0" y="0"/>
-          <a:ext cx="0" cy="0"/>
-          <a:chOff x="0" y="0"/>
-          <a:chExt cx="0" cy="0"/>
-        </a:xfrm>
-      </p:grpSpPr>
-      <p:sp>
-        <p:nvSpPr>
-          <p:cNvPr id="2" name="Title 1"/>
-          <p:cNvSpPr>
-            <a:spLocks noGrp="1"/>
-          </p:cNvSpPr>
-          <p:nvPr>
-            <p:ph type="title"/>
-          </p:nvPr>
-        </p:nvSpPr>
-        <p:spPr/>
-        <p:txBody>
-          <a:bodyPr/>
-          <a:lstStyle/>
-          <a:p>
-            <a:r>
-              <a:rPr lang="en-US" dirty="0" smtClean="0"/>
-              <a:t>Editor preferences</a:t>
-            </a:r>
-            <a:endParaRPr lang="en-US" dirty="0"/>
-          </a:p>
-        </p:txBody>
-      </p:sp>
-      <p:pic>
-        <p:nvPicPr>
-          <p:cNvPr id="4" name="Picture 3" descr="Screen shot 2011-05-31 at 12.22.19 PM.png"/>
-          <p:cNvPicPr>
-            <a:picLocks noChangeAspect="1"/>
-          </p:cNvPicPr>
-          <p:nvPr/>
-        </p:nvPicPr>
-        <p:blipFill>
-          <a:blip r:embed="rId3">
-            <a:extLst>
-              <a:ext uri="{28A0092B-C50C-407E-A947-70E740481C1C}">
-                <a14:useLocalDpi xmlns:a14="http://schemas.microsoft.com/office/drawing/2010/main" val="0"/>
-              </a:ext>
-            </a:extLst>
-          </a:blip>
-          <a:stretch>
-            <a:fillRect/>
-          </a:stretch>
-        </p:blipFill>
-        <p:spPr>
-          <a:xfrm>
-            <a:off x="4891728" y="1114972"/>
-            <a:ext cx="4252272" cy="4757191"/>
-          </a:xfrm>
-          <a:prstGeom prst="rect">
-            <a:avLst/>
-          </a:prstGeom>
-        </p:spPr>
-      </p:pic>
-      <p:sp>
-        <p:nvSpPr>
-          <p:cNvPr id="5" name="Content Placeholder 2"/>
-          <p:cNvSpPr>
-            <a:spLocks noGrp="1"/>
-          </p:cNvSpPr>
-          <p:nvPr>
-            <p:ph idx="1"/>
-          </p:nvPr>
-        </p:nvSpPr>
-        <p:spPr>
-          <a:xfrm>
-            <a:off x="457199" y="1346200"/>
-            <a:ext cx="4342063" cy="4525963"/>
-          </a:xfrm>
-        </p:spPr>
-        <p:txBody>
-          <a:bodyPr/>
-          <a:lstStyle/>
-          <a:p>
-            <a:r>
-              <a:rPr lang="en-US" dirty="0" smtClean="0"/>
-              <a:t>Configure line numbering, highlight color and more for a given Editor</a:t>
-            </a:r>
-          </a:p>
-          <a:p>
-            <a:endParaRPr lang="en-US" dirty="0"/>
-          </a:p>
-          <a:p>
-            <a:r>
-              <a:rPr lang="en-US" dirty="0" smtClean="0"/>
-              <a:t>Right-click in editor, choose Preferences</a:t>
-            </a:r>
-          </a:p>
-          <a:p>
-            <a:endParaRPr lang="en-US" dirty="0"/>
-          </a:p>
-          <a:p>
-            <a:r>
-              <a:rPr lang="en-US" dirty="0" smtClean="0"/>
-              <a:t>Word wrap:</a:t>
-            </a:r>
-          </a:p>
-          <a:p>
-            <a:r>
-              <a:rPr lang="en-US" dirty="0"/>
-              <a:t>	</a:t>
-            </a:r>
-            <a:r>
-              <a:rPr lang="en-US" sz="2000" dirty="0" smtClean="0"/>
-              <a:t>Right-click, choose Word Wrap</a:t>
-            </a:r>
-            <a:endParaRPr lang="en-US" dirty="0" smtClean="0"/>
-          </a:p>
-        </p:txBody>
-      </p:sp>
-    </p:spTree>
-    <p:extLst>
-      <p:ext uri="{BB962C8B-B14F-4D97-AF65-F5344CB8AC3E}">
-        <p14:creationId xmlns:p14="http://schemas.microsoft.com/office/powerpoint/2010/main" val="1868421841"/>
       </p:ext>
     </p:extLst>
   </p:cSld>
@@ -13273,7 +13735,1033 @@
           <a:p>
             <a:r>
               <a:rPr lang="en-US" dirty="0" smtClean="0"/>
-              <a:t>Customization concepts</a:t>
+              <a:t>Editor Preferences</a:t>
+            </a:r>
+            <a:endParaRPr lang="en-US" dirty="0"/>
+          </a:p>
+        </p:txBody>
+      </p:sp>
+      <p:sp>
+        <p:nvSpPr>
+          <p:cNvPr id="5" name="Content Placeholder 2"/>
+          <p:cNvSpPr>
+            <a:spLocks noGrp="1"/>
+          </p:cNvSpPr>
+          <p:nvPr>
+            <p:ph idx="1"/>
+          </p:nvPr>
+        </p:nvSpPr>
+        <p:spPr>
+          <a:xfrm>
+            <a:off x="457199" y="1346200"/>
+            <a:ext cx="4342063" cy="4525963"/>
+          </a:xfrm>
+        </p:spPr>
+        <p:txBody>
+          <a:bodyPr/>
+          <a:lstStyle/>
+          <a:p>
+            <a:pPr marL="0" lvl="1"/>
+            <a:r>
+              <a:rPr lang="en-US" sz="2400" dirty="0" smtClean="0"/>
+              <a:t>Editor-Specific Preferences</a:t>
+            </a:r>
+          </a:p>
+          <a:p>
+            <a:pPr lvl="1"/>
+            <a:r>
+              <a:rPr lang="en-US" dirty="0" smtClean="0"/>
+              <a:t>Preferences </a:t>
+            </a:r>
+            <a:r>
+              <a:rPr lang="en-US" dirty="0" smtClean="0"/>
+              <a:t>&gt; Titanium Studio</a:t>
+            </a:r>
+            <a:br>
+              <a:rPr lang="en-US" dirty="0" smtClean="0"/>
+            </a:br>
+            <a:r>
+              <a:rPr lang="en-US" dirty="0" smtClean="0"/>
+              <a:t>	&gt; Editors</a:t>
+            </a:r>
+            <a:endParaRPr lang="en-US" dirty="0"/>
+          </a:p>
+          <a:p>
+            <a:endParaRPr lang="en-US" dirty="0" smtClean="0"/>
+          </a:p>
+          <a:p>
+            <a:r>
+              <a:rPr lang="en-US" dirty="0" smtClean="0"/>
+              <a:t>General Editor Preferences</a:t>
+            </a:r>
+          </a:p>
+          <a:p>
+            <a:pPr lvl="1"/>
+            <a:r>
+              <a:rPr lang="en-US" dirty="0" smtClean="0"/>
+              <a:t>Right-click, choose</a:t>
+            </a:r>
+            <a:br>
+              <a:rPr lang="en-US" dirty="0" smtClean="0"/>
+            </a:br>
+            <a:r>
+              <a:rPr lang="en-US" dirty="0" smtClean="0"/>
+              <a:t>	Preferences</a:t>
+            </a:r>
+          </a:p>
+          <a:p>
+            <a:endParaRPr lang="en-US" dirty="0"/>
+          </a:p>
+          <a:p>
+            <a:r>
+              <a:rPr lang="en-US" dirty="0" smtClean="0"/>
+              <a:t>Word wrap:</a:t>
+            </a:r>
+          </a:p>
+          <a:p>
+            <a:pPr lvl="1"/>
+            <a:r>
+              <a:rPr lang="en-US" dirty="0" smtClean="0"/>
+              <a:t>Right-click, choose Word Wrap</a:t>
+            </a:r>
+          </a:p>
+        </p:txBody>
+      </p:sp>
+      <p:pic>
+        <p:nvPicPr>
+          <p:cNvPr id="3" name="Picture 2" descr="Screen shot 2011-06-10 at 11.24.49 AM.png"/>
+          <p:cNvPicPr>
+            <a:picLocks noChangeAspect="1"/>
+          </p:cNvPicPr>
+          <p:nvPr/>
+        </p:nvPicPr>
+        <p:blipFill>
+          <a:blip r:embed="rId3">
+            <a:extLst>
+              <a:ext uri="{28A0092B-C50C-407E-A947-70E740481C1C}">
+                <a14:useLocalDpi xmlns:a14="http://schemas.microsoft.com/office/drawing/2010/main" val="0"/>
+              </a:ext>
+            </a:extLst>
+          </a:blip>
+          <a:stretch>
+            <a:fillRect/>
+          </a:stretch>
+        </p:blipFill>
+        <p:spPr>
+          <a:xfrm>
+            <a:off x="4485473" y="1265992"/>
+            <a:ext cx="4603750" cy="5162550"/>
+          </a:xfrm>
+          <a:prstGeom prst="rect">
+            <a:avLst/>
+          </a:prstGeom>
+        </p:spPr>
+      </p:pic>
+      <p:pic>
+        <p:nvPicPr>
+          <p:cNvPr id="6" name="Picture 5" descr="Screen shot 2011-06-10 at 11.32.13 AM.png"/>
+          <p:cNvPicPr>
+            <a:picLocks noChangeAspect="1"/>
+          </p:cNvPicPr>
+          <p:nvPr/>
+        </p:nvPicPr>
+        <p:blipFill>
+          <a:blip r:embed="rId4">
+            <a:extLst>
+              <a:ext uri="{28A0092B-C50C-407E-A947-70E740481C1C}">
+                <a14:useLocalDpi xmlns:a14="http://schemas.microsoft.com/office/drawing/2010/main" val="0"/>
+              </a:ext>
+            </a:extLst>
+          </a:blip>
+          <a:stretch>
+            <a:fillRect/>
+          </a:stretch>
+        </p:blipFill>
+        <p:spPr>
+          <a:xfrm>
+            <a:off x="4650573" y="1346200"/>
+            <a:ext cx="4438650" cy="4965700"/>
+          </a:xfrm>
+          <a:prstGeom prst="rect">
+            <a:avLst/>
+          </a:prstGeom>
+        </p:spPr>
+      </p:pic>
+      <p:pic>
+        <p:nvPicPr>
+          <p:cNvPr id="7" name="Picture 36" descr="tv_advert.png"/>
+          <p:cNvPicPr>
+            <a:picLocks noChangeAspect="1"/>
+          </p:cNvPicPr>
+          <p:nvPr/>
+        </p:nvPicPr>
+        <p:blipFill>
+          <a:blip r:embed="rId5">
+            <a:extLst>
+              <a:ext uri="{28A0092B-C50C-407E-A947-70E740481C1C}">
+                <a14:useLocalDpi xmlns:a14="http://schemas.microsoft.com/office/drawing/2010/main" val="0"/>
+              </a:ext>
+            </a:extLst>
+          </a:blip>
+          <a:srcRect/>
+          <a:stretch>
+            <a:fillRect/>
+          </a:stretch>
+        </p:blipFill>
+        <p:spPr bwMode="auto">
+          <a:xfrm>
+            <a:off x="8543606" y="0"/>
+            <a:ext cx="480315" cy="481263"/>
+          </a:xfrm>
+          <a:prstGeom prst="rect">
+            <a:avLst/>
+          </a:prstGeom>
+          <a:noFill/>
+          <a:ln>
+            <a:noFill/>
+          </a:ln>
+          <a:extLst>
+            <a:ext uri="{909E8E84-426E-40dd-AFC4-6F175D3DCCD1}">
+              <a14:hiddenFill xmlns:a14="http://schemas.microsoft.com/office/drawing/2010/main">
+                <a:solidFill>
+                  <a:srgbClr val="FFFFFF"/>
+                </a:solidFill>
+              </a14:hiddenFill>
+            </a:ext>
+            <a:ext uri="{91240B29-F687-4f45-9708-019B960494DF}">
+              <a14:hiddenLine xmlns:a14="http://schemas.microsoft.com/office/drawing/2010/main" w="9525">
+                <a:solidFill>
+                  <a:srgbClr val="000000"/>
+                </a:solidFill>
+                <a:miter lim="800000"/>
+                <a:headEnd/>
+                <a:tailEnd/>
+              </a14:hiddenLine>
+            </a:ext>
+          </a:extLst>
+        </p:spPr>
+      </p:pic>
+    </p:spTree>
+    <p:extLst>
+      <p:ext uri="{BB962C8B-B14F-4D97-AF65-F5344CB8AC3E}">
+        <p14:creationId xmlns:p14="http://schemas.microsoft.com/office/powerpoint/2010/main" val="1868421841"/>
+      </p:ext>
+    </p:extLst>
+  </p:cSld>
+  <p:clrMapOvr>
+    <a:masterClrMapping/>
+  </p:clrMapOvr>
+  <p:timing>
+    <p:tnLst>
+      <p:par>
+        <p:cTn xmlns:p14="http://schemas.microsoft.com/office/powerpoint/2010/main" id="1" dur="indefinite" restart="never" nodeType="tmRoot">
+          <p:childTnLst>
+            <p:seq concurrent="1" nextAc="seek">
+              <p:cTn id="2" dur="indefinite" nodeType="mainSeq">
+                <p:childTnLst>
+                  <p:par>
+                    <p:cTn id="3" fill="hold">
+                      <p:stCondLst>
+                        <p:cond delay="indefinite"/>
+                      </p:stCondLst>
+                      <p:childTnLst>
+                        <p:par>
+                          <p:cTn id="4" fill="hold">
+                            <p:stCondLst>
+                              <p:cond delay="0"/>
+                            </p:stCondLst>
+                            <p:childTnLst>
+                              <p:par>
+                                <p:cTn id="5" presetID="2" presetClass="entr" presetSubtype="4" fill="hold" grpId="1" nodeType="withEffect">
+                                  <p:stCondLst>
+                                    <p:cond delay="0"/>
+                                  </p:stCondLst>
+                                  <p:childTnLst>
+                                    <p:set>
+                                      <p:cBhvr>
+                                        <p:cTn id="6" dur="1" fill="hold">
+                                          <p:stCondLst>
+                                            <p:cond delay="0"/>
+                                          </p:stCondLst>
+                                        </p:cTn>
+                                        <p:tgtEl>
+                                          <p:spTgt spid="5">
+                                            <p:txEl>
+                                              <p:pRg st="0" end="0"/>
+                                            </p:txEl>
+                                          </p:spTgt>
+                                        </p:tgtEl>
+                                        <p:attrNameLst>
+                                          <p:attrName>style.visibility</p:attrName>
+                                        </p:attrNameLst>
+                                      </p:cBhvr>
+                                      <p:to>
+                                        <p:strVal val="visible"/>
+                                      </p:to>
+                                    </p:set>
+                                    <p:anim calcmode="lin" valueType="num">
+                                      <p:cBhvr additive="base">
+                                        <p:cTn id="7" dur="500" fill="hold"/>
+                                        <p:tgtEl>
+                                          <p:spTgt spid="5">
+                                            <p:txEl>
+                                              <p:pRg st="0" end="0"/>
+                                            </p:txEl>
+                                          </p:spTgt>
+                                        </p:tgtEl>
+                                        <p:attrNameLst>
+                                          <p:attrName>ppt_x</p:attrName>
+                                        </p:attrNameLst>
+                                      </p:cBhvr>
+                                      <p:tavLst>
+                                        <p:tav tm="0">
+                                          <p:val>
+                                            <p:strVal val="#ppt_x"/>
+                                          </p:val>
+                                        </p:tav>
+                                        <p:tav tm="100000">
+                                          <p:val>
+                                            <p:strVal val="#ppt_x"/>
+                                          </p:val>
+                                        </p:tav>
+                                      </p:tavLst>
+                                    </p:anim>
+                                    <p:anim calcmode="lin" valueType="num">
+                                      <p:cBhvr additive="base">
+                                        <p:cTn id="8" dur="500" fill="hold"/>
+                                        <p:tgtEl>
+                                          <p:spTgt spid="5">
+                                            <p:txEl>
+                                              <p:pRg st="0" end="0"/>
+                                            </p:txEl>
+                                          </p:spTgt>
+                                        </p:tgtEl>
+                                        <p:attrNameLst>
+                                          <p:attrName>ppt_y</p:attrName>
+                                        </p:attrNameLst>
+                                      </p:cBhvr>
+                                      <p:tavLst>
+                                        <p:tav tm="0">
+                                          <p:val>
+                                            <p:strVal val="1+#ppt_h/2"/>
+                                          </p:val>
+                                        </p:tav>
+                                        <p:tav tm="100000">
+                                          <p:val>
+                                            <p:strVal val="#ppt_y"/>
+                                          </p:val>
+                                        </p:tav>
+                                      </p:tavLst>
+                                    </p:anim>
+                                  </p:childTnLst>
+                                </p:cTn>
+                              </p:par>
+                              <p:par>
+                                <p:cTn id="9" presetID="2" presetClass="entr" presetSubtype="4" fill="hold" grpId="1" nodeType="withEffect">
+                                  <p:stCondLst>
+                                    <p:cond delay="0"/>
+                                  </p:stCondLst>
+                                  <p:childTnLst>
+                                    <p:set>
+                                      <p:cBhvr>
+                                        <p:cTn id="10" dur="1" fill="hold">
+                                          <p:stCondLst>
+                                            <p:cond delay="0"/>
+                                          </p:stCondLst>
+                                        </p:cTn>
+                                        <p:tgtEl>
+                                          <p:spTgt spid="5">
+                                            <p:txEl>
+                                              <p:pRg st="1" end="1"/>
+                                            </p:txEl>
+                                          </p:spTgt>
+                                        </p:tgtEl>
+                                        <p:attrNameLst>
+                                          <p:attrName>style.visibility</p:attrName>
+                                        </p:attrNameLst>
+                                      </p:cBhvr>
+                                      <p:to>
+                                        <p:strVal val="visible"/>
+                                      </p:to>
+                                    </p:set>
+                                    <p:anim calcmode="lin" valueType="num">
+                                      <p:cBhvr additive="base">
+                                        <p:cTn id="11" dur="500" fill="hold"/>
+                                        <p:tgtEl>
+                                          <p:spTgt spid="5">
+                                            <p:txEl>
+                                              <p:pRg st="1" end="1"/>
+                                            </p:txEl>
+                                          </p:spTgt>
+                                        </p:tgtEl>
+                                        <p:attrNameLst>
+                                          <p:attrName>ppt_x</p:attrName>
+                                        </p:attrNameLst>
+                                      </p:cBhvr>
+                                      <p:tavLst>
+                                        <p:tav tm="0">
+                                          <p:val>
+                                            <p:strVal val="#ppt_x"/>
+                                          </p:val>
+                                        </p:tav>
+                                        <p:tav tm="100000">
+                                          <p:val>
+                                            <p:strVal val="#ppt_x"/>
+                                          </p:val>
+                                        </p:tav>
+                                      </p:tavLst>
+                                    </p:anim>
+                                    <p:anim calcmode="lin" valueType="num">
+                                      <p:cBhvr additive="base">
+                                        <p:cTn id="12" dur="500" fill="hold"/>
+                                        <p:tgtEl>
+                                          <p:spTgt spid="5">
+                                            <p:txEl>
+                                              <p:pRg st="1" end="1"/>
+                                            </p:txEl>
+                                          </p:spTgt>
+                                        </p:tgtEl>
+                                        <p:attrNameLst>
+                                          <p:attrName>ppt_y</p:attrName>
+                                        </p:attrNameLst>
+                                      </p:cBhvr>
+                                      <p:tavLst>
+                                        <p:tav tm="0">
+                                          <p:val>
+                                            <p:strVal val="1+#ppt_h/2"/>
+                                          </p:val>
+                                        </p:tav>
+                                        <p:tav tm="100000">
+                                          <p:val>
+                                            <p:strVal val="#ppt_y"/>
+                                          </p:val>
+                                        </p:tav>
+                                      </p:tavLst>
+                                    </p:anim>
+                                  </p:childTnLst>
+                                </p:cTn>
+                              </p:par>
+                              <p:par>
+                                <p:cTn id="13" presetID="9" presetClass="entr" presetSubtype="0" fill="hold" nodeType="withEffect">
+                                  <p:stCondLst>
+                                    <p:cond delay="0"/>
+                                  </p:stCondLst>
+                                  <p:childTnLst>
+                                    <p:set>
+                                      <p:cBhvr>
+                                        <p:cTn id="14" dur="1" fill="hold">
+                                          <p:stCondLst>
+                                            <p:cond delay="0"/>
+                                          </p:stCondLst>
+                                        </p:cTn>
+                                        <p:tgtEl>
+                                          <p:spTgt spid="3"/>
+                                        </p:tgtEl>
+                                        <p:attrNameLst>
+                                          <p:attrName>style.visibility</p:attrName>
+                                        </p:attrNameLst>
+                                      </p:cBhvr>
+                                      <p:to>
+                                        <p:strVal val="visible"/>
+                                      </p:to>
+                                    </p:set>
+                                    <p:animEffect transition="in" filter="dissolve">
+                                      <p:cBhvr>
+                                        <p:cTn id="15" dur="500"/>
+                                        <p:tgtEl>
+                                          <p:spTgt spid="3"/>
+                                        </p:tgtEl>
+                                      </p:cBhvr>
+                                    </p:animEffect>
+                                  </p:childTnLst>
+                                </p:cTn>
+                              </p:par>
+                            </p:childTnLst>
+                          </p:cTn>
+                        </p:par>
+                      </p:childTnLst>
+                    </p:cTn>
+                  </p:par>
+                  <p:par>
+                    <p:cTn id="16" fill="hold">
+                      <p:stCondLst>
+                        <p:cond delay="indefinite"/>
+                      </p:stCondLst>
+                      <p:childTnLst>
+                        <p:par>
+                          <p:cTn id="17" fill="hold">
+                            <p:stCondLst>
+                              <p:cond delay="0"/>
+                            </p:stCondLst>
+                            <p:childTnLst>
+                              <p:par>
+                                <p:cTn id="18" presetID="2" presetClass="entr" presetSubtype="4" fill="hold" grpId="1" nodeType="clickEffect">
+                                  <p:stCondLst>
+                                    <p:cond delay="0"/>
+                                  </p:stCondLst>
+                                  <p:childTnLst>
+                                    <p:set>
+                                      <p:cBhvr>
+                                        <p:cTn id="19" dur="1" fill="hold">
+                                          <p:stCondLst>
+                                            <p:cond delay="0"/>
+                                          </p:stCondLst>
+                                        </p:cTn>
+                                        <p:tgtEl>
+                                          <p:spTgt spid="5">
+                                            <p:txEl>
+                                              <p:pRg st="3" end="3"/>
+                                            </p:txEl>
+                                          </p:spTgt>
+                                        </p:tgtEl>
+                                        <p:attrNameLst>
+                                          <p:attrName>style.visibility</p:attrName>
+                                        </p:attrNameLst>
+                                      </p:cBhvr>
+                                      <p:to>
+                                        <p:strVal val="visible"/>
+                                      </p:to>
+                                    </p:set>
+                                    <p:anim calcmode="lin" valueType="num">
+                                      <p:cBhvr additive="base">
+                                        <p:cTn id="20" dur="500" fill="hold"/>
+                                        <p:tgtEl>
+                                          <p:spTgt spid="5">
+                                            <p:txEl>
+                                              <p:pRg st="3" end="3"/>
+                                            </p:txEl>
+                                          </p:spTgt>
+                                        </p:tgtEl>
+                                        <p:attrNameLst>
+                                          <p:attrName>ppt_x</p:attrName>
+                                        </p:attrNameLst>
+                                      </p:cBhvr>
+                                      <p:tavLst>
+                                        <p:tav tm="0">
+                                          <p:val>
+                                            <p:strVal val="#ppt_x"/>
+                                          </p:val>
+                                        </p:tav>
+                                        <p:tav tm="100000">
+                                          <p:val>
+                                            <p:strVal val="#ppt_x"/>
+                                          </p:val>
+                                        </p:tav>
+                                      </p:tavLst>
+                                    </p:anim>
+                                    <p:anim calcmode="lin" valueType="num">
+                                      <p:cBhvr additive="base">
+                                        <p:cTn id="21" dur="500" fill="hold"/>
+                                        <p:tgtEl>
+                                          <p:spTgt spid="5">
+                                            <p:txEl>
+                                              <p:pRg st="3" end="3"/>
+                                            </p:txEl>
+                                          </p:spTgt>
+                                        </p:tgtEl>
+                                        <p:attrNameLst>
+                                          <p:attrName>ppt_y</p:attrName>
+                                        </p:attrNameLst>
+                                      </p:cBhvr>
+                                      <p:tavLst>
+                                        <p:tav tm="0">
+                                          <p:val>
+                                            <p:strVal val="1+#ppt_h/2"/>
+                                          </p:val>
+                                        </p:tav>
+                                        <p:tav tm="100000">
+                                          <p:val>
+                                            <p:strVal val="#ppt_y"/>
+                                          </p:val>
+                                        </p:tav>
+                                      </p:tavLst>
+                                    </p:anim>
+                                  </p:childTnLst>
+                                </p:cTn>
+                              </p:par>
+                              <p:par>
+                                <p:cTn id="22" presetID="2" presetClass="entr" presetSubtype="4" fill="hold" grpId="1" nodeType="withEffect">
+                                  <p:stCondLst>
+                                    <p:cond delay="0"/>
+                                  </p:stCondLst>
+                                  <p:childTnLst>
+                                    <p:set>
+                                      <p:cBhvr>
+                                        <p:cTn id="23" dur="1" fill="hold">
+                                          <p:stCondLst>
+                                            <p:cond delay="0"/>
+                                          </p:stCondLst>
+                                        </p:cTn>
+                                        <p:tgtEl>
+                                          <p:spTgt spid="5">
+                                            <p:txEl>
+                                              <p:pRg st="4" end="4"/>
+                                            </p:txEl>
+                                          </p:spTgt>
+                                        </p:tgtEl>
+                                        <p:attrNameLst>
+                                          <p:attrName>style.visibility</p:attrName>
+                                        </p:attrNameLst>
+                                      </p:cBhvr>
+                                      <p:to>
+                                        <p:strVal val="visible"/>
+                                      </p:to>
+                                    </p:set>
+                                    <p:anim calcmode="lin" valueType="num">
+                                      <p:cBhvr additive="base">
+                                        <p:cTn id="24" dur="500" fill="hold"/>
+                                        <p:tgtEl>
+                                          <p:spTgt spid="5">
+                                            <p:txEl>
+                                              <p:pRg st="4" end="4"/>
+                                            </p:txEl>
+                                          </p:spTgt>
+                                        </p:tgtEl>
+                                        <p:attrNameLst>
+                                          <p:attrName>ppt_x</p:attrName>
+                                        </p:attrNameLst>
+                                      </p:cBhvr>
+                                      <p:tavLst>
+                                        <p:tav tm="0">
+                                          <p:val>
+                                            <p:strVal val="#ppt_x"/>
+                                          </p:val>
+                                        </p:tav>
+                                        <p:tav tm="100000">
+                                          <p:val>
+                                            <p:strVal val="#ppt_x"/>
+                                          </p:val>
+                                        </p:tav>
+                                      </p:tavLst>
+                                    </p:anim>
+                                    <p:anim calcmode="lin" valueType="num">
+                                      <p:cBhvr additive="base">
+                                        <p:cTn id="25" dur="500" fill="hold"/>
+                                        <p:tgtEl>
+                                          <p:spTgt spid="5">
+                                            <p:txEl>
+                                              <p:pRg st="4" end="4"/>
+                                            </p:txEl>
+                                          </p:spTgt>
+                                        </p:tgtEl>
+                                        <p:attrNameLst>
+                                          <p:attrName>ppt_y</p:attrName>
+                                        </p:attrNameLst>
+                                      </p:cBhvr>
+                                      <p:tavLst>
+                                        <p:tav tm="0">
+                                          <p:val>
+                                            <p:strVal val="1+#ppt_h/2"/>
+                                          </p:val>
+                                        </p:tav>
+                                        <p:tav tm="100000">
+                                          <p:val>
+                                            <p:strVal val="#ppt_y"/>
+                                          </p:val>
+                                        </p:tav>
+                                      </p:tavLst>
+                                    </p:anim>
+                                  </p:childTnLst>
+                                </p:cTn>
+                              </p:par>
+                              <p:par>
+                                <p:cTn id="26" presetID="9" presetClass="exit" presetSubtype="0" fill="hold" nodeType="withEffect">
+                                  <p:stCondLst>
+                                    <p:cond delay="0"/>
+                                  </p:stCondLst>
+                                  <p:childTnLst>
+                                    <p:animEffect transition="out" filter="dissolve">
+                                      <p:cBhvr>
+                                        <p:cTn id="27" dur="500"/>
+                                        <p:tgtEl>
+                                          <p:spTgt spid="3"/>
+                                        </p:tgtEl>
+                                      </p:cBhvr>
+                                    </p:animEffect>
+                                    <p:set>
+                                      <p:cBhvr>
+                                        <p:cTn id="28" dur="1" fill="hold">
+                                          <p:stCondLst>
+                                            <p:cond delay="499"/>
+                                          </p:stCondLst>
+                                        </p:cTn>
+                                        <p:tgtEl>
+                                          <p:spTgt spid="3"/>
+                                        </p:tgtEl>
+                                        <p:attrNameLst>
+                                          <p:attrName>style.visibility</p:attrName>
+                                        </p:attrNameLst>
+                                      </p:cBhvr>
+                                      <p:to>
+                                        <p:strVal val="hidden"/>
+                                      </p:to>
+                                    </p:set>
+                                  </p:childTnLst>
+                                </p:cTn>
+                              </p:par>
+                              <p:par>
+                                <p:cTn id="29" presetID="9" presetClass="entr" presetSubtype="0" fill="hold" nodeType="withEffect">
+                                  <p:stCondLst>
+                                    <p:cond delay="0"/>
+                                  </p:stCondLst>
+                                  <p:childTnLst>
+                                    <p:set>
+                                      <p:cBhvr>
+                                        <p:cTn id="30" dur="1" fill="hold">
+                                          <p:stCondLst>
+                                            <p:cond delay="0"/>
+                                          </p:stCondLst>
+                                        </p:cTn>
+                                        <p:tgtEl>
+                                          <p:spTgt spid="6"/>
+                                        </p:tgtEl>
+                                        <p:attrNameLst>
+                                          <p:attrName>style.visibility</p:attrName>
+                                        </p:attrNameLst>
+                                      </p:cBhvr>
+                                      <p:to>
+                                        <p:strVal val="visible"/>
+                                      </p:to>
+                                    </p:set>
+                                    <p:animEffect transition="in" filter="dissolve">
+                                      <p:cBhvr>
+                                        <p:cTn id="31" dur="500"/>
+                                        <p:tgtEl>
+                                          <p:spTgt spid="6"/>
+                                        </p:tgtEl>
+                                      </p:cBhvr>
+                                    </p:animEffect>
+                                  </p:childTnLst>
+                                </p:cTn>
+                              </p:par>
+                            </p:childTnLst>
+                          </p:cTn>
+                        </p:par>
+                      </p:childTnLst>
+                    </p:cTn>
+                  </p:par>
+                  <p:par>
+                    <p:cTn id="32" fill="hold">
+                      <p:stCondLst>
+                        <p:cond delay="indefinite"/>
+                      </p:stCondLst>
+                      <p:childTnLst>
+                        <p:par>
+                          <p:cTn id="33" fill="hold">
+                            <p:stCondLst>
+                              <p:cond delay="0"/>
+                            </p:stCondLst>
+                            <p:childTnLst>
+                              <p:par>
+                                <p:cTn id="34" presetID="2" presetClass="entr" presetSubtype="4" fill="hold" grpId="1" nodeType="clickEffect">
+                                  <p:stCondLst>
+                                    <p:cond delay="0"/>
+                                  </p:stCondLst>
+                                  <p:childTnLst>
+                                    <p:set>
+                                      <p:cBhvr>
+                                        <p:cTn id="35" dur="1" fill="hold">
+                                          <p:stCondLst>
+                                            <p:cond delay="0"/>
+                                          </p:stCondLst>
+                                        </p:cTn>
+                                        <p:tgtEl>
+                                          <p:spTgt spid="5">
+                                            <p:txEl>
+                                              <p:pRg st="6" end="6"/>
+                                            </p:txEl>
+                                          </p:spTgt>
+                                        </p:tgtEl>
+                                        <p:attrNameLst>
+                                          <p:attrName>style.visibility</p:attrName>
+                                        </p:attrNameLst>
+                                      </p:cBhvr>
+                                      <p:to>
+                                        <p:strVal val="visible"/>
+                                      </p:to>
+                                    </p:set>
+                                    <p:anim calcmode="lin" valueType="num">
+                                      <p:cBhvr additive="base">
+                                        <p:cTn id="36" dur="500" fill="hold"/>
+                                        <p:tgtEl>
+                                          <p:spTgt spid="5">
+                                            <p:txEl>
+                                              <p:pRg st="6" end="6"/>
+                                            </p:txEl>
+                                          </p:spTgt>
+                                        </p:tgtEl>
+                                        <p:attrNameLst>
+                                          <p:attrName>ppt_x</p:attrName>
+                                        </p:attrNameLst>
+                                      </p:cBhvr>
+                                      <p:tavLst>
+                                        <p:tav tm="0">
+                                          <p:val>
+                                            <p:strVal val="#ppt_x"/>
+                                          </p:val>
+                                        </p:tav>
+                                        <p:tav tm="100000">
+                                          <p:val>
+                                            <p:strVal val="#ppt_x"/>
+                                          </p:val>
+                                        </p:tav>
+                                      </p:tavLst>
+                                    </p:anim>
+                                    <p:anim calcmode="lin" valueType="num">
+                                      <p:cBhvr additive="base">
+                                        <p:cTn id="37" dur="500" fill="hold"/>
+                                        <p:tgtEl>
+                                          <p:spTgt spid="5">
+                                            <p:txEl>
+                                              <p:pRg st="6" end="6"/>
+                                            </p:txEl>
+                                          </p:spTgt>
+                                        </p:tgtEl>
+                                        <p:attrNameLst>
+                                          <p:attrName>ppt_y</p:attrName>
+                                        </p:attrNameLst>
+                                      </p:cBhvr>
+                                      <p:tavLst>
+                                        <p:tav tm="0">
+                                          <p:val>
+                                            <p:strVal val="1+#ppt_h/2"/>
+                                          </p:val>
+                                        </p:tav>
+                                        <p:tav tm="100000">
+                                          <p:val>
+                                            <p:strVal val="#ppt_y"/>
+                                          </p:val>
+                                        </p:tav>
+                                      </p:tavLst>
+                                    </p:anim>
+                                  </p:childTnLst>
+                                </p:cTn>
+                              </p:par>
+                              <p:par>
+                                <p:cTn id="38" presetID="9" presetClass="exit" presetSubtype="0" fill="hold" nodeType="withEffect">
+                                  <p:stCondLst>
+                                    <p:cond delay="0"/>
+                                  </p:stCondLst>
+                                  <p:childTnLst>
+                                    <p:animEffect transition="out" filter="dissolve">
+                                      <p:cBhvr>
+                                        <p:cTn id="39" dur="500"/>
+                                        <p:tgtEl>
+                                          <p:spTgt spid="6"/>
+                                        </p:tgtEl>
+                                      </p:cBhvr>
+                                    </p:animEffect>
+                                    <p:set>
+                                      <p:cBhvr>
+                                        <p:cTn id="40" dur="1" fill="hold">
+                                          <p:stCondLst>
+                                            <p:cond delay="499"/>
+                                          </p:stCondLst>
+                                        </p:cTn>
+                                        <p:tgtEl>
+                                          <p:spTgt spid="6"/>
+                                        </p:tgtEl>
+                                        <p:attrNameLst>
+                                          <p:attrName>style.visibility</p:attrName>
+                                        </p:attrNameLst>
+                                      </p:cBhvr>
+                                      <p:to>
+                                        <p:strVal val="hidden"/>
+                                      </p:to>
+                                    </p:set>
+                                  </p:childTnLst>
+                                </p:cTn>
+                              </p:par>
+                              <p:par>
+                                <p:cTn id="41" presetID="2" presetClass="entr" presetSubtype="4" fill="hold" grpId="1" nodeType="withEffect">
+                                  <p:stCondLst>
+                                    <p:cond delay="0"/>
+                                  </p:stCondLst>
+                                  <p:childTnLst>
+                                    <p:set>
+                                      <p:cBhvr>
+                                        <p:cTn id="42" dur="1" fill="hold">
+                                          <p:stCondLst>
+                                            <p:cond delay="0"/>
+                                          </p:stCondLst>
+                                        </p:cTn>
+                                        <p:tgtEl>
+                                          <p:spTgt spid="5">
+                                            <p:txEl>
+                                              <p:pRg st="7" end="7"/>
+                                            </p:txEl>
+                                          </p:spTgt>
+                                        </p:tgtEl>
+                                        <p:attrNameLst>
+                                          <p:attrName>style.visibility</p:attrName>
+                                        </p:attrNameLst>
+                                      </p:cBhvr>
+                                      <p:to>
+                                        <p:strVal val="visible"/>
+                                      </p:to>
+                                    </p:set>
+                                    <p:anim calcmode="lin" valueType="num">
+                                      <p:cBhvr additive="base">
+                                        <p:cTn id="43" dur="500" fill="hold"/>
+                                        <p:tgtEl>
+                                          <p:spTgt spid="5">
+                                            <p:txEl>
+                                              <p:pRg st="7" end="7"/>
+                                            </p:txEl>
+                                          </p:spTgt>
+                                        </p:tgtEl>
+                                        <p:attrNameLst>
+                                          <p:attrName>ppt_x</p:attrName>
+                                        </p:attrNameLst>
+                                      </p:cBhvr>
+                                      <p:tavLst>
+                                        <p:tav tm="0">
+                                          <p:val>
+                                            <p:strVal val="#ppt_x"/>
+                                          </p:val>
+                                        </p:tav>
+                                        <p:tav tm="100000">
+                                          <p:val>
+                                            <p:strVal val="#ppt_x"/>
+                                          </p:val>
+                                        </p:tav>
+                                      </p:tavLst>
+                                    </p:anim>
+                                    <p:anim calcmode="lin" valueType="num">
+                                      <p:cBhvr additive="base">
+                                        <p:cTn id="44" dur="500" fill="hold"/>
+                                        <p:tgtEl>
+                                          <p:spTgt spid="5">
+                                            <p:txEl>
+                                              <p:pRg st="7" end="7"/>
+                                            </p:txEl>
+                                          </p:spTgt>
+                                        </p:tgtEl>
+                                        <p:attrNameLst>
+                                          <p:attrName>ppt_y</p:attrName>
+                                        </p:attrNameLst>
+                                      </p:cBhvr>
+                                      <p:tavLst>
+                                        <p:tav tm="0">
+                                          <p:val>
+                                            <p:strVal val="1+#ppt_h/2"/>
+                                          </p:val>
+                                        </p:tav>
+                                        <p:tav tm="100000">
+                                          <p:val>
+                                            <p:strVal val="#ppt_y"/>
+                                          </p:val>
+                                        </p:tav>
+                                      </p:tavLst>
+                                    </p:anim>
+                                  </p:childTnLst>
+                                </p:cTn>
+                              </p:par>
+                              <p:par>
+                                <p:cTn id="45" presetID="9" presetClass="exit" presetSubtype="0" fill="hold" nodeType="withEffect">
+                                  <p:stCondLst>
+                                    <p:cond delay="0"/>
+                                  </p:stCondLst>
+                                  <p:childTnLst>
+                                    <p:animEffect transition="out" filter="dissolve">
+                                      <p:cBhvr>
+                                        <p:cTn id="46" dur="500"/>
+                                        <p:tgtEl>
+                                          <p:spTgt spid="7"/>
+                                        </p:tgtEl>
+                                      </p:cBhvr>
+                                    </p:animEffect>
+                                    <p:set>
+                                      <p:cBhvr>
+                                        <p:cTn id="47" dur="1" fill="hold">
+                                          <p:stCondLst>
+                                            <p:cond delay="499"/>
+                                          </p:stCondLst>
+                                        </p:cTn>
+                                        <p:tgtEl>
+                                          <p:spTgt spid="7"/>
+                                        </p:tgtEl>
+                                        <p:attrNameLst>
+                                          <p:attrName>style.visibility</p:attrName>
+                                        </p:attrNameLst>
+                                      </p:cBhvr>
+                                      <p:to>
+                                        <p:strVal val="hidden"/>
+                                      </p:to>
+                                    </p:set>
+                                  </p:childTnLst>
+                                </p:cTn>
+                              </p:par>
+                            </p:childTnLst>
+                          </p:cTn>
+                        </p:par>
+                      </p:childTnLst>
+                    </p:cTn>
+                  </p:par>
+                </p:childTnLst>
+              </p:cTn>
+              <p:prevCondLst>
+                <p:cond evt="onPrev" delay="0">
+                  <p:tgtEl>
+                    <p:sldTgt/>
+                  </p:tgtEl>
+                </p:cond>
+              </p:prevCondLst>
+              <p:nextCondLst>
+                <p:cond evt="onNext" delay="0">
+                  <p:tgtEl>
+                    <p:sldTgt/>
+                  </p:tgtEl>
+                </p:cond>
+              </p:nextCondLst>
+            </p:seq>
+          </p:childTnLst>
+        </p:cTn>
+      </p:par>
+    </p:tnLst>
+    <p:bldLst>
+      <p:bldP spid="5" grpId="0" uiExpand="1" build="p"/>
+      <p:bldP spid="5" grpId="1" build="p"/>
+    </p:bldLst>
+  </p:timing>
+</p:sld>
+</file>
+
+<file path=ppt/slides/slide19.xml><?xml version="1.0" encoding="utf-8"?>
+<p:sld xmlns:a="http://schemas.openxmlformats.org/drawingml/2006/main" xmlns:r="http://schemas.openxmlformats.org/officeDocument/2006/relationships" xmlns:p="http://schemas.openxmlformats.org/presentationml/2006/main">
+  <p:cSld>
+    <p:spTree>
+      <p:nvGrpSpPr>
+        <p:cNvPr id="1" name=""/>
+        <p:cNvGrpSpPr/>
+        <p:nvPr/>
+      </p:nvGrpSpPr>
+      <p:grpSpPr>
+        <a:xfrm>
+          <a:off x="0" y="0"/>
+          <a:ext cx="0" cy="0"/>
+          <a:chOff x="0" y="0"/>
+          <a:chExt cx="0" cy="0"/>
+        </a:xfrm>
+      </p:grpSpPr>
+      <p:sp>
+        <p:nvSpPr>
+          <p:cNvPr id="2" name="Title 1"/>
+          <p:cNvSpPr>
+            <a:spLocks noGrp="1"/>
+          </p:cNvSpPr>
+          <p:nvPr>
+            <p:ph type="title"/>
+          </p:nvPr>
+        </p:nvSpPr>
+        <p:spPr/>
+        <p:txBody>
+          <a:bodyPr/>
+          <a:lstStyle/>
+          <a:p>
+            <a:r>
+              <a:rPr lang="en-US" dirty="0" smtClean="0"/>
+              <a:t>Customization Concepts</a:t>
             </a:r>
             <a:endParaRPr lang="en-US" dirty="0"/>
           </a:p>
@@ -14526,7 +16014,147 @@
 </p:sld>
 </file>
 
-<file path=ppt/slides/slide19.xml><?xml version="1.0" encoding="utf-8"?>
+<file path=ppt/slides/slide2.xml><?xml version="1.0" encoding="utf-8"?>
+<p:sld xmlns:a="http://schemas.openxmlformats.org/drawingml/2006/main" xmlns:r="http://schemas.openxmlformats.org/officeDocument/2006/relationships" xmlns:p="http://schemas.openxmlformats.org/presentationml/2006/main">
+  <p:cSld>
+    <p:spTree>
+      <p:nvGrpSpPr>
+        <p:cNvPr id="1" name=""/>
+        <p:cNvGrpSpPr/>
+        <p:nvPr/>
+      </p:nvGrpSpPr>
+      <p:grpSpPr>
+        <a:xfrm>
+          <a:off x="0" y="0"/>
+          <a:ext cx="0" cy="0"/>
+          <a:chOff x="0" y="0"/>
+          <a:chExt cx="0" cy="0"/>
+        </a:xfrm>
+      </p:grpSpPr>
+      <p:sp>
+        <p:nvSpPr>
+          <p:cNvPr id="30721" name="Title 1"/>
+          <p:cNvSpPr>
+            <a:spLocks noGrp="1"/>
+          </p:cNvSpPr>
+          <p:nvPr>
+            <p:ph type="title"/>
+          </p:nvPr>
+        </p:nvSpPr>
+        <p:spPr>
+          <a:xfrm>
+            <a:off x="457200" y="204788"/>
+            <a:ext cx="8229600" cy="809625"/>
+          </a:xfrm>
+        </p:spPr>
+        <p:txBody>
+          <a:bodyPr/>
+          <a:lstStyle/>
+          <a:p>
+            <a:pPr eaLnBrk="1" hangingPunct="1"/>
+            <a:r>
+              <a:rPr lang="en-US">
+                <a:latin typeface="Trebuchet MS" charset="0"/>
+              </a:rPr>
+              <a:t>Agenda</a:t>
+            </a:r>
+          </a:p>
+        </p:txBody>
+      </p:sp>
+      <p:sp>
+        <p:nvSpPr>
+          <p:cNvPr id="30722" name="Content Placeholder 2"/>
+          <p:cNvSpPr>
+            <a:spLocks noGrp="1"/>
+          </p:cNvSpPr>
+          <p:nvPr>
+            <p:ph idx="1"/>
+          </p:nvPr>
+        </p:nvSpPr>
+        <p:spPr/>
+        <p:txBody>
+          <a:bodyPr/>
+          <a:lstStyle/>
+          <a:p>
+            <a:pPr marL="0" indent="0" eaLnBrk="1" hangingPunct="1"/>
+            <a:r>
+              <a:rPr lang="en-US">
+                <a:latin typeface="Trebuchet MS" charset="0"/>
+              </a:rPr>
+              <a:t>Intro / Review</a:t>
+            </a:r>
+          </a:p>
+          <a:p>
+            <a:pPr marL="0" indent="0" eaLnBrk="1" hangingPunct="1"/>
+            <a:endParaRPr lang="en-US">
+              <a:latin typeface="Trebuchet MS" charset="0"/>
+            </a:endParaRPr>
+          </a:p>
+          <a:p>
+            <a:pPr marL="0" indent="0" eaLnBrk="1" hangingPunct="1"/>
+            <a:r>
+              <a:rPr lang="en-US">
+                <a:latin typeface="Trebuchet MS" charset="0"/>
+              </a:rPr>
+              <a:t>Titanium-specific features</a:t>
+            </a:r>
+          </a:p>
+          <a:p>
+            <a:pPr marL="0" indent="0" eaLnBrk="1" hangingPunct="1"/>
+            <a:endParaRPr lang="en-US">
+              <a:latin typeface="Trebuchet MS" charset="0"/>
+            </a:endParaRPr>
+          </a:p>
+          <a:p>
+            <a:pPr marL="0" indent="0" eaLnBrk="1" hangingPunct="1"/>
+            <a:r>
+              <a:rPr lang="en-US">
+                <a:latin typeface="Trebuchet MS" charset="0"/>
+              </a:rPr>
+              <a:t>Deployment and distribution features</a:t>
+            </a:r>
+          </a:p>
+          <a:p>
+            <a:pPr marL="0" indent="0" eaLnBrk="1" hangingPunct="1"/>
+            <a:endParaRPr lang="en-US">
+              <a:latin typeface="Trebuchet MS" charset="0"/>
+            </a:endParaRPr>
+          </a:p>
+          <a:p>
+            <a:pPr marL="0" indent="0" eaLnBrk="1" hangingPunct="1"/>
+            <a:r>
+              <a:rPr lang="en-US">
+                <a:latin typeface="Trebuchet MS" charset="0"/>
+              </a:rPr>
+              <a:t>Debugging</a:t>
+            </a:r>
+          </a:p>
+          <a:p>
+            <a:pPr marL="0" indent="0" eaLnBrk="1" hangingPunct="1"/>
+            <a:endParaRPr lang="en-US">
+              <a:latin typeface="Trebuchet MS" charset="0"/>
+            </a:endParaRPr>
+          </a:p>
+          <a:p>
+            <a:pPr marL="0" indent="0" eaLnBrk="1" hangingPunct="1"/>
+            <a:r>
+              <a:rPr lang="en-US">
+                <a:latin typeface="Trebuchet MS" charset="0"/>
+              </a:rPr>
+              <a:t>Customizing and extending</a:t>
+            </a:r>
+          </a:p>
+        </p:txBody>
+      </p:sp>
+    </p:spTree>
+  </p:cSld>
+  <p:clrMapOvr>
+    <a:masterClrMapping/>
+  </p:clrMapOvr>
+</p:sld>
+</file>
+
+<file path=ppt/slides/slide20.xml><?xml version="1.0" encoding="utf-8"?>
 <p:sld xmlns:a="http://schemas.openxmlformats.org/drawingml/2006/main" xmlns:r="http://schemas.openxmlformats.org/officeDocument/2006/relationships" xmlns:p="http://schemas.openxmlformats.org/presentationml/2006/main">
   <p:cSld>
     <p:spTree>
@@ -14838,279 +16466,6 @@
 </p:sld>
 </file>
 
-<file path=ppt/slides/slide2.xml><?xml version="1.0" encoding="utf-8"?>
-<p:sld xmlns:a="http://schemas.openxmlformats.org/drawingml/2006/main" xmlns:r="http://schemas.openxmlformats.org/officeDocument/2006/relationships" xmlns:p="http://schemas.openxmlformats.org/presentationml/2006/main">
-  <p:cSld>
-    <p:spTree>
-      <p:nvGrpSpPr>
-        <p:cNvPr id="1" name=""/>
-        <p:cNvGrpSpPr/>
-        <p:nvPr/>
-      </p:nvGrpSpPr>
-      <p:grpSpPr>
-        <a:xfrm>
-          <a:off x="0" y="0"/>
-          <a:ext cx="0" cy="0"/>
-          <a:chOff x="0" y="0"/>
-          <a:chExt cx="0" cy="0"/>
-        </a:xfrm>
-      </p:grpSpPr>
-      <p:sp>
-        <p:nvSpPr>
-          <p:cNvPr id="30721" name="Title 1"/>
-          <p:cNvSpPr>
-            <a:spLocks noGrp="1"/>
-          </p:cNvSpPr>
-          <p:nvPr>
-            <p:ph type="title"/>
-          </p:nvPr>
-        </p:nvSpPr>
-        <p:spPr>
-          <a:xfrm>
-            <a:off x="457200" y="204788"/>
-            <a:ext cx="8229600" cy="809625"/>
-          </a:xfrm>
-        </p:spPr>
-        <p:txBody>
-          <a:bodyPr/>
-          <a:lstStyle/>
-          <a:p>
-            <a:pPr eaLnBrk="1" hangingPunct="1"/>
-            <a:r>
-              <a:rPr lang="en-US">
-                <a:latin typeface="Trebuchet MS" charset="0"/>
-              </a:rPr>
-              <a:t>Agenda</a:t>
-            </a:r>
-          </a:p>
-        </p:txBody>
-      </p:sp>
-      <p:sp>
-        <p:nvSpPr>
-          <p:cNvPr id="30722" name="Content Placeholder 2"/>
-          <p:cNvSpPr>
-            <a:spLocks noGrp="1"/>
-          </p:cNvSpPr>
-          <p:nvPr>
-            <p:ph idx="1"/>
-          </p:nvPr>
-        </p:nvSpPr>
-        <p:spPr/>
-        <p:txBody>
-          <a:bodyPr/>
-          <a:lstStyle/>
-          <a:p>
-            <a:pPr marL="0" indent="0" eaLnBrk="1" hangingPunct="1"/>
-            <a:r>
-              <a:rPr lang="en-US">
-                <a:latin typeface="Trebuchet MS" charset="0"/>
-              </a:rPr>
-              <a:t>Intro / Review</a:t>
-            </a:r>
-          </a:p>
-          <a:p>
-            <a:pPr marL="0" indent="0" eaLnBrk="1" hangingPunct="1"/>
-            <a:endParaRPr lang="en-US">
-              <a:latin typeface="Trebuchet MS" charset="0"/>
-            </a:endParaRPr>
-          </a:p>
-          <a:p>
-            <a:pPr marL="0" indent="0" eaLnBrk="1" hangingPunct="1"/>
-            <a:r>
-              <a:rPr lang="en-US">
-                <a:latin typeface="Trebuchet MS" charset="0"/>
-              </a:rPr>
-              <a:t>Titanium-specific features</a:t>
-            </a:r>
-          </a:p>
-          <a:p>
-            <a:pPr marL="0" indent="0" eaLnBrk="1" hangingPunct="1"/>
-            <a:endParaRPr lang="en-US">
-              <a:latin typeface="Trebuchet MS" charset="0"/>
-            </a:endParaRPr>
-          </a:p>
-          <a:p>
-            <a:pPr marL="0" indent="0" eaLnBrk="1" hangingPunct="1"/>
-            <a:r>
-              <a:rPr lang="en-US">
-                <a:latin typeface="Trebuchet MS" charset="0"/>
-              </a:rPr>
-              <a:t>Deployment and distribution features</a:t>
-            </a:r>
-          </a:p>
-          <a:p>
-            <a:pPr marL="0" indent="0" eaLnBrk="1" hangingPunct="1"/>
-            <a:endParaRPr lang="en-US">
-              <a:latin typeface="Trebuchet MS" charset="0"/>
-            </a:endParaRPr>
-          </a:p>
-          <a:p>
-            <a:pPr marL="0" indent="0" eaLnBrk="1" hangingPunct="1"/>
-            <a:r>
-              <a:rPr lang="en-US">
-                <a:latin typeface="Trebuchet MS" charset="0"/>
-              </a:rPr>
-              <a:t>Debugging</a:t>
-            </a:r>
-          </a:p>
-          <a:p>
-            <a:pPr marL="0" indent="0" eaLnBrk="1" hangingPunct="1"/>
-            <a:endParaRPr lang="en-US">
-              <a:latin typeface="Trebuchet MS" charset="0"/>
-            </a:endParaRPr>
-          </a:p>
-          <a:p>
-            <a:pPr marL="0" indent="0" eaLnBrk="1" hangingPunct="1"/>
-            <a:r>
-              <a:rPr lang="en-US">
-                <a:latin typeface="Trebuchet MS" charset="0"/>
-              </a:rPr>
-              <a:t>Customizing and extending</a:t>
-            </a:r>
-          </a:p>
-        </p:txBody>
-      </p:sp>
-    </p:spTree>
-  </p:cSld>
-  <p:clrMapOvr>
-    <a:masterClrMapping/>
-  </p:clrMapOvr>
-</p:sld>
-</file>
-
-<file path=ppt/slides/slide20.xml><?xml version="1.0" encoding="utf-8"?>
-<p:sld xmlns:a="http://schemas.openxmlformats.org/drawingml/2006/main" xmlns:r="http://schemas.openxmlformats.org/officeDocument/2006/relationships" xmlns:p="http://schemas.openxmlformats.org/presentationml/2006/main">
-  <p:cSld>
-    <p:spTree>
-      <p:nvGrpSpPr>
-        <p:cNvPr id="1" name=""/>
-        <p:cNvGrpSpPr/>
-        <p:nvPr/>
-      </p:nvGrpSpPr>
-      <p:grpSpPr>
-        <a:xfrm>
-          <a:off x="0" y="0"/>
-          <a:ext cx="0" cy="0"/>
-          <a:chOff x="0" y="0"/>
-          <a:chExt cx="0" cy="0"/>
-        </a:xfrm>
-      </p:grpSpPr>
-      <p:sp>
-        <p:nvSpPr>
-          <p:cNvPr id="2" name="Title 1"/>
-          <p:cNvSpPr>
-            <a:spLocks noGrp="1"/>
-          </p:cNvSpPr>
-          <p:nvPr>
-            <p:ph type="title"/>
-          </p:nvPr>
-        </p:nvSpPr>
-        <p:spPr/>
-        <p:txBody>
-          <a:bodyPr/>
-          <a:lstStyle/>
-          <a:p>
-            <a:r>
-              <a:rPr lang="en-US" dirty="0" smtClean="0"/>
-              <a:t>Snippets</a:t>
-            </a:r>
-            <a:endParaRPr lang="en-US" dirty="0"/>
-          </a:p>
-        </p:txBody>
-      </p:sp>
-      <p:sp>
-        <p:nvSpPr>
-          <p:cNvPr id="3" name="Content Placeholder 2"/>
-          <p:cNvSpPr>
-            <a:spLocks noGrp="1"/>
-          </p:cNvSpPr>
-          <p:nvPr>
-            <p:ph idx="1"/>
-          </p:nvPr>
-        </p:nvSpPr>
-        <p:spPr/>
-        <p:txBody>
-          <a:bodyPr/>
-          <a:lstStyle/>
-          <a:p>
-            <a:r>
-              <a:rPr lang="en-US" dirty="0" smtClean="0"/>
-              <a:t>“Templates” of code to insert</a:t>
-            </a:r>
-          </a:p>
-          <a:p>
-            <a:endParaRPr lang="en-US" dirty="0"/>
-          </a:p>
-          <a:p>
-            <a:r>
-              <a:rPr lang="en-US" dirty="0" smtClean="0"/>
-              <a:t>Show </a:t>
-            </a:r>
-            <a:r>
-              <a:rPr lang="en-US" dirty="0" smtClean="0"/>
-              <a:t>up within code assist</a:t>
-            </a:r>
-          </a:p>
-          <a:p>
-            <a:endParaRPr lang="en-US" dirty="0"/>
-          </a:p>
-          <a:p>
-            <a:r>
-              <a:rPr lang="en-US" dirty="0" smtClean="0"/>
-              <a:t>Need to create a bundle to contain your snippet</a:t>
-            </a:r>
-          </a:p>
-          <a:p>
-            <a:endParaRPr lang="en-US" dirty="0"/>
-          </a:p>
-          <a:p>
-            <a:r>
-              <a:rPr lang="en-US" dirty="0" smtClean="0"/>
-              <a:t>Wiki for how-to info:</a:t>
-            </a:r>
-          </a:p>
-          <a:p>
-            <a:pPr lvl="1"/>
-            <a:r>
-              <a:rPr lang="en-US" dirty="0">
-                <a:hlinkClick r:id="rId3"/>
-              </a:rPr>
-              <a:t>http://wiki.appcelerator.org/display/tis/Creating+a+new+</a:t>
-            </a:r>
-            <a:r>
-              <a:rPr lang="en-US" dirty="0" smtClean="0">
-                <a:hlinkClick r:id="rId3"/>
-              </a:rPr>
-              <a:t>snippet</a:t>
-            </a:r>
-            <a:endParaRPr lang="en-US" dirty="0" smtClean="0"/>
-          </a:p>
-          <a:p>
-            <a:pPr lvl="1"/>
-            <a:endParaRPr lang="en-US" dirty="0"/>
-          </a:p>
-        </p:txBody>
-      </p:sp>
-    </p:spTree>
-    <p:extLst>
-      <p:ext uri="{BB962C8B-B14F-4D97-AF65-F5344CB8AC3E}">
-        <p14:creationId xmlns:p14="http://schemas.microsoft.com/office/powerpoint/2010/main" val="2709828331"/>
-      </p:ext>
-    </p:extLst>
-  </p:cSld>
-  <p:clrMapOvr>
-    <a:masterClrMapping/>
-  </p:clrMapOvr>
-  <p:timing>
-    <p:tnLst>
-      <p:par>
-        <p:cTn xmlns:p14="http://schemas.microsoft.com/office/powerpoint/2010/main" id="1" dur="indefinite" restart="never" nodeType="tmRoot"/>
-      </p:par>
-    </p:tnLst>
-  </p:timing>
-</p:sld>
-</file>
-
 <file path=ppt/slides/slide21.xml><?xml version="1.0" encoding="utf-8"?>
 <p:sld xmlns:a="http://schemas.openxmlformats.org/drawingml/2006/main" xmlns:r="http://schemas.openxmlformats.org/officeDocument/2006/relationships" xmlns:p="http://schemas.openxmlformats.org/presentationml/2006/main">
   <p:cSld>
@@ -15145,7 +16500,7 @@
           <a:p>
             <a:r>
               <a:rPr lang="en-US" dirty="0" smtClean="0"/>
-              <a:t>Bundles and Rubles</a:t>
+              <a:t>Snippets</a:t>
             </a:r>
             <a:endParaRPr lang="en-US" dirty="0"/>
           </a:p>
@@ -15168,9 +16523,8 @@
           <a:p>
             <a:r>
               <a:rPr lang="en-US" dirty="0" smtClean="0"/>
-              <a:t>Rubles == Bundles (written with Ruby)</a:t>
-            </a:r>
-            <a:endParaRPr lang="en-US" dirty="0" smtClean="0"/>
+              <a:t>“Templates” of code to insert</a:t>
+            </a:r>
           </a:p>
           <a:p>
             <a:endParaRPr lang="en-US" dirty="0"/>
@@ -15178,136 +16532,45 @@
           <a:p>
             <a:r>
               <a:rPr lang="en-US" dirty="0" smtClean="0"/>
-              <a:t>Importing </a:t>
-            </a:r>
+              <a:t>Show up within code assist</a:t>
+            </a:r>
+          </a:p>
+          <a:p>
+            <a:endParaRPr lang="en-US" dirty="0"/>
+          </a:p>
+          <a:p>
             <a:r>
               <a:rPr lang="en-US" dirty="0" smtClean="0"/>
-              <a:t>Rubles</a:t>
-            </a:r>
-          </a:p>
-          <a:p>
-            <a:pPr lvl="1">
-              <a:buFont typeface="Arial"/>
-              <a:buChar char="•"/>
-            </a:pPr>
+              <a:t>Need to create a bundle to contain your snippet</a:t>
+            </a:r>
+          </a:p>
+          <a:p>
+            <a:endParaRPr lang="en-US" dirty="0"/>
+          </a:p>
+          <a:p>
             <a:r>
               <a:rPr lang="en-US" dirty="0" smtClean="0"/>
-              <a:t> “Official</a:t>
-            </a:r>
-            <a:r>
-              <a:rPr lang="en-US" dirty="0"/>
-              <a:t>” </a:t>
-            </a:r>
-            <a:r>
-              <a:rPr lang="en-US" dirty="0" smtClean="0"/>
-              <a:t>web oriented rubles </a:t>
-            </a:r>
-            <a:r>
-              <a:rPr lang="en-US" dirty="0"/>
-              <a:t>- </a:t>
-            </a:r>
+              <a:t>Wiki for how-to info:</a:t>
+            </a:r>
+          </a:p>
+          <a:p>
+            <a:pPr lvl="1"/>
             <a:r>
               <a:rPr lang="en-US" dirty="0">
                 <a:hlinkClick r:id="rId3"/>
               </a:rPr>
-              <a:t>https://github.com/</a:t>
+              <a:t>http://wiki.appcelerator.org/display/tis/Creating+a+new+</a:t>
             </a:r>
             <a:r>
               <a:rPr lang="en-US" dirty="0" smtClean="0">
                 <a:hlinkClick r:id="rId3"/>
               </a:rPr>
-              <a:t>aptana</a:t>
+              <a:t>snippet</a:t>
             </a:r>
             <a:endParaRPr lang="en-US" dirty="0" smtClean="0"/>
           </a:p>
           <a:p>
-            <a:endParaRPr lang="en-US" dirty="0"/>
-          </a:p>
-          <a:p>
-            <a:r>
-              <a:rPr lang="en-US" dirty="0" smtClean="0"/>
-              <a:t>Writing your own, see the wiki</a:t>
-            </a:r>
-          </a:p>
-          <a:p>
-            <a:pPr lvl="1">
-              <a:buFont typeface="Arial"/>
-              <a:buChar char="•"/>
-            </a:pPr>
-            <a:r>
-              <a:rPr lang="en-US" dirty="0"/>
-              <a:t> </a:t>
-            </a:r>
-            <a:r>
-              <a:rPr lang="en-US" dirty="0">
-                <a:hlinkClick r:id="rId4"/>
-              </a:rPr>
-              <a:t>http://wiki.appcelerator.org/display/tis/Creating+a+new+</a:t>
-            </a:r>
-            <a:r>
-              <a:rPr lang="en-US" dirty="0" smtClean="0">
-                <a:hlinkClick r:id="rId4"/>
-              </a:rPr>
-              <a:t>Ruble</a:t>
-            </a:r>
-            <a:endParaRPr lang="en-US" dirty="0" smtClean="0"/>
-          </a:p>
-          <a:p>
             <a:pPr lvl="1"/>
-            <a:endParaRPr lang="en-US" dirty="0" smtClean="0"/>
-          </a:p>
-          <a:p>
-            <a:r>
-              <a:rPr lang="en-US" dirty="0" smtClean="0"/>
-              <a:t>Importing </a:t>
-            </a:r>
-            <a:r>
-              <a:rPr lang="en-US" dirty="0" err="1"/>
-              <a:t>TextMate</a:t>
-            </a:r>
-            <a:r>
-              <a:rPr lang="en-US" dirty="0"/>
-              <a:t> bundles</a:t>
-            </a:r>
-          </a:p>
-          <a:p>
-            <a:pPr lvl="1">
-              <a:buFont typeface="Arial"/>
-              <a:buChar char="•"/>
-            </a:pPr>
-            <a:r>
-              <a:rPr lang="en-US" dirty="0"/>
-              <a:t> </a:t>
-            </a:r>
-            <a:r>
-              <a:rPr lang="en-US" dirty="0">
-                <a:hlinkClick r:id="rId5"/>
-              </a:rPr>
-              <a:t>http://manual.macromates.com/en/bundles</a:t>
-            </a:r>
-            <a:endParaRPr lang="en-US" dirty="0"/>
-          </a:p>
-          <a:p>
-            <a:pPr lvl="1">
-              <a:buFont typeface="Arial"/>
-              <a:buChar char="•"/>
-            </a:pPr>
-            <a:r>
-              <a:rPr lang="en-US" dirty="0"/>
-              <a:t> </a:t>
-            </a:r>
-            <a:r>
-              <a:rPr lang="en-US" dirty="0">
-                <a:hlinkClick r:id="rId6"/>
-              </a:rPr>
-              <a:t>http://svn.textmate.org/trunk/Bundles</a:t>
-            </a:r>
-            <a:r>
-              <a:rPr lang="en-US" dirty="0" smtClean="0">
-                <a:hlinkClick r:id="rId6"/>
-              </a:rPr>
-              <a:t>/</a:t>
-            </a:r>
             <a:endParaRPr lang="en-US" dirty="0"/>
           </a:p>
         </p:txBody>
@@ -15315,7 +16578,7 @@
     </p:spTree>
     <p:extLst>
       <p:ext uri="{BB962C8B-B14F-4D97-AF65-F5344CB8AC3E}">
-        <p14:creationId xmlns:p14="http://schemas.microsoft.com/office/powerpoint/2010/main" val="573573471"/>
+        <p14:creationId xmlns:p14="http://schemas.microsoft.com/office/powerpoint/2010/main" val="2709828331"/>
       </p:ext>
     </p:extLst>
   </p:cSld>
@@ -15351,6 +16614,222 @@
       </p:grpSpPr>
       <p:sp>
         <p:nvSpPr>
+          <p:cNvPr id="2" name="Title 1"/>
+          <p:cNvSpPr>
+            <a:spLocks noGrp="1"/>
+          </p:cNvSpPr>
+          <p:nvPr>
+            <p:ph type="title"/>
+          </p:nvPr>
+        </p:nvSpPr>
+        <p:spPr/>
+        <p:txBody>
+          <a:bodyPr/>
+          <a:lstStyle/>
+          <a:p>
+            <a:r>
+              <a:rPr lang="en-US" dirty="0" smtClean="0"/>
+              <a:t>Bundles and Rubles</a:t>
+            </a:r>
+            <a:endParaRPr lang="en-US" dirty="0"/>
+          </a:p>
+        </p:txBody>
+      </p:sp>
+      <p:sp>
+        <p:nvSpPr>
+          <p:cNvPr id="3" name="Content Placeholder 2"/>
+          <p:cNvSpPr>
+            <a:spLocks noGrp="1"/>
+          </p:cNvSpPr>
+          <p:nvPr>
+            <p:ph idx="1"/>
+          </p:nvPr>
+        </p:nvSpPr>
+        <p:spPr/>
+        <p:txBody>
+          <a:bodyPr/>
+          <a:lstStyle/>
+          <a:p>
+            <a:r>
+              <a:rPr lang="en-US" dirty="0" smtClean="0"/>
+              <a:t>Rubles == Bundles (written with Ruby)</a:t>
+            </a:r>
+          </a:p>
+          <a:p>
+            <a:endParaRPr lang="en-US" dirty="0"/>
+          </a:p>
+          <a:p>
+            <a:r>
+              <a:rPr lang="en-US" dirty="0" smtClean="0"/>
+              <a:t>Importing Rubles</a:t>
+            </a:r>
+          </a:p>
+          <a:p>
+            <a:pPr lvl="1">
+              <a:buFont typeface="Arial"/>
+              <a:buChar char="•"/>
+            </a:pPr>
+            <a:r>
+              <a:rPr lang="en-US" dirty="0" smtClean="0"/>
+              <a:t> “Official</a:t>
+            </a:r>
+            <a:r>
+              <a:rPr lang="en-US" dirty="0"/>
+              <a:t>” </a:t>
+            </a:r>
+            <a:r>
+              <a:rPr lang="en-US" dirty="0" smtClean="0"/>
+              <a:t>web oriented rubles </a:t>
+            </a:r>
+            <a:r>
+              <a:rPr lang="en-US" dirty="0"/>
+              <a:t>- </a:t>
+            </a:r>
+            <a:r>
+              <a:rPr lang="en-US" dirty="0">
+                <a:hlinkClick r:id="rId3"/>
+              </a:rPr>
+              <a:t>https://github.com/</a:t>
+            </a:r>
+            <a:r>
+              <a:rPr lang="en-US" dirty="0" smtClean="0">
+                <a:hlinkClick r:id="rId3"/>
+              </a:rPr>
+              <a:t>aptana</a:t>
+            </a:r>
+            <a:endParaRPr lang="en-US" dirty="0" smtClean="0"/>
+          </a:p>
+          <a:p>
+            <a:endParaRPr lang="en-US" dirty="0"/>
+          </a:p>
+          <a:p>
+            <a:r>
+              <a:rPr lang="en-US" dirty="0" smtClean="0"/>
+              <a:t>Writing your own, see the wiki</a:t>
+            </a:r>
+          </a:p>
+          <a:p>
+            <a:pPr lvl="1">
+              <a:buFont typeface="Arial"/>
+              <a:buChar char="•"/>
+            </a:pPr>
+            <a:r>
+              <a:rPr lang="en-US" dirty="0"/>
+              <a:t> </a:t>
+            </a:r>
+            <a:r>
+              <a:rPr lang="en-US" dirty="0">
+                <a:hlinkClick r:id="rId4"/>
+              </a:rPr>
+              <a:t>http://wiki.appcelerator.org/display/tis/Creating+a+new+</a:t>
+            </a:r>
+            <a:r>
+              <a:rPr lang="en-US" dirty="0" smtClean="0">
+                <a:hlinkClick r:id="rId4"/>
+              </a:rPr>
+              <a:t>Ruble</a:t>
+            </a:r>
+            <a:endParaRPr lang="en-US" dirty="0" smtClean="0"/>
+          </a:p>
+          <a:p>
+            <a:pPr lvl="1"/>
+            <a:endParaRPr lang="en-US" dirty="0" smtClean="0"/>
+          </a:p>
+          <a:p>
+            <a:r>
+              <a:rPr lang="en-US" dirty="0" smtClean="0"/>
+              <a:t>Importing </a:t>
+            </a:r>
+            <a:r>
+              <a:rPr lang="en-US" dirty="0" err="1"/>
+              <a:t>TextMate</a:t>
+            </a:r>
+            <a:r>
+              <a:rPr lang="en-US" dirty="0"/>
+              <a:t> bundles</a:t>
+            </a:r>
+          </a:p>
+          <a:p>
+            <a:pPr lvl="1">
+              <a:buFont typeface="Arial"/>
+              <a:buChar char="•"/>
+            </a:pPr>
+            <a:r>
+              <a:rPr lang="en-US" dirty="0"/>
+              <a:t> </a:t>
+            </a:r>
+            <a:r>
+              <a:rPr lang="en-US" dirty="0">
+                <a:hlinkClick r:id="rId5"/>
+              </a:rPr>
+              <a:t>http://manual.macromates.com/en/bundles</a:t>
+            </a:r>
+            <a:endParaRPr lang="en-US" dirty="0"/>
+          </a:p>
+          <a:p>
+            <a:pPr lvl="1">
+              <a:buFont typeface="Arial"/>
+              <a:buChar char="•"/>
+            </a:pPr>
+            <a:r>
+              <a:rPr lang="en-US" dirty="0"/>
+              <a:t> </a:t>
+            </a:r>
+            <a:r>
+              <a:rPr lang="en-US" dirty="0">
+                <a:hlinkClick r:id="rId6"/>
+              </a:rPr>
+              <a:t>http://svn.textmate.org/trunk/Bundles</a:t>
+            </a:r>
+            <a:r>
+              <a:rPr lang="en-US" dirty="0" smtClean="0">
+                <a:hlinkClick r:id="rId6"/>
+              </a:rPr>
+              <a:t>/</a:t>
+            </a:r>
+            <a:endParaRPr lang="en-US" dirty="0"/>
+          </a:p>
+        </p:txBody>
+      </p:sp>
+    </p:spTree>
+    <p:extLst>
+      <p:ext uri="{BB962C8B-B14F-4D97-AF65-F5344CB8AC3E}">
+        <p14:creationId xmlns:p14="http://schemas.microsoft.com/office/powerpoint/2010/main" val="573573471"/>
+      </p:ext>
+    </p:extLst>
+  </p:cSld>
+  <p:clrMapOvr>
+    <a:masterClrMapping/>
+  </p:clrMapOvr>
+  <p:timing>
+    <p:tnLst>
+      <p:par>
+        <p:cTn xmlns:p14="http://schemas.microsoft.com/office/powerpoint/2010/main" id="1" dur="indefinite" restart="never" nodeType="tmRoot"/>
+      </p:par>
+    </p:tnLst>
+  </p:timing>
+</p:sld>
+</file>
+
+<file path=ppt/slides/slide23.xml><?xml version="1.0" encoding="utf-8"?>
+<p:sld xmlns:a="http://schemas.openxmlformats.org/drawingml/2006/main" xmlns:r="http://schemas.openxmlformats.org/officeDocument/2006/relationships" xmlns:p="http://schemas.openxmlformats.org/presentationml/2006/main">
+  <p:cSld>
+    <p:spTree>
+      <p:nvGrpSpPr>
+        <p:cNvPr id="1" name=""/>
+        <p:cNvGrpSpPr/>
+        <p:nvPr/>
+      </p:nvGrpSpPr>
+      <p:grpSpPr>
+        <a:xfrm>
+          <a:off x="0" y="0"/>
+          <a:ext cx="0" cy="0"/>
+          <a:chOff x="0" y="0"/>
+          <a:chExt cx="0" cy="0"/>
+        </a:xfrm>
+      </p:grpSpPr>
+      <p:sp>
+        <p:nvSpPr>
           <p:cNvPr id="55297" name="Title 1"/>
           <p:cNvSpPr>
             <a:spLocks noGrp="1"/>
@@ -15374,7 +16853,19 @@
               <a:rPr lang="en-US" dirty="0">
                 <a:latin typeface="Trebuchet MS" charset="0"/>
               </a:rPr>
-              <a:t>Extending and maintaining Ti Studio</a:t>
+              <a:t>Extending and </a:t>
+            </a:r>
+            <a:r>
+              <a:rPr lang="en-US" dirty="0" smtClean="0">
+                <a:latin typeface="Trebuchet MS" charset="0"/>
+              </a:rPr>
+              <a:t>Maintaining </a:t>
+            </a:r>
+            <a:r>
+              <a:rPr lang="en-US" dirty="0">
+                <a:latin typeface="Trebuchet MS" charset="0"/>
+              </a:rPr>
+              <a:t>Ti Studio</a:t>
             </a:r>
           </a:p>
         </p:txBody>
@@ -15541,7 +17032,7 @@
 </p:sld>
 </file>
 
-<file path=ppt/slides/slide23.xml><?xml version="1.0" encoding="utf-8"?>
+<file path=ppt/slides/slide24.xml><?xml version="1.0" encoding="utf-8"?>
 <p:sld xmlns:a="http://schemas.openxmlformats.org/drawingml/2006/main" xmlns:r="http://schemas.openxmlformats.org/officeDocument/2006/relationships" xmlns:p="http://schemas.openxmlformats.org/presentationml/2006/main">
   <p:cSld>
     <p:spTree>
@@ -15660,7 +17151,7 @@
 </p:sld>
 </file>
 
-<file path=ppt/slides/slide24.xml><?xml version="1.0" encoding="utf-8"?>
+<file path=ppt/slides/slide25.xml><?xml version="1.0" encoding="utf-8"?>
 <p:sld xmlns:a="http://schemas.openxmlformats.org/drawingml/2006/main" xmlns:r="http://schemas.openxmlformats.org/officeDocument/2006/relationships" xmlns:p="http://schemas.openxmlformats.org/presentationml/2006/main">
   <p:cSld>
     <p:spTree>
@@ -15811,11 +17302,20 @@
           <a:p>
             <a:pPr eaLnBrk="1" hangingPunct="1"/>
             <a:r>
-              <a:rPr lang="en-US">
+              <a:rPr lang="en-US" dirty="0">
                 <a:latin typeface="Trebuchet MS" charset="0"/>
               </a:rPr>
-              <a:t>Eclipse concepts</a:t>
-            </a:r>
+              <a:t>Eclipse </a:t>
+            </a:r>
+            <a:r>
+              <a:rPr lang="en-US" dirty="0" smtClean="0">
+                <a:latin typeface="Trebuchet MS" charset="0"/>
+              </a:rPr>
+              <a:t>Concepts</a:t>
+            </a:r>
+            <a:endParaRPr lang="en-US" dirty="0">
+              <a:latin typeface="Trebuchet MS" charset="0"/>
+            </a:endParaRPr>
           </a:p>
         </p:txBody>
       </p:sp>
@@ -16973,7 +18473,7 @@
               <a:rPr lang="en-US" dirty="0" smtClean="0">
                 <a:latin typeface="Trebuchet MS" charset="0"/>
               </a:rPr>
-              <a:t>Debug, Deploy, Distribute menus</a:t>
+              <a:t>Debug, Deploy, Distribute Menus</a:t>
             </a:r>
             <a:endParaRPr lang="en-US" dirty="0">
               <a:latin typeface="Trebuchet MS" charset="0"/>
@@ -17271,7 +18771,7 @@
           <a:p>
             <a:r>
               <a:rPr lang="en-US" dirty="0" smtClean="0"/>
-              <a:t>Coding tools</a:t>
+              <a:t>Coding Tools</a:t>
             </a:r>
             <a:endParaRPr lang="en-US" dirty="0"/>
           </a:p>
@@ -17677,11 +19177,20 @@
           <a:p>
             <a:pPr eaLnBrk="1" hangingPunct="1"/>
             <a:r>
-              <a:rPr lang="en-US">
+              <a:rPr lang="en-US" dirty="0">
                 <a:latin typeface="Trebuchet MS" charset="0"/>
               </a:rPr>
-              <a:t>Titanium-specific features</a:t>
-            </a:r>
+              <a:t>Titanium-specific </a:t>
+            </a:r>
+            <a:r>
+              <a:rPr lang="en-US" dirty="0" smtClean="0">
+                <a:latin typeface="Trebuchet MS" charset="0"/>
+              </a:rPr>
+              <a:t>Features</a:t>
+            </a:r>
+            <a:endParaRPr lang="en-US" dirty="0">
+              <a:latin typeface="Trebuchet MS" charset="0"/>
+            </a:endParaRPr>
           </a:p>
         </p:txBody>
       </p:sp>
@@ -17847,11 +19356,20 @@
           <a:p>
             <a:pPr eaLnBrk="1" hangingPunct="1"/>
             <a:r>
-              <a:rPr lang="en-US">
+              <a:rPr lang="en-US" dirty="0">
                 <a:latin typeface="Trebuchet MS" charset="0"/>
               </a:rPr>
-              <a:t>Integrated terminal</a:t>
-            </a:r>
+              <a:t>Integrated </a:t>
+            </a:r>
+            <a:r>
+              <a:rPr lang="en-US" dirty="0" smtClean="0">
+                <a:latin typeface="Trebuchet MS" charset="0"/>
+              </a:rPr>
+              <a:t>Terminal</a:t>
+            </a:r>
+            <a:endParaRPr lang="en-US" dirty="0">
+              <a:latin typeface="Trebuchet MS" charset="0"/>
+            </a:endParaRPr>
           </a:p>
         </p:txBody>
       </p:sp>
@@ -17866,7 +19384,7 @@
           </p:nvPr>
         </p:nvPicPr>
         <p:blipFill>
-          <a:blip r:embed="rId2">
+          <a:blip r:embed="rId3">
             <a:extLst>
               <a:ext uri="{28A0092B-C50C-407E-A947-70E740481C1C}">
                 <a14:useLocalDpi xmlns:a14="http://schemas.microsoft.com/office/drawing/2010/main" val="0"/>
@@ -17885,174 +19403,6 @@
           </a:xfrm>
         </p:spPr>
       </p:pic>
-      <p:sp>
-        <p:nvSpPr>
-          <p:cNvPr id="33795" name="TextBox 4"/>
-          <p:cNvSpPr txBox="1">
-            <a:spLocks noChangeArrowheads="1"/>
-          </p:cNvSpPr>
-          <p:nvPr/>
-        </p:nvSpPr>
-        <p:spPr bwMode="auto">
-          <a:xfrm>
-            <a:off x="601663" y="5534025"/>
-            <a:ext cx="7539037" cy="831850"/>
-          </a:xfrm>
-          <a:prstGeom prst="rect">
-            <a:avLst/>
-          </a:prstGeom>
-          <a:noFill/>
-          <a:ln>
-            <a:noFill/>
-          </a:ln>
-          <a:extLst>
-            <a:ext uri="{909E8E84-426E-40dd-AFC4-6F175D3DCCD1}">
-              <a14:hiddenFill xmlns:a14="http://schemas.microsoft.com/office/drawing/2010/main">
-                <a:solidFill>
-                  <a:srgbClr val="FFFFFF"/>
-                </a:solidFill>
-              </a14:hiddenFill>
-            </a:ext>
-            <a:ext uri="{91240B29-F687-4f45-9708-019B960494DF}">
-              <a14:hiddenLine xmlns:a14="http://schemas.microsoft.com/office/drawing/2010/main" w="9525">
-                <a:solidFill>
-                  <a:srgbClr val="000000"/>
-                </a:solidFill>
-                <a:miter lim="800000"/>
-                <a:headEnd/>
-                <a:tailEnd/>
-              </a14:hiddenLine>
-            </a:ext>
-          </a:extLst>
-        </p:spPr>
-        <p:txBody>
-          <a:bodyPr>
-            <a:spAutoFit/>
-          </a:bodyPr>
-          <a:lstStyle>
-            <a:lvl1pPr eaLnBrk="0" hangingPunct="0">
-              <a:defRPr sz="2400">
-                <a:solidFill>
-                  <a:schemeClr val="tx1"/>
-                </a:solidFill>
-                <a:latin typeface="Trebuchet MS" charset="0"/>
-                <a:ea typeface="ＭＳ Ｐゴシック" charset="0"/>
-                <a:cs typeface="ＭＳ Ｐゴシック" charset="0"/>
-              </a:defRPr>
-            </a:lvl1pPr>
-            <a:lvl2pPr marL="742950" indent="-285750" eaLnBrk="0" hangingPunct="0">
-              <a:defRPr sz="2400">
-                <a:solidFill>
-                  <a:schemeClr val="tx1"/>
-                </a:solidFill>
-                <a:latin typeface="Trebuchet MS" charset="0"/>
-                <a:ea typeface="ＭＳ Ｐゴシック" charset="0"/>
-              </a:defRPr>
-            </a:lvl2pPr>
-            <a:lvl3pPr marL="1143000" indent="-228600" eaLnBrk="0" hangingPunct="0">
-              <a:defRPr sz="2400">
-                <a:solidFill>
-                  <a:schemeClr val="tx1"/>
-                </a:solidFill>
-                <a:latin typeface="Trebuchet MS" charset="0"/>
-                <a:ea typeface="ＭＳ Ｐゴシック" charset="0"/>
-              </a:defRPr>
-            </a:lvl3pPr>
-            <a:lvl4pPr marL="1600200" indent="-228600" eaLnBrk="0" hangingPunct="0">
-              <a:defRPr sz="2400">
-                <a:solidFill>
-                  <a:schemeClr val="tx1"/>
-                </a:solidFill>
-                <a:latin typeface="Trebuchet MS" charset="0"/>
-                <a:ea typeface="ＭＳ Ｐゴシック" charset="0"/>
-              </a:defRPr>
-            </a:lvl4pPr>
-            <a:lvl5pPr marL="2057400" indent="-228600" eaLnBrk="0" hangingPunct="0">
-              <a:defRPr sz="2400">
-                <a:solidFill>
-                  <a:schemeClr val="tx1"/>
-                </a:solidFill>
-                <a:latin typeface="Trebuchet MS" charset="0"/>
-                <a:ea typeface="ＭＳ Ｐゴシック" charset="0"/>
-              </a:defRPr>
-            </a:lvl5pPr>
-            <a:lvl6pPr marL="2514600" indent="-228600" eaLnBrk="0" fontAlgn="base" hangingPunct="0">
-              <a:spcBef>
-                <a:spcPct val="0"/>
-              </a:spcBef>
-              <a:spcAft>
-                <a:spcPct val="0"/>
-              </a:spcAft>
-              <a:defRPr sz="2400">
-                <a:solidFill>
-                  <a:schemeClr val="tx1"/>
-                </a:solidFill>
-                <a:latin typeface="Trebuchet MS" charset="0"/>
-                <a:ea typeface="ＭＳ Ｐゴシック" charset="0"/>
-              </a:defRPr>
-            </a:lvl6pPr>
-            <a:lvl7pPr marL="2971800" indent="-228600" eaLnBrk="0" fontAlgn="base" hangingPunct="0">
-              <a:spcBef>
-                <a:spcPct val="0"/>
-              </a:spcBef>
-              <a:spcAft>
-                <a:spcPct val="0"/>
-              </a:spcAft>
-              <a:defRPr sz="2400">
-                <a:solidFill>
-                  <a:schemeClr val="tx1"/>
-                </a:solidFill>
-                <a:latin typeface="Trebuchet MS" charset="0"/>
-                <a:ea typeface="ＭＳ Ｐゴシック" charset="0"/>
-              </a:defRPr>
-            </a:lvl7pPr>
-            <a:lvl8pPr marL="3429000" indent="-228600" eaLnBrk="0" fontAlgn="base" hangingPunct="0">
-              <a:spcBef>
-                <a:spcPct val="0"/>
-              </a:spcBef>
-              <a:spcAft>
-                <a:spcPct val="0"/>
-              </a:spcAft>
-              <a:defRPr sz="2400">
-                <a:solidFill>
-                  <a:schemeClr val="tx1"/>
-                </a:solidFill>
-                <a:latin typeface="Trebuchet MS" charset="0"/>
-                <a:ea typeface="ＭＳ Ｐゴシック" charset="0"/>
-              </a:defRPr>
-            </a:lvl8pPr>
-            <a:lvl9pPr marL="3886200" indent="-228600" eaLnBrk="0" fontAlgn="base" hangingPunct="0">
-              <a:spcBef>
-                <a:spcPct val="0"/>
-              </a:spcBef>
-              <a:spcAft>
-                <a:spcPct val="0"/>
-              </a:spcAft>
-              <a:defRPr sz="2400">
-                <a:solidFill>
-                  <a:schemeClr val="tx1"/>
-                </a:solidFill>
-                <a:latin typeface="Trebuchet MS" charset="0"/>
-                <a:ea typeface="ＭＳ Ｐゴシック" charset="0"/>
-              </a:defRPr>
-            </a:lvl9pPr>
-          </a:lstStyle>
-          <a:p>
-            <a:pPr eaLnBrk="1" hangingPunct="1"/>
-            <a:r>
-              <a:rPr lang="en-US"/>
-              <a:t>Slide notes would cover some common use cases …</a:t>
-            </a:r>
-          </a:p>
-          <a:p>
-            <a:pPr eaLnBrk="1" hangingPunct="1"/>
-            <a:r>
-              <a:rPr lang="en-US"/>
-              <a:t>Demo – launch FastDev for Android in the terminal?</a:t>
-            </a:r>
-          </a:p>
-        </p:txBody>
-      </p:sp>
       <p:sp>
         <p:nvSpPr>
           <p:cNvPr id="33796" name="Line 8"/>

</xml_diff>